<commit_message>
First iteration of rooms for 3rd floor
</commit_message>
<xml_diff>
--- a/docs/Final Binding of Newton.pptx
+++ b/docs/Final Binding of Newton.pptx
@@ -1852,6 +1852,13 @@
         </dgm:presLayoutVars>
       </dgm:prSet>
       <dgm:spPr/>
+      <dgm:t>
+        <a:bodyPr/>
+        <a:lstStyle/>
+        <a:p>
+          <a:endParaRPr lang="de-DE"/>
+        </a:p>
+      </dgm:t>
     </dgm:pt>
     <dgm:pt modelId="{3F753FED-ABD0-41E3-8FA5-C30A595A6DD8}" type="pres">
       <dgm:prSet presAssocID="{8D6E120C-620A-4348-AA3F-E9C1B7EA9CCA}" presName="parentText" presStyleLbl="node1" presStyleIdx="0" presStyleCnt="4">
@@ -1861,6 +1868,13 @@
         </dgm:presLayoutVars>
       </dgm:prSet>
       <dgm:spPr/>
+      <dgm:t>
+        <a:bodyPr/>
+        <a:lstStyle/>
+        <a:p>
+          <a:endParaRPr lang="de-DE"/>
+        </a:p>
+      </dgm:t>
     </dgm:pt>
     <dgm:pt modelId="{96ABAEBB-339D-409B-AB33-3A0AABC4627F}" type="pres">
       <dgm:prSet presAssocID="{4CD82203-EE55-4ECE-9854-622EE489FCFC}" presName="spacer" presStyleCnt="0"/>
@@ -1874,6 +1888,13 @@
         </dgm:presLayoutVars>
       </dgm:prSet>
       <dgm:spPr/>
+      <dgm:t>
+        <a:bodyPr/>
+        <a:lstStyle/>
+        <a:p>
+          <a:endParaRPr lang="de-DE"/>
+        </a:p>
+      </dgm:t>
     </dgm:pt>
     <dgm:pt modelId="{D64541EE-7B97-463B-84C9-5D21EB9146C2}" type="pres">
       <dgm:prSet presAssocID="{5C04C7AD-CBA2-4E10-9B80-1A2990434735}" presName="spacer" presStyleCnt="0"/>
@@ -1887,6 +1908,13 @@
         </dgm:presLayoutVars>
       </dgm:prSet>
       <dgm:spPr/>
+      <dgm:t>
+        <a:bodyPr/>
+        <a:lstStyle/>
+        <a:p>
+          <a:endParaRPr lang="de-DE"/>
+        </a:p>
+      </dgm:t>
     </dgm:pt>
     <dgm:pt modelId="{BCCBAD4F-0E23-4325-B9F5-E90326826941}" type="pres">
       <dgm:prSet presAssocID="{E796539B-B77A-4C85-91BD-AC7E7329A5C9}" presName="spacer" presStyleCnt="0"/>
@@ -1900,18 +1928,25 @@
         </dgm:presLayoutVars>
       </dgm:prSet>
       <dgm:spPr/>
+      <dgm:t>
+        <a:bodyPr/>
+        <a:lstStyle/>
+        <a:p>
+          <a:endParaRPr lang="de-DE"/>
+        </a:p>
+      </dgm:t>
     </dgm:pt>
   </dgm:ptLst>
   <dgm:cxnLst>
+    <dgm:cxn modelId="{5F47C5F4-8DBD-4450-9242-620525ACC762}" type="presOf" srcId="{07E23436-6A10-44FE-B8AF-DE5DC332C89A}" destId="{DDBFF4B3-2B0A-4819-9623-F3D2EB042142}" srcOrd="0" destOrd="0" presId="urn:microsoft.com/office/officeart/2005/8/layout/vList2"/>
+    <dgm:cxn modelId="{B4D0F6CF-03F6-4AFC-ADF6-B8ACA8E98A70}" srcId="{A3856493-76EF-4BA7-BF42-87631ACDCFDA}" destId="{75FB72FB-6E78-4D0F-972B-36C8B68F6082}" srcOrd="2" destOrd="0" parTransId="{F86DF673-2A93-44CA-A8E6-985EA430DF3B}" sibTransId="{E796539B-B77A-4C85-91BD-AC7E7329A5C9}"/>
     <dgm:cxn modelId="{53DF4C3B-FD05-41F7-AF46-DD60EC0CD811}" type="presOf" srcId="{A3856493-76EF-4BA7-BF42-87631ACDCFDA}" destId="{61D58E27-B657-4A5F-9C37-7A8D004561C1}" srcOrd="0" destOrd="0" presId="urn:microsoft.com/office/officeart/2005/8/layout/vList2"/>
+    <dgm:cxn modelId="{C7D25882-EF57-47C1-BD07-8446B2F8A9EA}" type="presOf" srcId="{75FB72FB-6E78-4D0F-972B-36C8B68F6082}" destId="{05B02CFA-E346-4C9C-B540-D693C24FDF1E}" srcOrd="0" destOrd="0" presId="urn:microsoft.com/office/officeart/2005/8/layout/vList2"/>
     <dgm:cxn modelId="{B9377846-9C35-4ED6-901F-0D34383728D0}" srcId="{A3856493-76EF-4BA7-BF42-87631ACDCFDA}" destId="{A156FDBA-C9E3-40DD-9EA0-91432DC1F723}" srcOrd="3" destOrd="0" parTransId="{C0D63D18-8990-453D-9D14-F29972B9FE93}" sibTransId="{4B850ACB-425B-4C60-8905-6C62E84684D9}"/>
+    <dgm:cxn modelId="{DC3DD09B-3404-483A-8C80-E6272E26B010}" type="presOf" srcId="{A156FDBA-C9E3-40DD-9EA0-91432DC1F723}" destId="{316FDAAD-D83E-44A2-AB5A-1B7637D255E3}" srcOrd="0" destOrd="0" presId="urn:microsoft.com/office/officeart/2005/8/layout/vList2"/>
+    <dgm:cxn modelId="{BE1D39C0-28B2-4DC3-B332-B54F04668BAF}" srcId="{A3856493-76EF-4BA7-BF42-87631ACDCFDA}" destId="{8D6E120C-620A-4348-AA3F-E9C1B7EA9CCA}" srcOrd="0" destOrd="0" parTransId="{90925E08-53B7-432A-B2FC-7C247C44872C}" sibTransId="{4CD82203-EE55-4ECE-9854-622EE489FCFC}"/>
     <dgm:cxn modelId="{4D3C8369-DC20-45E7-832A-96A77B1DFC66}" type="presOf" srcId="{8D6E120C-620A-4348-AA3F-E9C1B7EA9CCA}" destId="{3F753FED-ABD0-41E3-8FA5-C30A595A6DD8}" srcOrd="0" destOrd="0" presId="urn:microsoft.com/office/officeart/2005/8/layout/vList2"/>
-    <dgm:cxn modelId="{C7D25882-EF57-47C1-BD07-8446B2F8A9EA}" type="presOf" srcId="{75FB72FB-6E78-4D0F-972B-36C8B68F6082}" destId="{05B02CFA-E346-4C9C-B540-D693C24FDF1E}" srcOrd="0" destOrd="0" presId="urn:microsoft.com/office/officeart/2005/8/layout/vList2"/>
-    <dgm:cxn modelId="{DC3DD09B-3404-483A-8C80-E6272E26B010}" type="presOf" srcId="{A156FDBA-C9E3-40DD-9EA0-91432DC1F723}" destId="{316FDAAD-D83E-44A2-AB5A-1B7637D255E3}" srcOrd="0" destOrd="0" presId="urn:microsoft.com/office/officeart/2005/8/layout/vList2"/>
     <dgm:cxn modelId="{AF0DA5BB-499F-4D93-BA0A-EB33E4EDD40F}" srcId="{A3856493-76EF-4BA7-BF42-87631ACDCFDA}" destId="{07E23436-6A10-44FE-B8AF-DE5DC332C89A}" srcOrd="1" destOrd="0" parTransId="{8073859C-D393-4130-AC19-104306D80E00}" sibTransId="{5C04C7AD-CBA2-4E10-9B80-1A2990434735}"/>
-    <dgm:cxn modelId="{BE1D39C0-28B2-4DC3-B332-B54F04668BAF}" srcId="{A3856493-76EF-4BA7-BF42-87631ACDCFDA}" destId="{8D6E120C-620A-4348-AA3F-E9C1B7EA9CCA}" srcOrd="0" destOrd="0" parTransId="{90925E08-53B7-432A-B2FC-7C247C44872C}" sibTransId="{4CD82203-EE55-4ECE-9854-622EE489FCFC}"/>
-    <dgm:cxn modelId="{B4D0F6CF-03F6-4AFC-ADF6-B8ACA8E98A70}" srcId="{A3856493-76EF-4BA7-BF42-87631ACDCFDA}" destId="{75FB72FB-6E78-4D0F-972B-36C8B68F6082}" srcOrd="2" destOrd="0" parTransId="{F86DF673-2A93-44CA-A8E6-985EA430DF3B}" sibTransId="{E796539B-B77A-4C85-91BD-AC7E7329A5C9}"/>
-    <dgm:cxn modelId="{5F47C5F4-8DBD-4450-9242-620525ACC762}" type="presOf" srcId="{07E23436-6A10-44FE-B8AF-DE5DC332C89A}" destId="{DDBFF4B3-2B0A-4819-9623-F3D2EB042142}" srcOrd="0" destOrd="0" presId="urn:microsoft.com/office/officeart/2005/8/layout/vList2"/>
     <dgm:cxn modelId="{EF4C89F9-7B95-4748-A87A-AE65818DC1AB}" type="presParOf" srcId="{61D58E27-B657-4A5F-9C37-7A8D004561C1}" destId="{3F753FED-ABD0-41E3-8FA5-C30A595A6DD8}" srcOrd="0" destOrd="0" presId="urn:microsoft.com/office/officeart/2005/8/layout/vList2"/>
     <dgm:cxn modelId="{1266A3A3-4AC4-417F-B8BF-DFEF451A7136}" type="presParOf" srcId="{61D58E27-B657-4A5F-9C37-7A8D004561C1}" destId="{96ABAEBB-339D-409B-AB33-3A0AABC4627F}" srcOrd="1" destOrd="0" presId="urn:microsoft.com/office/officeart/2005/8/layout/vList2"/>
     <dgm:cxn modelId="{306BC468-1B30-439B-AEB7-6DE3B739BE7D}" type="presParOf" srcId="{61D58E27-B657-4A5F-9C37-7A8D004561C1}" destId="{DDBFF4B3-2B0A-4819-9623-F3D2EB042142}" srcOrd="2" destOrd="0" presId="urn:microsoft.com/office/officeart/2005/8/layout/vList2"/>
@@ -2063,6 +2098,13 @@
         </dgm:presLayoutVars>
       </dgm:prSet>
       <dgm:spPr/>
+      <dgm:t>
+        <a:bodyPr/>
+        <a:lstStyle/>
+        <a:p>
+          <a:endParaRPr lang="de-DE"/>
+        </a:p>
+      </dgm:t>
     </dgm:pt>
     <dgm:pt modelId="{4E60A9D7-BF71-4C3A-9CEA-9F24082AD745}" type="pres">
       <dgm:prSet presAssocID="{70E956B2-B92C-4A37-8F47-D0AB319BEE26}" presName="parentText" presStyleLbl="node1" presStyleIdx="0" presStyleCnt="3">
@@ -2072,6 +2114,13 @@
         </dgm:presLayoutVars>
       </dgm:prSet>
       <dgm:spPr/>
+      <dgm:t>
+        <a:bodyPr/>
+        <a:lstStyle/>
+        <a:p>
+          <a:endParaRPr lang="de-DE"/>
+        </a:p>
+      </dgm:t>
     </dgm:pt>
     <dgm:pt modelId="{73A9AE9C-B3C9-4246-8FCD-46936D516E93}" type="pres">
       <dgm:prSet presAssocID="{F79F43E3-6D63-44AB-806B-191CE24A064B}" presName="spacer" presStyleCnt="0"/>
@@ -2085,6 +2134,13 @@
         </dgm:presLayoutVars>
       </dgm:prSet>
       <dgm:spPr/>
+      <dgm:t>
+        <a:bodyPr/>
+        <a:lstStyle/>
+        <a:p>
+          <a:endParaRPr lang="de-DE"/>
+        </a:p>
+      </dgm:t>
     </dgm:pt>
     <dgm:pt modelId="{A00D3643-4D42-4E3E-B35F-97582881E2F7}" type="pres">
       <dgm:prSet presAssocID="{2EA5502E-EC50-4E10-AEFE-872E572325E7}" presName="spacer" presStyleCnt="0"/>
@@ -2098,16 +2154,23 @@
         </dgm:presLayoutVars>
       </dgm:prSet>
       <dgm:spPr/>
+      <dgm:t>
+        <a:bodyPr/>
+        <a:lstStyle/>
+        <a:p>
+          <a:endParaRPr lang="de-DE"/>
+        </a:p>
+      </dgm:t>
     </dgm:pt>
   </dgm:ptLst>
   <dgm:cxnLst>
-    <dgm:cxn modelId="{742B3E00-6050-4115-8118-B725CB9964C0}" type="presOf" srcId="{0E709708-195A-4017-8518-B1489C07C419}" destId="{642B23E2-54D3-4267-995F-26333589EFAE}" srcOrd="0" destOrd="0" presId="urn:microsoft.com/office/officeart/2005/8/layout/vList2"/>
-    <dgm:cxn modelId="{1492520F-7933-4A00-BBF7-1F629C5715FB}" type="presOf" srcId="{93935B03-991F-4B30-A628-94BF0050798F}" destId="{7A30C235-83A1-4D96-A9FB-5627FBD414B0}" srcOrd="0" destOrd="0" presId="urn:microsoft.com/office/officeart/2005/8/layout/vList2"/>
-    <dgm:cxn modelId="{FB2D9B43-3D67-4DAB-9FA6-C6DD132A7436}" srcId="{93935B03-991F-4B30-A628-94BF0050798F}" destId="{0E709708-195A-4017-8518-B1489C07C419}" srcOrd="2" destOrd="0" parTransId="{2A6AE16C-A37F-45FA-B415-DCE431E2A6A0}" sibTransId="{7D3D7A25-46E3-4F09-81F3-C40FD160CB80}"/>
-    <dgm:cxn modelId="{23D4AA46-E8CD-4947-A9F6-F1BEA7E1EBA0}" srcId="{93935B03-991F-4B30-A628-94BF0050798F}" destId="{DF474B27-48AC-45E6-B35F-EF17BE8B0510}" srcOrd="1" destOrd="0" parTransId="{A383CA7D-AF89-45EC-AA57-46E5702F30D7}" sibTransId="{2EA5502E-EC50-4E10-AEFE-872E572325E7}"/>
-    <dgm:cxn modelId="{7FE62E72-4EBE-4E79-A6C8-3DEEE233E8FA}" type="presOf" srcId="{70E956B2-B92C-4A37-8F47-D0AB319BEE26}" destId="{4E60A9D7-BF71-4C3A-9CEA-9F24082AD745}" srcOrd="0" destOrd="0" presId="urn:microsoft.com/office/officeart/2005/8/layout/vList2"/>
     <dgm:cxn modelId="{D9EDFBC4-AE0D-4489-9C5B-1470D3342491}" type="presOf" srcId="{DF474B27-48AC-45E6-B35F-EF17BE8B0510}" destId="{9B7EC1D2-988E-4F60-A4D4-BE863F1AC334}" srcOrd="0" destOrd="0" presId="urn:microsoft.com/office/officeart/2005/8/layout/vList2"/>
     <dgm:cxn modelId="{C8B3D2E3-3CEC-44A9-8A3E-066BCC88B439}" srcId="{93935B03-991F-4B30-A628-94BF0050798F}" destId="{70E956B2-B92C-4A37-8F47-D0AB319BEE26}" srcOrd="0" destOrd="0" parTransId="{67C5C4DB-EB3C-4674-A108-9B77F6424F56}" sibTransId="{F79F43E3-6D63-44AB-806B-191CE24A064B}"/>
+    <dgm:cxn modelId="{742B3E00-6050-4115-8118-B725CB9964C0}" type="presOf" srcId="{0E709708-195A-4017-8518-B1489C07C419}" destId="{642B23E2-54D3-4267-995F-26333589EFAE}" srcOrd="0" destOrd="0" presId="urn:microsoft.com/office/officeart/2005/8/layout/vList2"/>
+    <dgm:cxn modelId="{7FE62E72-4EBE-4E79-A6C8-3DEEE233E8FA}" type="presOf" srcId="{70E956B2-B92C-4A37-8F47-D0AB319BEE26}" destId="{4E60A9D7-BF71-4C3A-9CEA-9F24082AD745}" srcOrd="0" destOrd="0" presId="urn:microsoft.com/office/officeart/2005/8/layout/vList2"/>
+    <dgm:cxn modelId="{1492520F-7933-4A00-BBF7-1F629C5715FB}" type="presOf" srcId="{93935B03-991F-4B30-A628-94BF0050798F}" destId="{7A30C235-83A1-4D96-A9FB-5627FBD414B0}" srcOrd="0" destOrd="0" presId="urn:microsoft.com/office/officeart/2005/8/layout/vList2"/>
+    <dgm:cxn modelId="{23D4AA46-E8CD-4947-A9F6-F1BEA7E1EBA0}" srcId="{93935B03-991F-4B30-A628-94BF0050798F}" destId="{DF474B27-48AC-45E6-B35F-EF17BE8B0510}" srcOrd="1" destOrd="0" parTransId="{A383CA7D-AF89-45EC-AA57-46E5702F30D7}" sibTransId="{2EA5502E-EC50-4E10-AEFE-872E572325E7}"/>
+    <dgm:cxn modelId="{FB2D9B43-3D67-4DAB-9FA6-C6DD132A7436}" srcId="{93935B03-991F-4B30-A628-94BF0050798F}" destId="{0E709708-195A-4017-8518-B1489C07C419}" srcOrd="2" destOrd="0" parTransId="{2A6AE16C-A37F-45FA-B415-DCE431E2A6A0}" sibTransId="{7D3D7A25-46E3-4F09-81F3-C40FD160CB80}"/>
     <dgm:cxn modelId="{8AF26CA5-C7F7-4E32-9215-E578A1ADA333}" type="presParOf" srcId="{7A30C235-83A1-4D96-A9FB-5627FBD414B0}" destId="{4E60A9D7-BF71-4C3A-9CEA-9F24082AD745}" srcOrd="0" destOrd="0" presId="urn:microsoft.com/office/officeart/2005/8/layout/vList2"/>
     <dgm:cxn modelId="{885626F3-5407-4F0B-BEFF-6359B1C4F71D}" type="presParOf" srcId="{7A30C235-83A1-4D96-A9FB-5627FBD414B0}" destId="{73A9AE9C-B3C9-4246-8FCD-46936D516E93}" srcOrd="1" destOrd="0" presId="urn:microsoft.com/office/officeart/2005/8/layout/vList2"/>
     <dgm:cxn modelId="{873116EC-B55B-4B28-9459-6C7711AA4D8A}" type="presParOf" srcId="{7A30C235-83A1-4D96-A9FB-5627FBD414B0}" destId="{9B7EC1D2-988E-4F60-A4D4-BE863F1AC334}" srcOrd="2" destOrd="0" presId="urn:microsoft.com/office/officeart/2005/8/layout/vList2"/>
@@ -2187,7 +2250,7 @@
         </a:bodyPr>
         <a:lstStyle/>
         <a:p>
-          <a:pPr marL="0" lvl="0" indent="0" algn="l" defTabSz="1955800">
+          <a:pPr lvl="0" algn="l" defTabSz="1955800">
             <a:lnSpc>
               <a:spcPct val="90000"/>
             </a:lnSpc>
@@ -2197,7 +2260,6 @@
             <a:spcAft>
               <a:spcPct val="35000"/>
             </a:spcAft>
-            <a:buNone/>
           </a:pPr>
           <a:r>
             <a:rPr lang="de-DE" sz="4400" kern="1200"/>
@@ -2266,7 +2328,7 @@
         </a:bodyPr>
         <a:lstStyle/>
         <a:p>
-          <a:pPr marL="0" lvl="0" indent="0" algn="l" defTabSz="1955800">
+          <a:pPr lvl="0" algn="l" defTabSz="1955800">
             <a:lnSpc>
               <a:spcPct val="90000"/>
             </a:lnSpc>
@@ -2276,7 +2338,6 @@
             <a:spcAft>
               <a:spcPct val="35000"/>
             </a:spcAft>
-            <a:buNone/>
           </a:pPr>
           <a:r>
             <a:rPr lang="de-DE" sz="4400" kern="1200"/>
@@ -2345,7 +2406,7 @@
         </a:bodyPr>
         <a:lstStyle/>
         <a:p>
-          <a:pPr marL="0" lvl="0" indent="0" algn="l" defTabSz="1955800">
+          <a:pPr lvl="0" algn="l" defTabSz="1955800">
             <a:lnSpc>
               <a:spcPct val="90000"/>
             </a:lnSpc>
@@ -2355,7 +2416,6 @@
             <a:spcAft>
               <a:spcPct val="35000"/>
             </a:spcAft>
-            <a:buNone/>
           </a:pPr>
           <a:r>
             <a:rPr lang="de-DE" sz="4400" kern="1200"/>
@@ -2424,7 +2484,7 @@
         </a:bodyPr>
         <a:lstStyle/>
         <a:p>
-          <a:pPr marL="0" lvl="0" indent="0" algn="l" defTabSz="1955800">
+          <a:pPr lvl="0" algn="l" defTabSz="1955800">
             <a:lnSpc>
               <a:spcPct val="90000"/>
             </a:lnSpc>
@@ -2434,7 +2494,6 @@
             <a:spcAft>
               <a:spcPct val="35000"/>
             </a:spcAft>
-            <a:buNone/>
           </a:pPr>
           <a:r>
             <a:rPr lang="de-DE" sz="4400" kern="1200"/>
@@ -2515,7 +2574,7 @@
         </a:bodyPr>
         <a:lstStyle/>
         <a:p>
-          <a:pPr marL="0" lvl="0" indent="0" algn="l" defTabSz="2355850">
+          <a:pPr lvl="0" algn="l" defTabSz="2355850">
             <a:lnSpc>
               <a:spcPct val="90000"/>
             </a:lnSpc>
@@ -2525,7 +2584,6 @@
             <a:spcAft>
               <a:spcPct val="35000"/>
             </a:spcAft>
-            <a:buNone/>
           </a:pPr>
           <a:r>
             <a:rPr lang="de-DE" sz="5300" kern="1200"/>
@@ -2594,7 +2652,7 @@
         </a:bodyPr>
         <a:lstStyle/>
         <a:p>
-          <a:pPr marL="0" lvl="0" indent="0" algn="l" defTabSz="2355850">
+          <a:pPr lvl="0" algn="l" defTabSz="2355850">
             <a:lnSpc>
               <a:spcPct val="90000"/>
             </a:lnSpc>
@@ -2604,7 +2662,6 @@
             <a:spcAft>
               <a:spcPct val="35000"/>
             </a:spcAft>
-            <a:buNone/>
           </a:pPr>
           <a:r>
             <a:rPr lang="de-DE" sz="5300" kern="1200"/>
@@ -2673,7 +2730,7 @@
         </a:bodyPr>
         <a:lstStyle/>
         <a:p>
-          <a:pPr marL="0" lvl="0" indent="0" algn="l" defTabSz="2355850">
+          <a:pPr lvl="0" algn="l" defTabSz="2355850">
             <a:lnSpc>
               <a:spcPct val="90000"/>
             </a:lnSpc>
@@ -2683,7 +2740,6 @@
             <a:spcAft>
               <a:spcPct val="35000"/>
             </a:spcAft>
-            <a:buNone/>
           </a:pPr>
           <a:r>
             <a:rPr lang="de-DE" sz="5300" kern="1200"/>
@@ -8331,7 +8387,7 @@
           </p:cNvPicPr>
           <p:nvPr/>
         </p:nvPicPr>
-        <p:blipFill>
+        <p:blipFill rotWithShape="1">
           <a:blip r:embed="rId2">
             <a:extLst>
               <a:ext uri="{28A0092B-C50C-407E-A947-70E740481C1C}">
@@ -8339,15 +8395,13 @@
               </a:ext>
             </a:extLst>
           </a:blip>
-          <a:srcRect/>
-          <a:stretch>
-            <a:fillRect/>
-          </a:stretch>
+          <a:srcRect t="3150"/>
+          <a:stretch/>
         </p:blipFill>
         <p:spPr bwMode="auto">
           <a:xfrm>
-            <a:off x="0" y="1588"/>
-            <a:ext cx="12192000" cy="6853237"/>
+            <a:off x="-1" y="0"/>
+            <a:ext cx="12279923" cy="6854825"/>
           </a:xfrm>
           <a:prstGeom prst="rect">
             <a:avLst/>
@@ -8443,7 +8497,7 @@
                 <a16:creationId xmlns:a16="http://schemas.microsoft.com/office/drawing/2014/main" id="{3CFEB548-CACC-4915-BA3A-ECFAD4BE055B}"/>
               </a:ext>
               <a:ext uri="{C183D7F6-B498-43B3-948B-1728B52AA6E4}">
-                <adec:decorative xmlns:adec="http://schemas.microsoft.com/office/drawing/2017/decorative" val="1"/>
+                <adec:decorative xmlns:adec="http://schemas.microsoft.com/office/drawing/2017/decorative" xmlns="" val="1"/>
               </a:ext>
             </a:extLst>
           </p:cNvPr>
@@ -8503,7 +8557,7 @@
                 <a16:creationId xmlns:a16="http://schemas.microsoft.com/office/drawing/2014/main" id="{337DD617-02C2-4388-A86E-BAB7BD2847FF}"/>
               </a:ext>
               <a:ext uri="{C183D7F6-B498-43B3-948B-1728B52AA6E4}">
-                <adec:decorative xmlns:adec="http://schemas.microsoft.com/office/drawing/2017/decorative" val="1"/>
+                <adec:decorative xmlns:adec="http://schemas.microsoft.com/office/drawing/2017/decorative" xmlns="" val="1"/>
               </a:ext>
             </a:extLst>
           </p:cNvPr>
@@ -8568,7 +8622,7 @@
                 <a16:creationId xmlns:a16="http://schemas.microsoft.com/office/drawing/2014/main" id="{6971532D-ED15-4EA1-8D74-8B9D49117B1E}"/>
               </a:ext>
               <a:ext uri="{C183D7F6-B498-43B3-948B-1728B52AA6E4}">
-                <adec:decorative xmlns:adec="http://schemas.microsoft.com/office/drawing/2017/decorative" val="1"/>
+                <adec:decorative xmlns:adec="http://schemas.microsoft.com/office/drawing/2017/decorative" xmlns="" val="1"/>
               </a:ext>
             </a:extLst>
           </p:cNvPr>
@@ -8599,7 +8653,7 @@
                   <a16:creationId xmlns:a16="http://schemas.microsoft.com/office/drawing/2014/main" id="{53E0E949-6174-47F4-871C-39B2BE7B4B04}"/>
                 </a:ext>
                 <a:ext uri="{C183D7F6-B498-43B3-948B-1728B52AA6E4}">
-                  <adec:decorative xmlns:adec="http://schemas.microsoft.com/office/drawing/2017/decorative" val="1"/>
+                  <adec:decorative xmlns:adec="http://schemas.microsoft.com/office/drawing/2017/decorative" xmlns="" val="1"/>
                 </a:ext>
               </a:extLst>
             </p:cNvPr>
@@ -8656,7 +8710,7 @@
                   <a16:creationId xmlns:a16="http://schemas.microsoft.com/office/drawing/2014/main" id="{CA81FA79-0462-498C-A7A0-4F97CB9BD068}"/>
                 </a:ext>
                 <a:ext uri="{C183D7F6-B498-43B3-948B-1728B52AA6E4}">
-                  <adec:decorative xmlns:adec="http://schemas.microsoft.com/office/drawing/2017/decorative" val="1"/>
+                  <adec:decorative xmlns:adec="http://schemas.microsoft.com/office/drawing/2017/decorative" xmlns="" val="1"/>
                 </a:ext>
               </a:extLst>
             </p:cNvPr>
@@ -8713,7 +8767,7 @@
                   <a16:creationId xmlns:a16="http://schemas.microsoft.com/office/drawing/2014/main" id="{9B13F096-ACB3-4289-ADE9-7BCF5727CEFA}"/>
                 </a:ext>
                 <a:ext uri="{C183D7F6-B498-43B3-948B-1728B52AA6E4}">
-                  <adec:decorative xmlns:adec="http://schemas.microsoft.com/office/drawing/2017/decorative" val="1"/>
+                  <adec:decorative xmlns:adec="http://schemas.microsoft.com/office/drawing/2017/decorative" xmlns="" val="1"/>
                 </a:ext>
               </a:extLst>
             </p:cNvPr>
@@ -8770,7 +8824,7 @@
                   <a16:creationId xmlns:a16="http://schemas.microsoft.com/office/drawing/2014/main" id="{442D1F89-7331-4DB6-9053-DE817E604F1F}"/>
                 </a:ext>
                 <a:ext uri="{C183D7F6-B498-43B3-948B-1728B52AA6E4}">
-                  <adec:decorative xmlns:adec="http://schemas.microsoft.com/office/drawing/2017/decorative" val="1"/>
+                  <adec:decorative xmlns:adec="http://schemas.microsoft.com/office/drawing/2017/decorative" xmlns="" val="1"/>
                 </a:ext>
               </a:extLst>
             </p:cNvPr>
@@ -8828,7 +8882,7 @@
                 <a16:creationId xmlns:a16="http://schemas.microsoft.com/office/drawing/2014/main" id="{4527D98C-AF53-420B-A7B6-DD5AA7D5339E}"/>
               </a:ext>
               <a:ext uri="{C183D7F6-B498-43B3-948B-1728B52AA6E4}">
-                <adec:decorative xmlns:adec="http://schemas.microsoft.com/office/drawing/2017/decorative" val="1"/>
+                <adec:decorative xmlns:adec="http://schemas.microsoft.com/office/drawing/2017/decorative" xmlns="" val="1"/>
               </a:ext>
             </a:extLst>
           </p:cNvPr>
@@ -8859,7 +8913,7 @@
                   <a16:creationId xmlns:a16="http://schemas.microsoft.com/office/drawing/2014/main" id="{9F0B76EE-9601-45D1-815F-6B076D42F091}"/>
                 </a:ext>
                 <a:ext uri="{C183D7F6-B498-43B3-948B-1728B52AA6E4}">
-                  <adec:decorative xmlns:adec="http://schemas.microsoft.com/office/drawing/2017/decorative" val="1"/>
+                  <adec:decorative xmlns:adec="http://schemas.microsoft.com/office/drawing/2017/decorative" xmlns="" val="1"/>
                 </a:ext>
               </a:extLst>
             </p:cNvPr>
@@ -8936,7 +8990,7 @@
                   <a16:creationId xmlns:a16="http://schemas.microsoft.com/office/drawing/2014/main" id="{1F5FB023-5222-4B9E-B6D1-A5040E4CEBE1}"/>
                 </a:ext>
                 <a:ext uri="{C183D7F6-B498-43B3-948B-1728B52AA6E4}">
-                  <adec:decorative xmlns:adec="http://schemas.microsoft.com/office/drawing/2017/decorative" val="1"/>
+                  <adec:decorative xmlns:adec="http://schemas.microsoft.com/office/drawing/2017/decorative" xmlns="" val="1"/>
                 </a:ext>
               </a:extLst>
             </p:cNvPr>
@@ -9013,7 +9067,7 @@
                   <a16:creationId xmlns:a16="http://schemas.microsoft.com/office/drawing/2014/main" id="{EAAEED21-38DA-46C2-93A3-F597C8761F21}"/>
                 </a:ext>
                 <a:ext uri="{C183D7F6-B498-43B3-948B-1728B52AA6E4}">
-                  <adec:decorative xmlns:adec="http://schemas.microsoft.com/office/drawing/2017/decorative" val="1"/>
+                  <adec:decorative xmlns:adec="http://schemas.microsoft.com/office/drawing/2017/decorative" xmlns="" val="1"/>
                 </a:ext>
               </a:extLst>
             </p:cNvPr>
@@ -9088,7 +9142,7 @@
                   <a16:creationId xmlns:a16="http://schemas.microsoft.com/office/drawing/2014/main" id="{17EFB714-3172-4F11-BA4B-04073494A7F5}"/>
                 </a:ext>
                 <a:ext uri="{C183D7F6-B498-43B3-948B-1728B52AA6E4}">
-                  <adec:decorative xmlns:adec="http://schemas.microsoft.com/office/drawing/2017/decorative" val="1"/>
+                  <adec:decorative xmlns:adec="http://schemas.microsoft.com/office/drawing/2017/decorative" xmlns="" val="1"/>
                 </a:ext>
               </a:extLst>
             </p:cNvPr>
@@ -9163,7 +9217,7 @@
                   <a16:creationId xmlns:a16="http://schemas.microsoft.com/office/drawing/2014/main" id="{8783C632-F1E2-40EE-AFA0-EF8D52D67779}"/>
                 </a:ext>
                 <a:ext uri="{C183D7F6-B498-43B3-948B-1728B52AA6E4}">
-                  <adec:decorative xmlns:adec="http://schemas.microsoft.com/office/drawing/2017/decorative" val="1"/>
+                  <adec:decorative xmlns:adec="http://schemas.microsoft.com/office/drawing/2017/decorative" xmlns="" val="1"/>
                 </a:ext>
               </a:extLst>
             </p:cNvPr>
@@ -9240,7 +9294,7 @@
                   <a16:creationId xmlns:a16="http://schemas.microsoft.com/office/drawing/2014/main" id="{7980DE84-E4A8-4C12-97F1-AADA86FFB006}"/>
                 </a:ext>
                 <a:ext uri="{C183D7F6-B498-43B3-948B-1728B52AA6E4}">
-                  <adec:decorative xmlns:adec="http://schemas.microsoft.com/office/drawing/2017/decorative" val="1"/>
+                  <adec:decorative xmlns:adec="http://schemas.microsoft.com/office/drawing/2017/decorative" xmlns="" val="1"/>
                 </a:ext>
               </a:extLst>
             </p:cNvPr>
@@ -9317,7 +9371,7 @@
                 <a16:creationId xmlns:a16="http://schemas.microsoft.com/office/drawing/2014/main" id="{7A4FCEB1-CD0B-4966-8A9D-F458E4F79B0B}"/>
               </a:ext>
               <a:ext uri="{C183D7F6-B498-43B3-948B-1728B52AA6E4}">
-                <adec:decorative xmlns:adec="http://schemas.microsoft.com/office/drawing/2017/decorative" val="1"/>
+                <adec:decorative xmlns:adec="http://schemas.microsoft.com/office/drawing/2017/decorative" xmlns="" val="1"/>
               </a:ext>
             </a:extLst>
           </p:cNvPr>
@@ -9396,7 +9450,7 @@
                 <a16:creationId xmlns:a16="http://schemas.microsoft.com/office/drawing/2014/main" id="{D3866B94-A099-49F6-A378-974CED7F572C}"/>
               </a:ext>
               <a:ext uri="{C183D7F6-B498-43B3-948B-1728B52AA6E4}">
-                <adec:decorative xmlns:adec="http://schemas.microsoft.com/office/drawing/2017/decorative" val="1"/>
+                <adec:decorative xmlns:adec="http://schemas.microsoft.com/office/drawing/2017/decorative" xmlns="" val="1"/>
               </a:ext>
             </a:extLst>
           </p:cNvPr>
@@ -9427,7 +9481,7 @@
                   <a16:creationId xmlns:a16="http://schemas.microsoft.com/office/drawing/2014/main" id="{5103C908-3FF0-4A95-851C-DF3C650FFB89}"/>
                 </a:ext>
                 <a:ext uri="{C183D7F6-B498-43B3-948B-1728B52AA6E4}">
-                  <adec:decorative xmlns:adec="http://schemas.microsoft.com/office/drawing/2017/decorative" val="1"/>
+                  <adec:decorative xmlns:adec="http://schemas.microsoft.com/office/drawing/2017/decorative" xmlns="" val="1"/>
                 </a:ext>
               </a:extLst>
             </p:cNvPr>
@@ -9496,7 +9550,7 @@
                   <a16:creationId xmlns:a16="http://schemas.microsoft.com/office/drawing/2014/main" id="{6AF400D3-D15B-4146-82E6-B2FC1194FED0}"/>
                 </a:ext>
                 <a:ext uri="{C183D7F6-B498-43B3-948B-1728B52AA6E4}">
-                  <adec:decorative xmlns:adec="http://schemas.microsoft.com/office/drawing/2017/decorative" val="1"/>
+                  <adec:decorative xmlns:adec="http://schemas.microsoft.com/office/drawing/2017/decorative" xmlns="" val="1"/>
                 </a:ext>
               </a:extLst>
             </p:cNvPr>
@@ -9565,7 +9619,7 @@
                   <a16:creationId xmlns:a16="http://schemas.microsoft.com/office/drawing/2014/main" id="{602F76C8-7CAD-4B72-BD0D-072D2AFA0CDA}"/>
                 </a:ext>
                 <a:ext uri="{C183D7F6-B498-43B3-948B-1728B52AA6E4}">
-                  <adec:decorative xmlns:adec="http://schemas.microsoft.com/office/drawing/2017/decorative" val="1"/>
+                  <adec:decorative xmlns:adec="http://schemas.microsoft.com/office/drawing/2017/decorative" xmlns="" val="1"/>
                 </a:ext>
               </a:extLst>
             </p:cNvPr>
@@ -9634,7 +9688,7 @@
                   <a16:creationId xmlns:a16="http://schemas.microsoft.com/office/drawing/2014/main" id="{15CEBAD8-9DE5-4790-9CD4-C384EB371D5A}"/>
                 </a:ext>
                 <a:ext uri="{C183D7F6-B498-43B3-948B-1728B52AA6E4}">
-                  <adec:decorative xmlns:adec="http://schemas.microsoft.com/office/drawing/2017/decorative" val="1"/>
+                  <adec:decorative xmlns:adec="http://schemas.microsoft.com/office/drawing/2017/decorative" xmlns="" val="1"/>
                 </a:ext>
               </a:extLst>
             </p:cNvPr>
@@ -9704,7 +9758,7 @@
                 <a16:creationId xmlns:a16="http://schemas.microsoft.com/office/drawing/2014/main" id="{D3B7B9BA-215A-4923-954F-3DAE9523ABEB}"/>
               </a:ext>
               <a:ext uri="{C183D7F6-B498-43B3-948B-1728B52AA6E4}">
-                <adec:decorative xmlns:adec="http://schemas.microsoft.com/office/drawing/2017/decorative" val="1"/>
+                <adec:decorative xmlns:adec="http://schemas.microsoft.com/office/drawing/2017/decorative" xmlns="" val="1"/>
               </a:ext>
             </a:extLst>
           </p:cNvPr>
@@ -9783,7 +9837,7 @@
                 <a16:creationId xmlns:a16="http://schemas.microsoft.com/office/drawing/2014/main" id="{34013081-B23F-45CB-A45B-562B629ADB7B}"/>
               </a:ext>
               <a:ext uri="{C183D7F6-B498-43B3-948B-1728B52AA6E4}">
-                <adec:decorative xmlns:adec="http://schemas.microsoft.com/office/drawing/2017/decorative" val="1"/>
+                <adec:decorative xmlns:adec="http://schemas.microsoft.com/office/drawing/2017/decorative" xmlns="" val="1"/>
               </a:ext>
             </a:extLst>
           </p:cNvPr>
@@ -9814,7 +9868,7 @@
                   <a16:creationId xmlns:a16="http://schemas.microsoft.com/office/drawing/2014/main" id="{4B8B11FB-E867-4638-B75F-B4B7DBDDB723}"/>
                 </a:ext>
                 <a:ext uri="{C183D7F6-B498-43B3-948B-1728B52AA6E4}">
-                  <adec:decorative xmlns:adec="http://schemas.microsoft.com/office/drawing/2017/decorative" val="1"/>
+                  <adec:decorative xmlns:adec="http://schemas.microsoft.com/office/drawing/2017/decorative" xmlns="" val="1"/>
                 </a:ext>
               </a:extLst>
             </p:cNvPr>
@@ -9883,7 +9937,7 @@
                   <a16:creationId xmlns:a16="http://schemas.microsoft.com/office/drawing/2014/main" id="{ABC84FC8-9600-4AE5-9E77-38E2363A3004}"/>
                 </a:ext>
                 <a:ext uri="{C183D7F6-B498-43B3-948B-1728B52AA6E4}">
-                  <adec:decorative xmlns:adec="http://schemas.microsoft.com/office/drawing/2017/decorative" val="1"/>
+                  <adec:decorative xmlns:adec="http://schemas.microsoft.com/office/drawing/2017/decorative" xmlns="" val="1"/>
                 </a:ext>
               </a:extLst>
             </p:cNvPr>
@@ -9952,7 +10006,7 @@
                   <a16:creationId xmlns:a16="http://schemas.microsoft.com/office/drawing/2014/main" id="{3514F95D-50D5-4B76-B347-91D1D76F8F79}"/>
                 </a:ext>
                 <a:ext uri="{C183D7F6-B498-43B3-948B-1728B52AA6E4}">
-                  <adec:decorative xmlns:adec="http://schemas.microsoft.com/office/drawing/2017/decorative" val="1"/>
+                  <adec:decorative xmlns:adec="http://schemas.microsoft.com/office/drawing/2017/decorative" xmlns="" val="1"/>
                 </a:ext>
               </a:extLst>
             </p:cNvPr>
@@ -10021,7 +10075,7 @@
                   <a16:creationId xmlns:a16="http://schemas.microsoft.com/office/drawing/2014/main" id="{885455D4-020C-4462-8A90-3B6434A50809}"/>
                 </a:ext>
                 <a:ext uri="{C183D7F6-B498-43B3-948B-1728B52AA6E4}">
-                  <adec:decorative xmlns:adec="http://schemas.microsoft.com/office/drawing/2017/decorative" val="1"/>
+                  <adec:decorative xmlns:adec="http://schemas.microsoft.com/office/drawing/2017/decorative" xmlns="" val="1"/>
                 </a:ext>
               </a:extLst>
             </p:cNvPr>
@@ -10196,7 +10250,7 @@
                 <a16:creationId xmlns:a16="http://schemas.microsoft.com/office/drawing/2014/main" id="{3CFEB548-CACC-4915-BA3A-ECFAD4BE055B}"/>
               </a:ext>
               <a:ext uri="{C183D7F6-B498-43B3-948B-1728B52AA6E4}">
-                <adec:decorative xmlns:adec="http://schemas.microsoft.com/office/drawing/2017/decorative" val="1"/>
+                <adec:decorative xmlns:adec="http://schemas.microsoft.com/office/drawing/2017/decorative" xmlns="" val="1"/>
               </a:ext>
             </a:extLst>
           </p:cNvPr>
@@ -10256,7 +10310,7 @@
                 <a16:creationId xmlns:a16="http://schemas.microsoft.com/office/drawing/2014/main" id="{337DD617-02C2-4388-A86E-BAB7BD2847FF}"/>
               </a:ext>
               <a:ext uri="{C183D7F6-B498-43B3-948B-1728B52AA6E4}">
-                <adec:decorative xmlns:adec="http://schemas.microsoft.com/office/drawing/2017/decorative" val="1"/>
+                <adec:decorative xmlns:adec="http://schemas.microsoft.com/office/drawing/2017/decorative" xmlns="" val="1"/>
               </a:ext>
             </a:extLst>
           </p:cNvPr>
@@ -10321,7 +10375,7 @@
                 <a16:creationId xmlns:a16="http://schemas.microsoft.com/office/drawing/2014/main" id="{6971532D-ED15-4EA1-8D74-8B9D49117B1E}"/>
               </a:ext>
               <a:ext uri="{C183D7F6-B498-43B3-948B-1728B52AA6E4}">
-                <adec:decorative xmlns:adec="http://schemas.microsoft.com/office/drawing/2017/decorative" val="1"/>
+                <adec:decorative xmlns:adec="http://schemas.microsoft.com/office/drawing/2017/decorative" xmlns="" val="1"/>
               </a:ext>
             </a:extLst>
           </p:cNvPr>
@@ -10352,7 +10406,7 @@
                   <a16:creationId xmlns:a16="http://schemas.microsoft.com/office/drawing/2014/main" id="{53E0E949-6174-47F4-871C-39B2BE7B4B04}"/>
                 </a:ext>
                 <a:ext uri="{C183D7F6-B498-43B3-948B-1728B52AA6E4}">
-                  <adec:decorative xmlns:adec="http://schemas.microsoft.com/office/drawing/2017/decorative" val="1"/>
+                  <adec:decorative xmlns:adec="http://schemas.microsoft.com/office/drawing/2017/decorative" xmlns="" val="1"/>
                 </a:ext>
               </a:extLst>
             </p:cNvPr>
@@ -10409,7 +10463,7 @@
                   <a16:creationId xmlns:a16="http://schemas.microsoft.com/office/drawing/2014/main" id="{CA81FA79-0462-498C-A7A0-4F97CB9BD068}"/>
                 </a:ext>
                 <a:ext uri="{C183D7F6-B498-43B3-948B-1728B52AA6E4}">
-                  <adec:decorative xmlns:adec="http://schemas.microsoft.com/office/drawing/2017/decorative" val="1"/>
+                  <adec:decorative xmlns:adec="http://schemas.microsoft.com/office/drawing/2017/decorative" xmlns="" val="1"/>
                 </a:ext>
               </a:extLst>
             </p:cNvPr>
@@ -10466,7 +10520,7 @@
                   <a16:creationId xmlns:a16="http://schemas.microsoft.com/office/drawing/2014/main" id="{9B13F096-ACB3-4289-ADE9-7BCF5727CEFA}"/>
                 </a:ext>
                 <a:ext uri="{C183D7F6-B498-43B3-948B-1728B52AA6E4}">
-                  <adec:decorative xmlns:adec="http://schemas.microsoft.com/office/drawing/2017/decorative" val="1"/>
+                  <adec:decorative xmlns:adec="http://schemas.microsoft.com/office/drawing/2017/decorative" xmlns="" val="1"/>
                 </a:ext>
               </a:extLst>
             </p:cNvPr>
@@ -10523,7 +10577,7 @@
                   <a16:creationId xmlns:a16="http://schemas.microsoft.com/office/drawing/2014/main" id="{442D1F89-7331-4DB6-9053-DE817E604F1F}"/>
                 </a:ext>
                 <a:ext uri="{C183D7F6-B498-43B3-948B-1728B52AA6E4}">
-                  <adec:decorative xmlns:adec="http://schemas.microsoft.com/office/drawing/2017/decorative" val="1"/>
+                  <adec:decorative xmlns:adec="http://schemas.microsoft.com/office/drawing/2017/decorative" xmlns="" val="1"/>
                 </a:ext>
               </a:extLst>
             </p:cNvPr>
@@ -10581,7 +10635,7 @@
                 <a16:creationId xmlns:a16="http://schemas.microsoft.com/office/drawing/2014/main" id="{4527D98C-AF53-420B-A7B6-DD5AA7D5339E}"/>
               </a:ext>
               <a:ext uri="{C183D7F6-B498-43B3-948B-1728B52AA6E4}">
-                <adec:decorative xmlns:adec="http://schemas.microsoft.com/office/drawing/2017/decorative" val="1"/>
+                <adec:decorative xmlns:adec="http://schemas.microsoft.com/office/drawing/2017/decorative" xmlns="" val="1"/>
               </a:ext>
             </a:extLst>
           </p:cNvPr>
@@ -10612,7 +10666,7 @@
                   <a16:creationId xmlns:a16="http://schemas.microsoft.com/office/drawing/2014/main" id="{9F0B76EE-9601-45D1-815F-6B076D42F091}"/>
                 </a:ext>
                 <a:ext uri="{C183D7F6-B498-43B3-948B-1728B52AA6E4}">
-                  <adec:decorative xmlns:adec="http://schemas.microsoft.com/office/drawing/2017/decorative" val="1"/>
+                  <adec:decorative xmlns:adec="http://schemas.microsoft.com/office/drawing/2017/decorative" xmlns="" val="1"/>
                 </a:ext>
               </a:extLst>
             </p:cNvPr>
@@ -10689,7 +10743,7 @@
                   <a16:creationId xmlns:a16="http://schemas.microsoft.com/office/drawing/2014/main" id="{1F5FB023-5222-4B9E-B6D1-A5040E4CEBE1}"/>
                 </a:ext>
                 <a:ext uri="{C183D7F6-B498-43B3-948B-1728B52AA6E4}">
-                  <adec:decorative xmlns:adec="http://schemas.microsoft.com/office/drawing/2017/decorative" val="1"/>
+                  <adec:decorative xmlns:adec="http://schemas.microsoft.com/office/drawing/2017/decorative" xmlns="" val="1"/>
                 </a:ext>
               </a:extLst>
             </p:cNvPr>
@@ -10766,7 +10820,7 @@
                   <a16:creationId xmlns:a16="http://schemas.microsoft.com/office/drawing/2014/main" id="{EAAEED21-38DA-46C2-93A3-F597C8761F21}"/>
                 </a:ext>
                 <a:ext uri="{C183D7F6-B498-43B3-948B-1728B52AA6E4}">
-                  <adec:decorative xmlns:adec="http://schemas.microsoft.com/office/drawing/2017/decorative" val="1"/>
+                  <adec:decorative xmlns:adec="http://schemas.microsoft.com/office/drawing/2017/decorative" xmlns="" val="1"/>
                 </a:ext>
               </a:extLst>
             </p:cNvPr>
@@ -10841,7 +10895,7 @@
                   <a16:creationId xmlns:a16="http://schemas.microsoft.com/office/drawing/2014/main" id="{17EFB714-3172-4F11-BA4B-04073494A7F5}"/>
                 </a:ext>
                 <a:ext uri="{C183D7F6-B498-43B3-948B-1728B52AA6E4}">
-                  <adec:decorative xmlns:adec="http://schemas.microsoft.com/office/drawing/2017/decorative" val="1"/>
+                  <adec:decorative xmlns:adec="http://schemas.microsoft.com/office/drawing/2017/decorative" xmlns="" val="1"/>
                 </a:ext>
               </a:extLst>
             </p:cNvPr>
@@ -10916,7 +10970,7 @@
                   <a16:creationId xmlns:a16="http://schemas.microsoft.com/office/drawing/2014/main" id="{8783C632-F1E2-40EE-AFA0-EF8D52D67779}"/>
                 </a:ext>
                 <a:ext uri="{C183D7F6-B498-43B3-948B-1728B52AA6E4}">
-                  <adec:decorative xmlns:adec="http://schemas.microsoft.com/office/drawing/2017/decorative" val="1"/>
+                  <adec:decorative xmlns:adec="http://schemas.microsoft.com/office/drawing/2017/decorative" xmlns="" val="1"/>
                 </a:ext>
               </a:extLst>
             </p:cNvPr>
@@ -10993,7 +11047,7 @@
                   <a16:creationId xmlns:a16="http://schemas.microsoft.com/office/drawing/2014/main" id="{7980DE84-E4A8-4C12-97F1-AADA86FFB006}"/>
                 </a:ext>
                 <a:ext uri="{C183D7F6-B498-43B3-948B-1728B52AA6E4}">
-                  <adec:decorative xmlns:adec="http://schemas.microsoft.com/office/drawing/2017/decorative" val="1"/>
+                  <adec:decorative xmlns:adec="http://schemas.microsoft.com/office/drawing/2017/decorative" xmlns="" val="1"/>
                 </a:ext>
               </a:extLst>
             </p:cNvPr>
@@ -11070,7 +11124,7 @@
                 <a16:creationId xmlns:a16="http://schemas.microsoft.com/office/drawing/2014/main" id="{7A4FCEB1-CD0B-4966-8A9D-F458E4F79B0B}"/>
               </a:ext>
               <a:ext uri="{C183D7F6-B498-43B3-948B-1728B52AA6E4}">
-                <adec:decorative xmlns:adec="http://schemas.microsoft.com/office/drawing/2017/decorative" val="1"/>
+                <adec:decorative xmlns:adec="http://schemas.microsoft.com/office/drawing/2017/decorative" xmlns="" val="1"/>
               </a:ext>
             </a:extLst>
           </p:cNvPr>
@@ -11149,7 +11203,7 @@
                 <a16:creationId xmlns:a16="http://schemas.microsoft.com/office/drawing/2014/main" id="{D3866B94-A099-49F6-A378-974CED7F572C}"/>
               </a:ext>
               <a:ext uri="{C183D7F6-B498-43B3-948B-1728B52AA6E4}">
-                <adec:decorative xmlns:adec="http://schemas.microsoft.com/office/drawing/2017/decorative" val="1"/>
+                <adec:decorative xmlns:adec="http://schemas.microsoft.com/office/drawing/2017/decorative" xmlns="" val="1"/>
               </a:ext>
             </a:extLst>
           </p:cNvPr>
@@ -11180,7 +11234,7 @@
                   <a16:creationId xmlns:a16="http://schemas.microsoft.com/office/drawing/2014/main" id="{5103C908-3FF0-4A95-851C-DF3C650FFB89}"/>
                 </a:ext>
                 <a:ext uri="{C183D7F6-B498-43B3-948B-1728B52AA6E4}">
-                  <adec:decorative xmlns:adec="http://schemas.microsoft.com/office/drawing/2017/decorative" val="1"/>
+                  <adec:decorative xmlns:adec="http://schemas.microsoft.com/office/drawing/2017/decorative" xmlns="" val="1"/>
                 </a:ext>
               </a:extLst>
             </p:cNvPr>
@@ -11249,7 +11303,7 @@
                   <a16:creationId xmlns:a16="http://schemas.microsoft.com/office/drawing/2014/main" id="{6AF400D3-D15B-4146-82E6-B2FC1194FED0}"/>
                 </a:ext>
                 <a:ext uri="{C183D7F6-B498-43B3-948B-1728B52AA6E4}">
-                  <adec:decorative xmlns:adec="http://schemas.microsoft.com/office/drawing/2017/decorative" val="1"/>
+                  <adec:decorative xmlns:adec="http://schemas.microsoft.com/office/drawing/2017/decorative" xmlns="" val="1"/>
                 </a:ext>
               </a:extLst>
             </p:cNvPr>
@@ -11318,7 +11372,7 @@
                   <a16:creationId xmlns:a16="http://schemas.microsoft.com/office/drawing/2014/main" id="{602F76C8-7CAD-4B72-BD0D-072D2AFA0CDA}"/>
                 </a:ext>
                 <a:ext uri="{C183D7F6-B498-43B3-948B-1728B52AA6E4}">
-                  <adec:decorative xmlns:adec="http://schemas.microsoft.com/office/drawing/2017/decorative" val="1"/>
+                  <adec:decorative xmlns:adec="http://schemas.microsoft.com/office/drawing/2017/decorative" xmlns="" val="1"/>
                 </a:ext>
               </a:extLst>
             </p:cNvPr>
@@ -11387,7 +11441,7 @@
                   <a16:creationId xmlns:a16="http://schemas.microsoft.com/office/drawing/2014/main" id="{15CEBAD8-9DE5-4790-9CD4-C384EB371D5A}"/>
                 </a:ext>
                 <a:ext uri="{C183D7F6-B498-43B3-948B-1728B52AA6E4}">
-                  <adec:decorative xmlns:adec="http://schemas.microsoft.com/office/drawing/2017/decorative" val="1"/>
+                  <adec:decorative xmlns:adec="http://schemas.microsoft.com/office/drawing/2017/decorative" xmlns="" val="1"/>
                 </a:ext>
               </a:extLst>
             </p:cNvPr>
@@ -11457,7 +11511,7 @@
                 <a16:creationId xmlns:a16="http://schemas.microsoft.com/office/drawing/2014/main" id="{D3B7B9BA-215A-4923-954F-3DAE9523ABEB}"/>
               </a:ext>
               <a:ext uri="{C183D7F6-B498-43B3-948B-1728B52AA6E4}">
-                <adec:decorative xmlns:adec="http://schemas.microsoft.com/office/drawing/2017/decorative" val="1"/>
+                <adec:decorative xmlns:adec="http://schemas.microsoft.com/office/drawing/2017/decorative" xmlns="" val="1"/>
               </a:ext>
             </a:extLst>
           </p:cNvPr>
@@ -11536,7 +11590,7 @@
                 <a16:creationId xmlns:a16="http://schemas.microsoft.com/office/drawing/2014/main" id="{34013081-B23F-45CB-A45B-562B629ADB7B}"/>
               </a:ext>
               <a:ext uri="{C183D7F6-B498-43B3-948B-1728B52AA6E4}">
-                <adec:decorative xmlns:adec="http://schemas.microsoft.com/office/drawing/2017/decorative" val="1"/>
+                <adec:decorative xmlns:adec="http://schemas.microsoft.com/office/drawing/2017/decorative" xmlns="" val="1"/>
               </a:ext>
             </a:extLst>
           </p:cNvPr>
@@ -11567,7 +11621,7 @@
                   <a16:creationId xmlns:a16="http://schemas.microsoft.com/office/drawing/2014/main" id="{4B8B11FB-E867-4638-B75F-B4B7DBDDB723}"/>
                 </a:ext>
                 <a:ext uri="{C183D7F6-B498-43B3-948B-1728B52AA6E4}">
-                  <adec:decorative xmlns:adec="http://schemas.microsoft.com/office/drawing/2017/decorative" val="1"/>
+                  <adec:decorative xmlns:adec="http://schemas.microsoft.com/office/drawing/2017/decorative" xmlns="" val="1"/>
                 </a:ext>
               </a:extLst>
             </p:cNvPr>
@@ -11636,7 +11690,7 @@
                   <a16:creationId xmlns:a16="http://schemas.microsoft.com/office/drawing/2014/main" id="{ABC84FC8-9600-4AE5-9E77-38E2363A3004}"/>
                 </a:ext>
                 <a:ext uri="{C183D7F6-B498-43B3-948B-1728B52AA6E4}">
-                  <adec:decorative xmlns:adec="http://schemas.microsoft.com/office/drawing/2017/decorative" val="1"/>
+                  <adec:decorative xmlns:adec="http://schemas.microsoft.com/office/drawing/2017/decorative" xmlns="" val="1"/>
                 </a:ext>
               </a:extLst>
             </p:cNvPr>
@@ -11705,7 +11759,7 @@
                   <a16:creationId xmlns:a16="http://schemas.microsoft.com/office/drawing/2014/main" id="{3514F95D-50D5-4B76-B347-91D1D76F8F79}"/>
                 </a:ext>
                 <a:ext uri="{C183D7F6-B498-43B3-948B-1728B52AA6E4}">
-                  <adec:decorative xmlns:adec="http://schemas.microsoft.com/office/drawing/2017/decorative" val="1"/>
+                  <adec:decorative xmlns:adec="http://schemas.microsoft.com/office/drawing/2017/decorative" xmlns="" val="1"/>
                 </a:ext>
               </a:extLst>
             </p:cNvPr>
@@ -11774,7 +11828,7 @@
                   <a16:creationId xmlns:a16="http://schemas.microsoft.com/office/drawing/2014/main" id="{885455D4-020C-4462-8A90-3B6434A50809}"/>
                 </a:ext>
                 <a:ext uri="{C183D7F6-B498-43B3-948B-1728B52AA6E4}">
-                  <adec:decorative xmlns:adec="http://schemas.microsoft.com/office/drawing/2017/decorative" val="1"/>
+                  <adec:decorative xmlns:adec="http://schemas.microsoft.com/office/drawing/2017/decorative" xmlns="" val="1"/>
                 </a:ext>
               </a:extLst>
             </p:cNvPr>
@@ -12401,7 +12455,7 @@
                 <a16:creationId xmlns:a16="http://schemas.microsoft.com/office/drawing/2014/main" id="{B497CCB5-5FC2-473C-AFCC-2430CEF1DF71}"/>
               </a:ext>
               <a:ext uri="{C183D7F6-B498-43B3-948B-1728B52AA6E4}">
-                <adec:decorative xmlns:adec="http://schemas.microsoft.com/office/drawing/2017/decorative" val="1"/>
+                <adec:decorative xmlns:adec="http://schemas.microsoft.com/office/drawing/2017/decorative" xmlns="" val="1"/>
               </a:ext>
             </a:extLst>
           </p:cNvPr>
@@ -12464,7 +12518,7 @@
                 <a16:creationId xmlns:a16="http://schemas.microsoft.com/office/drawing/2014/main" id="{599C8C75-BFDF-44E7-A028-EEB5EDD58817}"/>
               </a:ext>
               <a:ext uri="{C183D7F6-B498-43B3-948B-1728B52AA6E4}">
-                <adec:decorative xmlns:adec="http://schemas.microsoft.com/office/drawing/2017/decorative" val="1"/>
+                <adec:decorative xmlns:adec="http://schemas.microsoft.com/office/drawing/2017/decorative" xmlns="" val="1"/>
               </a:ext>
             </a:extLst>
           </p:cNvPr>
@@ -12861,7 +12915,7 @@
                 <a16:creationId xmlns:a16="http://schemas.microsoft.com/office/drawing/2014/main" id="{D7A453D2-15D8-4403-815F-291FA16340D9}"/>
               </a:ext>
               <a:ext uri="{C183D7F6-B498-43B3-948B-1728B52AA6E4}">
-                <adec:decorative xmlns:adec="http://schemas.microsoft.com/office/drawing/2017/decorative" val="1"/>
+                <adec:decorative xmlns:adec="http://schemas.microsoft.com/office/drawing/2017/decorative" xmlns="" val="1"/>
               </a:ext>
             </a:extLst>
           </p:cNvPr>
@@ -12924,7 +12978,7 @@
                 <a16:creationId xmlns:a16="http://schemas.microsoft.com/office/drawing/2014/main" id="{8161EA6B-09CA-445B-AB0D-8DF76FA92DEF}"/>
               </a:ext>
               <a:ext uri="{C183D7F6-B498-43B3-948B-1728B52AA6E4}">
-                <adec:decorative xmlns:adec="http://schemas.microsoft.com/office/drawing/2017/decorative" val="1"/>
+                <adec:decorative xmlns:adec="http://schemas.microsoft.com/office/drawing/2017/decorative" xmlns="" val="1"/>
               </a:ext>
             </a:extLst>
           </p:cNvPr>
@@ -12989,7 +13043,7 @@
                 <a16:creationId xmlns:a16="http://schemas.microsoft.com/office/drawing/2014/main" id="{74E65F23-789E-4CB9-B34F-46A85E25D667}"/>
               </a:ext>
               <a:ext uri="{C183D7F6-B498-43B3-948B-1728B52AA6E4}">
-                <adec:decorative xmlns:adec="http://schemas.microsoft.com/office/drawing/2017/decorative" val="1"/>
+                <adec:decorative xmlns:adec="http://schemas.microsoft.com/office/drawing/2017/decorative" xmlns="" val="1"/>
               </a:ext>
             </a:extLst>
           </p:cNvPr>
@@ -13020,7 +13074,7 @@
                   <a16:creationId xmlns:a16="http://schemas.microsoft.com/office/drawing/2014/main" id="{1CA207F7-3B67-4EA2-8EC5-1260B55A07F4}"/>
                 </a:ext>
                 <a:ext uri="{C183D7F6-B498-43B3-948B-1728B52AA6E4}">
-                  <adec:decorative xmlns:adec="http://schemas.microsoft.com/office/drawing/2017/decorative" val="1"/>
+                  <adec:decorative xmlns:adec="http://schemas.microsoft.com/office/drawing/2017/decorative" xmlns="" val="1"/>
                 </a:ext>
               </a:extLst>
             </p:cNvPr>
@@ -13097,7 +13151,7 @@
                   <a16:creationId xmlns:a16="http://schemas.microsoft.com/office/drawing/2014/main" id="{AD4CC450-51C3-4A41-B2B1-68A15D57C5E6}"/>
                 </a:ext>
                 <a:ext uri="{C183D7F6-B498-43B3-948B-1728B52AA6E4}">
-                  <adec:decorative xmlns:adec="http://schemas.microsoft.com/office/drawing/2017/decorative" val="1"/>
+                  <adec:decorative xmlns:adec="http://schemas.microsoft.com/office/drawing/2017/decorative" xmlns="" val="1"/>
                 </a:ext>
               </a:extLst>
             </p:cNvPr>
@@ -13174,7 +13228,7 @@
                   <a16:creationId xmlns:a16="http://schemas.microsoft.com/office/drawing/2014/main" id="{ED62506D-F8E8-4C55-B160-D4FE8985049B}"/>
                 </a:ext>
                 <a:ext uri="{C183D7F6-B498-43B3-948B-1728B52AA6E4}">
-                  <adec:decorative xmlns:adec="http://schemas.microsoft.com/office/drawing/2017/decorative" val="1"/>
+                  <adec:decorative xmlns:adec="http://schemas.microsoft.com/office/drawing/2017/decorative" xmlns="" val="1"/>
                 </a:ext>
               </a:extLst>
             </p:cNvPr>
@@ -13249,7 +13303,7 @@
                   <a16:creationId xmlns:a16="http://schemas.microsoft.com/office/drawing/2014/main" id="{E6004793-0083-43B9-81A2-20F71D2C7D95}"/>
                 </a:ext>
                 <a:ext uri="{C183D7F6-B498-43B3-948B-1728B52AA6E4}">
-                  <adec:decorative xmlns:adec="http://schemas.microsoft.com/office/drawing/2017/decorative" val="1"/>
+                  <adec:decorative xmlns:adec="http://schemas.microsoft.com/office/drawing/2017/decorative" xmlns="" val="1"/>
                 </a:ext>
               </a:extLst>
             </p:cNvPr>
@@ -13324,7 +13378,7 @@
                   <a16:creationId xmlns:a16="http://schemas.microsoft.com/office/drawing/2014/main" id="{53D192AA-AFCB-470F-B66A-18815C3525CD}"/>
                 </a:ext>
                 <a:ext uri="{C183D7F6-B498-43B3-948B-1728B52AA6E4}">
-                  <adec:decorative xmlns:adec="http://schemas.microsoft.com/office/drawing/2017/decorative" val="1"/>
+                  <adec:decorative xmlns:adec="http://schemas.microsoft.com/office/drawing/2017/decorative" xmlns="" val="1"/>
                 </a:ext>
               </a:extLst>
             </p:cNvPr>
@@ -13401,7 +13455,7 @@
                   <a16:creationId xmlns:a16="http://schemas.microsoft.com/office/drawing/2014/main" id="{9079B0CF-0B4C-42A9-9769-3AC0A34FACEF}"/>
                 </a:ext>
                 <a:ext uri="{C183D7F6-B498-43B3-948B-1728B52AA6E4}">
-                  <adec:decorative xmlns:adec="http://schemas.microsoft.com/office/drawing/2017/decorative" val="1"/>
+                  <adec:decorative xmlns:adec="http://schemas.microsoft.com/office/drawing/2017/decorative" xmlns="" val="1"/>
                 </a:ext>
               </a:extLst>
             </p:cNvPr>
@@ -13571,7 +13625,7 @@
                 <a16:creationId xmlns:a16="http://schemas.microsoft.com/office/drawing/2014/main" id="{B8114C98-A349-4111-A123-E8EAB86ABE30}"/>
               </a:ext>
               <a:ext uri="{C183D7F6-B498-43B3-948B-1728B52AA6E4}">
-                <adec:decorative xmlns:adec="http://schemas.microsoft.com/office/drawing/2017/decorative" val="1"/>
+                <adec:decorative xmlns:adec="http://schemas.microsoft.com/office/drawing/2017/decorative" xmlns="" val="1"/>
               </a:ext>
             </a:extLst>
           </p:cNvPr>
@@ -13650,7 +13704,7 @@
                 <a16:creationId xmlns:a16="http://schemas.microsoft.com/office/drawing/2014/main" id="{670FB431-AE18-414D-92F4-1D12D1991152}"/>
               </a:ext>
               <a:ext uri="{C183D7F6-B498-43B3-948B-1728B52AA6E4}">
-                <adec:decorative xmlns:adec="http://schemas.microsoft.com/office/drawing/2017/decorative" val="1"/>
+                <adec:decorative xmlns:adec="http://schemas.microsoft.com/office/drawing/2017/decorative" xmlns="" val="1"/>
               </a:ext>
             </a:extLst>
           </p:cNvPr>
@@ -13681,7 +13735,7 @@
                   <a16:creationId xmlns:a16="http://schemas.microsoft.com/office/drawing/2014/main" id="{24467063-D74E-4D42-8790-B9F6D69584BE}"/>
                 </a:ext>
                 <a:ext uri="{C183D7F6-B498-43B3-948B-1728B52AA6E4}">
-                  <adec:decorative xmlns:adec="http://schemas.microsoft.com/office/drawing/2017/decorative" val="1"/>
+                  <adec:decorative xmlns:adec="http://schemas.microsoft.com/office/drawing/2017/decorative" xmlns="" val="1"/>
                 </a:ext>
               </a:extLst>
             </p:cNvPr>
@@ -13750,7 +13804,7 @@
                   <a16:creationId xmlns:a16="http://schemas.microsoft.com/office/drawing/2014/main" id="{A1D19BAC-1681-47BC-AAF5-92FAFFF6F4CE}"/>
                 </a:ext>
                 <a:ext uri="{C183D7F6-B498-43B3-948B-1728B52AA6E4}">
-                  <adec:decorative xmlns:adec="http://schemas.microsoft.com/office/drawing/2017/decorative" val="1"/>
+                  <adec:decorative xmlns:adec="http://schemas.microsoft.com/office/drawing/2017/decorative" xmlns="" val="1"/>
                 </a:ext>
               </a:extLst>
             </p:cNvPr>
@@ -13819,7 +13873,7 @@
                   <a16:creationId xmlns:a16="http://schemas.microsoft.com/office/drawing/2014/main" id="{94347C2B-E846-452C-97AA-7E254FC1CE8F}"/>
                 </a:ext>
                 <a:ext uri="{C183D7F6-B498-43B3-948B-1728B52AA6E4}">
-                  <adec:decorative xmlns:adec="http://schemas.microsoft.com/office/drawing/2017/decorative" val="1"/>
+                  <adec:decorative xmlns:adec="http://schemas.microsoft.com/office/drawing/2017/decorative" xmlns="" val="1"/>
                 </a:ext>
               </a:extLst>
             </p:cNvPr>
@@ -13888,7 +13942,7 @@
                   <a16:creationId xmlns:a16="http://schemas.microsoft.com/office/drawing/2014/main" id="{10EA2B35-7959-4C2A-84AA-FF5D94FEDE90}"/>
                 </a:ext>
                 <a:ext uri="{C183D7F6-B498-43B3-948B-1728B52AA6E4}">
-                  <adec:decorative xmlns:adec="http://schemas.microsoft.com/office/drawing/2017/decorative" val="1"/>
+                  <adec:decorative xmlns:adec="http://schemas.microsoft.com/office/drawing/2017/decorative" xmlns="" val="1"/>
                 </a:ext>
               </a:extLst>
             </p:cNvPr>
@@ -13958,7 +14012,7 @@
                 <a16:creationId xmlns:a16="http://schemas.microsoft.com/office/drawing/2014/main" id="{E2D3D3F2-ABBB-4453-B1C5-1BEBF7E4DD56}"/>
               </a:ext>
               <a:ext uri="{C183D7F6-B498-43B3-948B-1728B52AA6E4}">
-                <adec:decorative xmlns:adec="http://schemas.microsoft.com/office/drawing/2017/decorative" val="1"/>
+                <adec:decorative xmlns:adec="http://schemas.microsoft.com/office/drawing/2017/decorative" xmlns="" val="1"/>
               </a:ext>
             </a:extLst>
           </p:cNvPr>
@@ -14037,7 +14091,7 @@
                 <a16:creationId xmlns:a16="http://schemas.microsoft.com/office/drawing/2014/main" id="{8214E4A5-A0D2-42C4-8D14-D2A7E495F041}"/>
               </a:ext>
               <a:ext uri="{C183D7F6-B498-43B3-948B-1728B52AA6E4}">
-                <adec:decorative xmlns:adec="http://schemas.microsoft.com/office/drawing/2017/decorative" val="1"/>
+                <adec:decorative xmlns:adec="http://schemas.microsoft.com/office/drawing/2017/decorative" xmlns="" val="1"/>
               </a:ext>
             </a:extLst>
           </p:cNvPr>
@@ -14068,7 +14122,7 @@
                   <a16:creationId xmlns:a16="http://schemas.microsoft.com/office/drawing/2014/main" id="{7494D7A0-6B21-41E8-A7D3-0033BBB79156}"/>
                 </a:ext>
                 <a:ext uri="{C183D7F6-B498-43B3-948B-1728B52AA6E4}">
-                  <adec:decorative xmlns:adec="http://schemas.microsoft.com/office/drawing/2017/decorative" val="1"/>
+                  <adec:decorative xmlns:adec="http://schemas.microsoft.com/office/drawing/2017/decorative" xmlns="" val="1"/>
                 </a:ext>
               </a:extLst>
             </p:cNvPr>
@@ -14137,7 +14191,7 @@
                   <a16:creationId xmlns:a16="http://schemas.microsoft.com/office/drawing/2014/main" id="{1E141D7D-32B0-448E-A666-EA8703AFCF2C}"/>
                 </a:ext>
                 <a:ext uri="{C183D7F6-B498-43B3-948B-1728B52AA6E4}">
-                  <adec:decorative xmlns:adec="http://schemas.microsoft.com/office/drawing/2017/decorative" val="1"/>
+                  <adec:decorative xmlns:adec="http://schemas.microsoft.com/office/drawing/2017/decorative" xmlns="" val="1"/>
                 </a:ext>
               </a:extLst>
             </p:cNvPr>
@@ -14206,7 +14260,7 @@
                   <a16:creationId xmlns:a16="http://schemas.microsoft.com/office/drawing/2014/main" id="{8D87E268-6345-420F-8B97-B37ED04100EC}"/>
                 </a:ext>
                 <a:ext uri="{C183D7F6-B498-43B3-948B-1728B52AA6E4}">
-                  <adec:decorative xmlns:adec="http://schemas.microsoft.com/office/drawing/2017/decorative" val="1"/>
+                  <adec:decorative xmlns:adec="http://schemas.microsoft.com/office/drawing/2017/decorative" xmlns="" val="1"/>
                 </a:ext>
               </a:extLst>
             </p:cNvPr>
@@ -14275,7 +14329,7 @@
                   <a16:creationId xmlns:a16="http://schemas.microsoft.com/office/drawing/2014/main" id="{35E1622E-7FA6-4760-A2BF-A8105EBF7BB9}"/>
                 </a:ext>
                 <a:ext uri="{C183D7F6-B498-43B3-948B-1728B52AA6E4}">
-                  <adec:decorative xmlns:adec="http://schemas.microsoft.com/office/drawing/2017/decorative" val="1"/>
+                  <adec:decorative xmlns:adec="http://schemas.microsoft.com/office/drawing/2017/decorative" xmlns="" val="1"/>
                 </a:ext>
               </a:extLst>
             </p:cNvPr>
@@ -14391,7 +14445,7 @@
                 <a16:creationId xmlns:a16="http://schemas.microsoft.com/office/drawing/2014/main" id="{4043ADFC-DC2E-40D2-954D-4A13B908DA80}"/>
               </a:ext>
               <a:ext uri="{C183D7F6-B498-43B3-948B-1728B52AA6E4}">
-                <adec:decorative xmlns:adec="http://schemas.microsoft.com/office/drawing/2017/decorative" val="1"/>
+                <adec:decorative xmlns:adec="http://schemas.microsoft.com/office/drawing/2017/decorative" xmlns="" val="1"/>
               </a:ext>
             </a:extLst>
           </p:cNvPr>
@@ -14422,7 +14476,7 @@
                   <a16:creationId xmlns:a16="http://schemas.microsoft.com/office/drawing/2014/main" id="{C975E7D3-10F5-4E53-902F-9E79C98C22DE}"/>
                 </a:ext>
                 <a:ext uri="{C183D7F6-B498-43B3-948B-1728B52AA6E4}">
-                  <adec:decorative xmlns:adec="http://schemas.microsoft.com/office/drawing/2017/decorative" val="1"/>
+                  <adec:decorative xmlns:adec="http://schemas.microsoft.com/office/drawing/2017/decorative" xmlns="" val="1"/>
                 </a:ext>
               </a:extLst>
             </p:cNvPr>
@@ -14479,7 +14533,7 @@
                   <a16:creationId xmlns:a16="http://schemas.microsoft.com/office/drawing/2014/main" id="{BDC51AAB-5A3B-4730-B8AC-46C96AC0B692}"/>
                 </a:ext>
                 <a:ext uri="{C183D7F6-B498-43B3-948B-1728B52AA6E4}">
-                  <adec:decorative xmlns:adec="http://schemas.microsoft.com/office/drawing/2017/decorative" val="1"/>
+                  <adec:decorative xmlns:adec="http://schemas.microsoft.com/office/drawing/2017/decorative" xmlns="" val="1"/>
                 </a:ext>
               </a:extLst>
             </p:cNvPr>
@@ -14536,7 +14590,7 @@
                   <a16:creationId xmlns:a16="http://schemas.microsoft.com/office/drawing/2014/main" id="{03A6F2D9-1476-4E35-988D-D4CCB15C8D6D}"/>
                 </a:ext>
                 <a:ext uri="{C183D7F6-B498-43B3-948B-1728B52AA6E4}">
-                  <adec:decorative xmlns:adec="http://schemas.microsoft.com/office/drawing/2017/decorative" val="1"/>
+                  <adec:decorative xmlns:adec="http://schemas.microsoft.com/office/drawing/2017/decorative" xmlns="" val="1"/>
                 </a:ext>
               </a:extLst>
             </p:cNvPr>
@@ -14593,7 +14647,7 @@
                   <a16:creationId xmlns:a16="http://schemas.microsoft.com/office/drawing/2014/main" id="{CE17F678-D5C6-49BF-933D-1E65F69B3256}"/>
                 </a:ext>
                 <a:ext uri="{C183D7F6-B498-43B3-948B-1728B52AA6E4}">
-                  <adec:decorative xmlns:adec="http://schemas.microsoft.com/office/drawing/2017/decorative" val="1"/>
+                  <adec:decorative xmlns:adec="http://schemas.microsoft.com/office/drawing/2017/decorative" xmlns="" val="1"/>
                 </a:ext>
               </a:extLst>
             </p:cNvPr>
@@ -14689,7 +14743,7 @@
                 <a16:creationId xmlns:a16="http://schemas.microsoft.com/office/drawing/2014/main" id="{D7A453D2-15D8-4403-815F-291FA16340D9}"/>
               </a:ext>
               <a:ext uri="{C183D7F6-B498-43B3-948B-1728B52AA6E4}">
-                <adec:decorative xmlns:adec="http://schemas.microsoft.com/office/drawing/2017/decorative" val="1"/>
+                <adec:decorative xmlns:adec="http://schemas.microsoft.com/office/drawing/2017/decorative" xmlns="" val="1"/>
               </a:ext>
             </a:extLst>
           </p:cNvPr>
@@ -14752,7 +14806,7 @@
                 <a16:creationId xmlns:a16="http://schemas.microsoft.com/office/drawing/2014/main" id="{8161EA6B-09CA-445B-AB0D-8DF76FA92DEF}"/>
               </a:ext>
               <a:ext uri="{C183D7F6-B498-43B3-948B-1728B52AA6E4}">
-                <adec:decorative xmlns:adec="http://schemas.microsoft.com/office/drawing/2017/decorative" val="1"/>
+                <adec:decorative xmlns:adec="http://schemas.microsoft.com/office/drawing/2017/decorative" xmlns="" val="1"/>
               </a:ext>
             </a:extLst>
           </p:cNvPr>
@@ -14817,7 +14871,7 @@
                 <a16:creationId xmlns:a16="http://schemas.microsoft.com/office/drawing/2014/main" id="{B352BBB9-69A8-405C-9209-A9FE217AEDC4}"/>
               </a:ext>
               <a:ext uri="{C183D7F6-B498-43B3-948B-1728B52AA6E4}">
-                <adec:decorative xmlns:adec="http://schemas.microsoft.com/office/drawing/2017/decorative" val="1"/>
+                <adec:decorative xmlns:adec="http://schemas.microsoft.com/office/drawing/2017/decorative" xmlns="" val="1"/>
               </a:ext>
             </a:extLst>
           </p:cNvPr>
@@ -14848,7 +14902,7 @@
                   <a16:creationId xmlns:a16="http://schemas.microsoft.com/office/drawing/2014/main" id="{2BA8247A-9874-4F57-82F4-AEB016E661EA}"/>
                 </a:ext>
                 <a:ext uri="{C183D7F6-B498-43B3-948B-1728B52AA6E4}">
-                  <adec:decorative xmlns:adec="http://schemas.microsoft.com/office/drawing/2017/decorative" val="1"/>
+                  <adec:decorative xmlns:adec="http://schemas.microsoft.com/office/drawing/2017/decorative" xmlns="" val="1"/>
                 </a:ext>
               </a:extLst>
             </p:cNvPr>
@@ -14925,7 +14979,7 @@
                   <a16:creationId xmlns:a16="http://schemas.microsoft.com/office/drawing/2014/main" id="{A30C3CE4-8479-4B6E-9C21-D7B0CD89EF8E}"/>
                 </a:ext>
                 <a:ext uri="{C183D7F6-B498-43B3-948B-1728B52AA6E4}">
-                  <adec:decorative xmlns:adec="http://schemas.microsoft.com/office/drawing/2017/decorative" val="1"/>
+                  <adec:decorative xmlns:adec="http://schemas.microsoft.com/office/drawing/2017/decorative" xmlns="" val="1"/>
                 </a:ext>
               </a:extLst>
             </p:cNvPr>
@@ -15002,7 +15056,7 @@
                   <a16:creationId xmlns:a16="http://schemas.microsoft.com/office/drawing/2014/main" id="{F7BCD297-22FC-4ECD-95DC-8581D5E6B141}"/>
                 </a:ext>
                 <a:ext uri="{C183D7F6-B498-43B3-948B-1728B52AA6E4}">
-                  <adec:decorative xmlns:adec="http://schemas.microsoft.com/office/drawing/2017/decorative" val="1"/>
+                  <adec:decorative xmlns:adec="http://schemas.microsoft.com/office/drawing/2017/decorative" xmlns="" val="1"/>
                 </a:ext>
               </a:extLst>
             </p:cNvPr>
@@ -15077,7 +15131,7 @@
                   <a16:creationId xmlns:a16="http://schemas.microsoft.com/office/drawing/2014/main" id="{061A25F1-8873-4D98-B8D5-169EA0AC9212}"/>
                 </a:ext>
                 <a:ext uri="{C183D7F6-B498-43B3-948B-1728B52AA6E4}">
-                  <adec:decorative xmlns:adec="http://schemas.microsoft.com/office/drawing/2017/decorative" val="1"/>
+                  <adec:decorative xmlns:adec="http://schemas.microsoft.com/office/drawing/2017/decorative" xmlns="" val="1"/>
                 </a:ext>
               </a:extLst>
             </p:cNvPr>
@@ -15152,7 +15206,7 @@
                   <a16:creationId xmlns:a16="http://schemas.microsoft.com/office/drawing/2014/main" id="{CB7BCAD9-3EF1-4FCE-AFA0-BD2C545A735B}"/>
                 </a:ext>
                 <a:ext uri="{C183D7F6-B498-43B3-948B-1728B52AA6E4}">
-                  <adec:decorative xmlns:adec="http://schemas.microsoft.com/office/drawing/2017/decorative" val="1"/>
+                  <adec:decorative xmlns:adec="http://schemas.microsoft.com/office/drawing/2017/decorative" xmlns="" val="1"/>
                 </a:ext>
               </a:extLst>
             </p:cNvPr>
@@ -15229,7 +15283,7 @@
                   <a16:creationId xmlns:a16="http://schemas.microsoft.com/office/drawing/2014/main" id="{36649524-3638-4334-8ED6-539D10DF4BCC}"/>
                 </a:ext>
                 <a:ext uri="{C183D7F6-B498-43B3-948B-1728B52AA6E4}">
-                  <adec:decorative xmlns:adec="http://schemas.microsoft.com/office/drawing/2017/decorative" val="1"/>
+                  <adec:decorative xmlns:adec="http://schemas.microsoft.com/office/drawing/2017/decorative" xmlns="" val="1"/>
                 </a:ext>
               </a:extLst>
             </p:cNvPr>
@@ -15403,7 +15457,7 @@
                 <a16:creationId xmlns:a16="http://schemas.microsoft.com/office/drawing/2014/main" id="{B8114C98-A349-4111-A123-E8EAB86ABE30}"/>
               </a:ext>
               <a:ext uri="{C183D7F6-B498-43B3-948B-1728B52AA6E4}">
-                <adec:decorative xmlns:adec="http://schemas.microsoft.com/office/drawing/2017/decorative" val="1"/>
+                <adec:decorative xmlns:adec="http://schemas.microsoft.com/office/drawing/2017/decorative" xmlns="" val="1"/>
               </a:ext>
             </a:extLst>
           </p:cNvPr>
@@ -15482,7 +15536,7 @@
                 <a16:creationId xmlns:a16="http://schemas.microsoft.com/office/drawing/2014/main" id="{670FB431-AE18-414D-92F4-1D12D1991152}"/>
               </a:ext>
               <a:ext uri="{C183D7F6-B498-43B3-948B-1728B52AA6E4}">
-                <adec:decorative xmlns:adec="http://schemas.microsoft.com/office/drawing/2017/decorative" val="1"/>
+                <adec:decorative xmlns:adec="http://schemas.microsoft.com/office/drawing/2017/decorative" xmlns="" val="1"/>
               </a:ext>
             </a:extLst>
           </p:cNvPr>
@@ -15513,7 +15567,7 @@
                   <a16:creationId xmlns:a16="http://schemas.microsoft.com/office/drawing/2014/main" id="{24467063-D74E-4D42-8790-B9F6D69584BE}"/>
                 </a:ext>
                 <a:ext uri="{C183D7F6-B498-43B3-948B-1728B52AA6E4}">
-                  <adec:decorative xmlns:adec="http://schemas.microsoft.com/office/drawing/2017/decorative" val="1"/>
+                  <adec:decorative xmlns:adec="http://schemas.microsoft.com/office/drawing/2017/decorative" xmlns="" val="1"/>
                 </a:ext>
               </a:extLst>
             </p:cNvPr>
@@ -15582,7 +15636,7 @@
                   <a16:creationId xmlns:a16="http://schemas.microsoft.com/office/drawing/2014/main" id="{A1D19BAC-1681-47BC-AAF5-92FAFFF6F4CE}"/>
                 </a:ext>
                 <a:ext uri="{C183D7F6-B498-43B3-948B-1728B52AA6E4}">
-                  <adec:decorative xmlns:adec="http://schemas.microsoft.com/office/drawing/2017/decorative" val="1"/>
+                  <adec:decorative xmlns:adec="http://schemas.microsoft.com/office/drawing/2017/decorative" xmlns="" val="1"/>
                 </a:ext>
               </a:extLst>
             </p:cNvPr>
@@ -15651,7 +15705,7 @@
                   <a16:creationId xmlns:a16="http://schemas.microsoft.com/office/drawing/2014/main" id="{94347C2B-E846-452C-97AA-7E254FC1CE8F}"/>
                 </a:ext>
                 <a:ext uri="{C183D7F6-B498-43B3-948B-1728B52AA6E4}">
-                  <adec:decorative xmlns:adec="http://schemas.microsoft.com/office/drawing/2017/decorative" val="1"/>
+                  <adec:decorative xmlns:adec="http://schemas.microsoft.com/office/drawing/2017/decorative" xmlns="" val="1"/>
                 </a:ext>
               </a:extLst>
             </p:cNvPr>
@@ -15720,7 +15774,7 @@
                   <a16:creationId xmlns:a16="http://schemas.microsoft.com/office/drawing/2014/main" id="{10EA2B35-7959-4C2A-84AA-FF5D94FEDE90}"/>
                 </a:ext>
                 <a:ext uri="{C183D7F6-B498-43B3-948B-1728B52AA6E4}">
-                  <adec:decorative xmlns:adec="http://schemas.microsoft.com/office/drawing/2017/decorative" val="1"/>
+                  <adec:decorative xmlns:adec="http://schemas.microsoft.com/office/drawing/2017/decorative" xmlns="" val="1"/>
                 </a:ext>
               </a:extLst>
             </p:cNvPr>
@@ -15790,7 +15844,7 @@
                 <a16:creationId xmlns:a16="http://schemas.microsoft.com/office/drawing/2014/main" id="{E2D3D3F2-ABBB-4453-B1C5-1BEBF7E4DD56}"/>
               </a:ext>
               <a:ext uri="{C183D7F6-B498-43B3-948B-1728B52AA6E4}">
-                <adec:decorative xmlns:adec="http://schemas.microsoft.com/office/drawing/2017/decorative" val="1"/>
+                <adec:decorative xmlns:adec="http://schemas.microsoft.com/office/drawing/2017/decorative" xmlns="" val="1"/>
               </a:ext>
             </a:extLst>
           </p:cNvPr>
@@ -15869,7 +15923,7 @@
                 <a16:creationId xmlns:a16="http://schemas.microsoft.com/office/drawing/2014/main" id="{8214E4A5-A0D2-42C4-8D14-D2A7E495F041}"/>
               </a:ext>
               <a:ext uri="{C183D7F6-B498-43B3-948B-1728B52AA6E4}">
-                <adec:decorative xmlns:adec="http://schemas.microsoft.com/office/drawing/2017/decorative" val="1"/>
+                <adec:decorative xmlns:adec="http://schemas.microsoft.com/office/drawing/2017/decorative" xmlns="" val="1"/>
               </a:ext>
             </a:extLst>
           </p:cNvPr>
@@ -15900,7 +15954,7 @@
                   <a16:creationId xmlns:a16="http://schemas.microsoft.com/office/drawing/2014/main" id="{7494D7A0-6B21-41E8-A7D3-0033BBB79156}"/>
                 </a:ext>
                 <a:ext uri="{C183D7F6-B498-43B3-948B-1728B52AA6E4}">
-                  <adec:decorative xmlns:adec="http://schemas.microsoft.com/office/drawing/2017/decorative" val="1"/>
+                  <adec:decorative xmlns:adec="http://schemas.microsoft.com/office/drawing/2017/decorative" xmlns="" val="1"/>
                 </a:ext>
               </a:extLst>
             </p:cNvPr>
@@ -15969,7 +16023,7 @@
                   <a16:creationId xmlns:a16="http://schemas.microsoft.com/office/drawing/2014/main" id="{1E141D7D-32B0-448E-A666-EA8703AFCF2C}"/>
                 </a:ext>
                 <a:ext uri="{C183D7F6-B498-43B3-948B-1728B52AA6E4}">
-                  <adec:decorative xmlns:adec="http://schemas.microsoft.com/office/drawing/2017/decorative" val="1"/>
+                  <adec:decorative xmlns:adec="http://schemas.microsoft.com/office/drawing/2017/decorative" xmlns="" val="1"/>
                 </a:ext>
               </a:extLst>
             </p:cNvPr>
@@ -16038,7 +16092,7 @@
                   <a16:creationId xmlns:a16="http://schemas.microsoft.com/office/drawing/2014/main" id="{8D87E268-6345-420F-8B97-B37ED04100EC}"/>
                 </a:ext>
                 <a:ext uri="{C183D7F6-B498-43B3-948B-1728B52AA6E4}">
-                  <adec:decorative xmlns:adec="http://schemas.microsoft.com/office/drawing/2017/decorative" val="1"/>
+                  <adec:decorative xmlns:adec="http://schemas.microsoft.com/office/drawing/2017/decorative" xmlns="" val="1"/>
                 </a:ext>
               </a:extLst>
             </p:cNvPr>
@@ -16107,7 +16161,7 @@
                   <a16:creationId xmlns:a16="http://schemas.microsoft.com/office/drawing/2014/main" id="{35E1622E-7FA6-4760-A2BF-A8105EBF7BB9}"/>
                 </a:ext>
                 <a:ext uri="{C183D7F6-B498-43B3-948B-1728B52AA6E4}">
-                  <adec:decorative xmlns:adec="http://schemas.microsoft.com/office/drawing/2017/decorative" val="1"/>
+                  <adec:decorative xmlns:adec="http://schemas.microsoft.com/office/drawing/2017/decorative" xmlns="" val="1"/>
                 </a:ext>
               </a:extLst>
             </p:cNvPr>
@@ -16222,7 +16276,7 @@
                 <a16:creationId xmlns:a16="http://schemas.microsoft.com/office/drawing/2014/main" id="{AF19A774-30A5-488B-9BAF-629C6440294E}"/>
               </a:ext>
               <a:ext uri="{C183D7F6-B498-43B3-948B-1728B52AA6E4}">
-                <adec:decorative xmlns:adec="http://schemas.microsoft.com/office/drawing/2017/decorative" val="1"/>
+                <adec:decorative xmlns:adec="http://schemas.microsoft.com/office/drawing/2017/decorative" xmlns="" val="1"/>
               </a:ext>
             </a:extLst>
           </p:cNvPr>
@@ -16253,7 +16307,7 @@
                   <a16:creationId xmlns:a16="http://schemas.microsoft.com/office/drawing/2014/main" id="{291EBF88-5B98-4258-A542-14C3AF2E5225}"/>
                 </a:ext>
                 <a:ext uri="{C183D7F6-B498-43B3-948B-1728B52AA6E4}">
-                  <adec:decorative xmlns:adec="http://schemas.microsoft.com/office/drawing/2017/decorative" val="1"/>
+                  <adec:decorative xmlns:adec="http://schemas.microsoft.com/office/drawing/2017/decorative" xmlns="" val="1"/>
                 </a:ext>
               </a:extLst>
             </p:cNvPr>
@@ -16310,7 +16364,7 @@
                   <a16:creationId xmlns:a16="http://schemas.microsoft.com/office/drawing/2014/main" id="{8FBC2D58-9E3C-490D-BD7A-61EF07EA79E4}"/>
                 </a:ext>
                 <a:ext uri="{C183D7F6-B498-43B3-948B-1728B52AA6E4}">
-                  <adec:decorative xmlns:adec="http://schemas.microsoft.com/office/drawing/2017/decorative" val="1"/>
+                  <adec:decorative xmlns:adec="http://schemas.microsoft.com/office/drawing/2017/decorative" xmlns="" val="1"/>
                 </a:ext>
               </a:extLst>
             </p:cNvPr>
@@ -16367,7 +16421,7 @@
                   <a16:creationId xmlns:a16="http://schemas.microsoft.com/office/drawing/2014/main" id="{B6CF1BB4-1C1D-4EDE-BA26-0243FCF83BB9}"/>
                 </a:ext>
                 <a:ext uri="{C183D7F6-B498-43B3-948B-1728B52AA6E4}">
-                  <adec:decorative xmlns:adec="http://schemas.microsoft.com/office/drawing/2017/decorative" val="1"/>
+                  <adec:decorative xmlns:adec="http://schemas.microsoft.com/office/drawing/2017/decorative" xmlns="" val="1"/>
                 </a:ext>
               </a:extLst>
             </p:cNvPr>
@@ -16424,7 +16478,7 @@
                   <a16:creationId xmlns:a16="http://schemas.microsoft.com/office/drawing/2014/main" id="{00C83729-E02F-4512-AFE7-F4792228BDA2}"/>
                 </a:ext>
                 <a:ext uri="{C183D7F6-B498-43B3-948B-1728B52AA6E4}">
-                  <adec:decorative xmlns:adec="http://schemas.microsoft.com/office/drawing/2017/decorative" val="1"/>
+                  <adec:decorative xmlns:adec="http://schemas.microsoft.com/office/drawing/2017/decorative" xmlns="" val="1"/>
                 </a:ext>
               </a:extLst>
             </p:cNvPr>

</xml_diff>

<commit_message>
Added doors for 3rd floor; Made moderation
</commit_message>
<xml_diff>
--- a/docs/Final Binding of Newton.pptx
+++ b/docs/Final Binding of Newton.pptx
@@ -5306,7 +5306,7 @@
           <a:p>
             <a:fld id="{68402880-D0F1-469B-A5D0-1E092D35128B}" type="datetimeFigureOut">
               <a:rPr lang="de-DE" smtClean="0"/>
-              <a:t>23.05.2021</a:t>
+              <a:t>24.05.2021</a:t>
             </a:fld>
             <a:endParaRPr lang="de-DE"/>
           </a:p>
@@ -5504,7 +5504,7 @@
           <a:p>
             <a:fld id="{68402880-D0F1-469B-A5D0-1E092D35128B}" type="datetimeFigureOut">
               <a:rPr lang="de-DE" smtClean="0"/>
-              <a:t>23.05.2021</a:t>
+              <a:t>24.05.2021</a:t>
             </a:fld>
             <a:endParaRPr lang="de-DE"/>
           </a:p>
@@ -5712,7 +5712,7 @@
           <a:p>
             <a:fld id="{68402880-D0F1-469B-A5D0-1E092D35128B}" type="datetimeFigureOut">
               <a:rPr lang="de-DE" smtClean="0"/>
-              <a:t>23.05.2021</a:t>
+              <a:t>24.05.2021</a:t>
             </a:fld>
             <a:endParaRPr lang="de-DE"/>
           </a:p>
@@ -5910,7 +5910,7 @@
           <a:p>
             <a:fld id="{68402880-D0F1-469B-A5D0-1E092D35128B}" type="datetimeFigureOut">
               <a:rPr lang="de-DE" smtClean="0"/>
-              <a:t>23.05.2021</a:t>
+              <a:t>24.05.2021</a:t>
             </a:fld>
             <a:endParaRPr lang="de-DE"/>
           </a:p>
@@ -6185,7 +6185,7 @@
           <a:p>
             <a:fld id="{68402880-D0F1-469B-A5D0-1E092D35128B}" type="datetimeFigureOut">
               <a:rPr lang="de-DE" smtClean="0"/>
-              <a:t>23.05.2021</a:t>
+              <a:t>24.05.2021</a:t>
             </a:fld>
             <a:endParaRPr lang="de-DE"/>
           </a:p>
@@ -6450,7 +6450,7 @@
           <a:p>
             <a:fld id="{68402880-D0F1-469B-A5D0-1E092D35128B}" type="datetimeFigureOut">
               <a:rPr lang="de-DE" smtClean="0"/>
-              <a:t>23.05.2021</a:t>
+              <a:t>24.05.2021</a:t>
             </a:fld>
             <a:endParaRPr lang="de-DE"/>
           </a:p>
@@ -6862,7 +6862,7 @@
           <a:p>
             <a:fld id="{68402880-D0F1-469B-A5D0-1E092D35128B}" type="datetimeFigureOut">
               <a:rPr lang="de-DE" smtClean="0"/>
-              <a:t>23.05.2021</a:t>
+              <a:t>24.05.2021</a:t>
             </a:fld>
             <a:endParaRPr lang="de-DE"/>
           </a:p>
@@ -7003,7 +7003,7 @@
           <a:p>
             <a:fld id="{68402880-D0F1-469B-A5D0-1E092D35128B}" type="datetimeFigureOut">
               <a:rPr lang="de-DE" smtClean="0"/>
-              <a:t>23.05.2021</a:t>
+              <a:t>24.05.2021</a:t>
             </a:fld>
             <a:endParaRPr lang="de-DE"/>
           </a:p>
@@ -7116,7 +7116,7 @@
           <a:p>
             <a:fld id="{68402880-D0F1-469B-A5D0-1E092D35128B}" type="datetimeFigureOut">
               <a:rPr lang="de-DE" smtClean="0"/>
-              <a:t>23.05.2021</a:t>
+              <a:t>24.05.2021</a:t>
             </a:fld>
             <a:endParaRPr lang="de-DE"/>
           </a:p>
@@ -7427,7 +7427,7 @@
           <a:p>
             <a:fld id="{68402880-D0F1-469B-A5D0-1E092D35128B}" type="datetimeFigureOut">
               <a:rPr lang="de-DE" smtClean="0"/>
-              <a:t>23.05.2021</a:t>
+              <a:t>24.05.2021</a:t>
             </a:fld>
             <a:endParaRPr lang="de-DE"/>
           </a:p>
@@ -7715,7 +7715,7 @@
           <a:p>
             <a:fld id="{68402880-D0F1-469B-A5D0-1E092D35128B}" type="datetimeFigureOut">
               <a:rPr lang="de-DE" smtClean="0"/>
-              <a:t>23.05.2021</a:t>
+              <a:t>24.05.2021</a:t>
             </a:fld>
             <a:endParaRPr lang="de-DE"/>
           </a:p>
@@ -7956,7 +7956,7 @@
           <a:p>
             <a:fld id="{68402880-D0F1-469B-A5D0-1E092D35128B}" type="datetimeFigureOut">
               <a:rPr lang="de-DE" smtClean="0"/>
-              <a:t>23.05.2021</a:t>
+              <a:t>24.05.2021</a:t>
             </a:fld>
             <a:endParaRPr lang="de-DE"/>
           </a:p>
@@ -8461,6 +8461,13 @@
   <p:clrMapOvr>
     <a:masterClrMapping/>
   </p:clrMapOvr>
+  <p:timing>
+    <p:tnLst>
+      <p:par>
+        <p:cTn id="1" dur="indefinite" restart="never" nodeType="tmRoot"/>
+      </p:par>
+    </p:tnLst>
+  </p:timing>
 </p:sld>
 </file>
 
@@ -8497,7 +8504,7 @@
                 <a16:creationId xmlns:a16="http://schemas.microsoft.com/office/drawing/2014/main" id="{3CFEB548-CACC-4915-BA3A-ECFAD4BE055B}"/>
               </a:ext>
               <a:ext uri="{C183D7F6-B498-43B3-948B-1728B52AA6E4}">
-                <adec:decorative xmlns:adec="http://schemas.microsoft.com/office/drawing/2017/decorative" xmlns="" val="1"/>
+                <adec:decorative xmlns="" xmlns:adec="http://schemas.microsoft.com/office/drawing/2017/decorative" val="1"/>
               </a:ext>
             </a:extLst>
           </p:cNvPr>
@@ -8557,7 +8564,7 @@
                 <a16:creationId xmlns:a16="http://schemas.microsoft.com/office/drawing/2014/main" id="{337DD617-02C2-4388-A86E-BAB7BD2847FF}"/>
               </a:ext>
               <a:ext uri="{C183D7F6-B498-43B3-948B-1728B52AA6E4}">
-                <adec:decorative xmlns:adec="http://schemas.microsoft.com/office/drawing/2017/decorative" xmlns="" val="1"/>
+                <adec:decorative xmlns="" xmlns:adec="http://schemas.microsoft.com/office/drawing/2017/decorative" val="1"/>
               </a:ext>
             </a:extLst>
           </p:cNvPr>
@@ -8622,7 +8629,7 @@
                 <a16:creationId xmlns:a16="http://schemas.microsoft.com/office/drawing/2014/main" id="{6971532D-ED15-4EA1-8D74-8B9D49117B1E}"/>
               </a:ext>
               <a:ext uri="{C183D7F6-B498-43B3-948B-1728B52AA6E4}">
-                <adec:decorative xmlns:adec="http://schemas.microsoft.com/office/drawing/2017/decorative" xmlns="" val="1"/>
+                <adec:decorative xmlns="" xmlns:adec="http://schemas.microsoft.com/office/drawing/2017/decorative" val="1"/>
               </a:ext>
             </a:extLst>
           </p:cNvPr>
@@ -8653,7 +8660,7 @@
                   <a16:creationId xmlns:a16="http://schemas.microsoft.com/office/drawing/2014/main" id="{53E0E949-6174-47F4-871C-39B2BE7B4B04}"/>
                 </a:ext>
                 <a:ext uri="{C183D7F6-B498-43B3-948B-1728B52AA6E4}">
-                  <adec:decorative xmlns:adec="http://schemas.microsoft.com/office/drawing/2017/decorative" xmlns="" val="1"/>
+                  <adec:decorative xmlns="" xmlns:adec="http://schemas.microsoft.com/office/drawing/2017/decorative" val="1"/>
                 </a:ext>
               </a:extLst>
             </p:cNvPr>
@@ -8710,7 +8717,7 @@
                   <a16:creationId xmlns:a16="http://schemas.microsoft.com/office/drawing/2014/main" id="{CA81FA79-0462-498C-A7A0-4F97CB9BD068}"/>
                 </a:ext>
                 <a:ext uri="{C183D7F6-B498-43B3-948B-1728B52AA6E4}">
-                  <adec:decorative xmlns:adec="http://schemas.microsoft.com/office/drawing/2017/decorative" xmlns="" val="1"/>
+                  <adec:decorative xmlns="" xmlns:adec="http://schemas.microsoft.com/office/drawing/2017/decorative" val="1"/>
                 </a:ext>
               </a:extLst>
             </p:cNvPr>
@@ -8767,7 +8774,7 @@
                   <a16:creationId xmlns:a16="http://schemas.microsoft.com/office/drawing/2014/main" id="{9B13F096-ACB3-4289-ADE9-7BCF5727CEFA}"/>
                 </a:ext>
                 <a:ext uri="{C183D7F6-B498-43B3-948B-1728B52AA6E4}">
-                  <adec:decorative xmlns:adec="http://schemas.microsoft.com/office/drawing/2017/decorative" xmlns="" val="1"/>
+                  <adec:decorative xmlns="" xmlns:adec="http://schemas.microsoft.com/office/drawing/2017/decorative" val="1"/>
                 </a:ext>
               </a:extLst>
             </p:cNvPr>
@@ -8824,7 +8831,7 @@
                   <a16:creationId xmlns:a16="http://schemas.microsoft.com/office/drawing/2014/main" id="{442D1F89-7331-4DB6-9053-DE817E604F1F}"/>
                 </a:ext>
                 <a:ext uri="{C183D7F6-B498-43B3-948B-1728B52AA6E4}">
-                  <adec:decorative xmlns:adec="http://schemas.microsoft.com/office/drawing/2017/decorative" xmlns="" val="1"/>
+                  <adec:decorative xmlns="" xmlns:adec="http://schemas.microsoft.com/office/drawing/2017/decorative" val="1"/>
                 </a:ext>
               </a:extLst>
             </p:cNvPr>
@@ -8882,7 +8889,7 @@
                 <a16:creationId xmlns:a16="http://schemas.microsoft.com/office/drawing/2014/main" id="{4527D98C-AF53-420B-A7B6-DD5AA7D5339E}"/>
               </a:ext>
               <a:ext uri="{C183D7F6-B498-43B3-948B-1728B52AA6E4}">
-                <adec:decorative xmlns:adec="http://schemas.microsoft.com/office/drawing/2017/decorative" xmlns="" val="1"/>
+                <adec:decorative xmlns="" xmlns:adec="http://schemas.microsoft.com/office/drawing/2017/decorative" val="1"/>
               </a:ext>
             </a:extLst>
           </p:cNvPr>
@@ -8913,7 +8920,7 @@
                   <a16:creationId xmlns:a16="http://schemas.microsoft.com/office/drawing/2014/main" id="{9F0B76EE-9601-45D1-815F-6B076D42F091}"/>
                 </a:ext>
                 <a:ext uri="{C183D7F6-B498-43B3-948B-1728B52AA6E4}">
-                  <adec:decorative xmlns:adec="http://schemas.microsoft.com/office/drawing/2017/decorative" xmlns="" val="1"/>
+                  <adec:decorative xmlns="" xmlns:adec="http://schemas.microsoft.com/office/drawing/2017/decorative" val="1"/>
                 </a:ext>
               </a:extLst>
             </p:cNvPr>
@@ -8990,7 +8997,7 @@
                   <a16:creationId xmlns:a16="http://schemas.microsoft.com/office/drawing/2014/main" id="{1F5FB023-5222-4B9E-B6D1-A5040E4CEBE1}"/>
                 </a:ext>
                 <a:ext uri="{C183D7F6-B498-43B3-948B-1728B52AA6E4}">
-                  <adec:decorative xmlns:adec="http://schemas.microsoft.com/office/drawing/2017/decorative" xmlns="" val="1"/>
+                  <adec:decorative xmlns="" xmlns:adec="http://schemas.microsoft.com/office/drawing/2017/decorative" val="1"/>
                 </a:ext>
               </a:extLst>
             </p:cNvPr>
@@ -9067,7 +9074,7 @@
                   <a16:creationId xmlns:a16="http://schemas.microsoft.com/office/drawing/2014/main" id="{EAAEED21-38DA-46C2-93A3-F597C8761F21}"/>
                 </a:ext>
                 <a:ext uri="{C183D7F6-B498-43B3-948B-1728B52AA6E4}">
-                  <adec:decorative xmlns:adec="http://schemas.microsoft.com/office/drawing/2017/decorative" xmlns="" val="1"/>
+                  <adec:decorative xmlns="" xmlns:adec="http://schemas.microsoft.com/office/drawing/2017/decorative" val="1"/>
                 </a:ext>
               </a:extLst>
             </p:cNvPr>
@@ -9142,7 +9149,7 @@
                   <a16:creationId xmlns:a16="http://schemas.microsoft.com/office/drawing/2014/main" id="{17EFB714-3172-4F11-BA4B-04073494A7F5}"/>
                 </a:ext>
                 <a:ext uri="{C183D7F6-B498-43B3-948B-1728B52AA6E4}">
-                  <adec:decorative xmlns:adec="http://schemas.microsoft.com/office/drawing/2017/decorative" xmlns="" val="1"/>
+                  <adec:decorative xmlns="" xmlns:adec="http://schemas.microsoft.com/office/drawing/2017/decorative" val="1"/>
                 </a:ext>
               </a:extLst>
             </p:cNvPr>
@@ -9217,7 +9224,7 @@
                   <a16:creationId xmlns:a16="http://schemas.microsoft.com/office/drawing/2014/main" id="{8783C632-F1E2-40EE-AFA0-EF8D52D67779}"/>
                 </a:ext>
                 <a:ext uri="{C183D7F6-B498-43B3-948B-1728B52AA6E4}">
-                  <adec:decorative xmlns:adec="http://schemas.microsoft.com/office/drawing/2017/decorative" xmlns="" val="1"/>
+                  <adec:decorative xmlns="" xmlns:adec="http://schemas.microsoft.com/office/drawing/2017/decorative" val="1"/>
                 </a:ext>
               </a:extLst>
             </p:cNvPr>
@@ -9294,7 +9301,7 @@
                   <a16:creationId xmlns:a16="http://schemas.microsoft.com/office/drawing/2014/main" id="{7980DE84-E4A8-4C12-97F1-AADA86FFB006}"/>
                 </a:ext>
                 <a:ext uri="{C183D7F6-B498-43B3-948B-1728B52AA6E4}">
-                  <adec:decorative xmlns:adec="http://schemas.microsoft.com/office/drawing/2017/decorative" xmlns="" val="1"/>
+                  <adec:decorative xmlns="" xmlns:adec="http://schemas.microsoft.com/office/drawing/2017/decorative" val="1"/>
                 </a:ext>
               </a:extLst>
             </p:cNvPr>
@@ -9371,7 +9378,7 @@
                 <a16:creationId xmlns:a16="http://schemas.microsoft.com/office/drawing/2014/main" id="{7A4FCEB1-CD0B-4966-8A9D-F458E4F79B0B}"/>
               </a:ext>
               <a:ext uri="{C183D7F6-B498-43B3-948B-1728B52AA6E4}">
-                <adec:decorative xmlns:adec="http://schemas.microsoft.com/office/drawing/2017/decorative" xmlns="" val="1"/>
+                <adec:decorative xmlns="" xmlns:adec="http://schemas.microsoft.com/office/drawing/2017/decorative" val="1"/>
               </a:ext>
             </a:extLst>
           </p:cNvPr>
@@ -9450,7 +9457,7 @@
                 <a16:creationId xmlns:a16="http://schemas.microsoft.com/office/drawing/2014/main" id="{D3866B94-A099-49F6-A378-974CED7F572C}"/>
               </a:ext>
               <a:ext uri="{C183D7F6-B498-43B3-948B-1728B52AA6E4}">
-                <adec:decorative xmlns:adec="http://schemas.microsoft.com/office/drawing/2017/decorative" xmlns="" val="1"/>
+                <adec:decorative xmlns="" xmlns:adec="http://schemas.microsoft.com/office/drawing/2017/decorative" val="1"/>
               </a:ext>
             </a:extLst>
           </p:cNvPr>
@@ -9481,7 +9488,7 @@
                   <a16:creationId xmlns:a16="http://schemas.microsoft.com/office/drawing/2014/main" id="{5103C908-3FF0-4A95-851C-DF3C650FFB89}"/>
                 </a:ext>
                 <a:ext uri="{C183D7F6-B498-43B3-948B-1728B52AA6E4}">
-                  <adec:decorative xmlns:adec="http://schemas.microsoft.com/office/drawing/2017/decorative" xmlns="" val="1"/>
+                  <adec:decorative xmlns="" xmlns:adec="http://schemas.microsoft.com/office/drawing/2017/decorative" val="1"/>
                 </a:ext>
               </a:extLst>
             </p:cNvPr>
@@ -9550,7 +9557,7 @@
                   <a16:creationId xmlns:a16="http://schemas.microsoft.com/office/drawing/2014/main" id="{6AF400D3-D15B-4146-82E6-B2FC1194FED0}"/>
                 </a:ext>
                 <a:ext uri="{C183D7F6-B498-43B3-948B-1728B52AA6E4}">
-                  <adec:decorative xmlns:adec="http://schemas.microsoft.com/office/drawing/2017/decorative" xmlns="" val="1"/>
+                  <adec:decorative xmlns="" xmlns:adec="http://schemas.microsoft.com/office/drawing/2017/decorative" val="1"/>
                 </a:ext>
               </a:extLst>
             </p:cNvPr>
@@ -9619,7 +9626,7 @@
                   <a16:creationId xmlns:a16="http://schemas.microsoft.com/office/drawing/2014/main" id="{602F76C8-7CAD-4B72-BD0D-072D2AFA0CDA}"/>
                 </a:ext>
                 <a:ext uri="{C183D7F6-B498-43B3-948B-1728B52AA6E4}">
-                  <adec:decorative xmlns:adec="http://schemas.microsoft.com/office/drawing/2017/decorative" xmlns="" val="1"/>
+                  <adec:decorative xmlns="" xmlns:adec="http://schemas.microsoft.com/office/drawing/2017/decorative" val="1"/>
                 </a:ext>
               </a:extLst>
             </p:cNvPr>
@@ -9688,7 +9695,7 @@
                   <a16:creationId xmlns:a16="http://schemas.microsoft.com/office/drawing/2014/main" id="{15CEBAD8-9DE5-4790-9CD4-C384EB371D5A}"/>
                 </a:ext>
                 <a:ext uri="{C183D7F6-B498-43B3-948B-1728B52AA6E4}">
-                  <adec:decorative xmlns:adec="http://schemas.microsoft.com/office/drawing/2017/decorative" xmlns="" val="1"/>
+                  <adec:decorative xmlns="" xmlns:adec="http://schemas.microsoft.com/office/drawing/2017/decorative" val="1"/>
                 </a:ext>
               </a:extLst>
             </p:cNvPr>
@@ -9758,7 +9765,7 @@
                 <a16:creationId xmlns:a16="http://schemas.microsoft.com/office/drawing/2014/main" id="{D3B7B9BA-215A-4923-954F-3DAE9523ABEB}"/>
               </a:ext>
               <a:ext uri="{C183D7F6-B498-43B3-948B-1728B52AA6E4}">
-                <adec:decorative xmlns:adec="http://schemas.microsoft.com/office/drawing/2017/decorative" xmlns="" val="1"/>
+                <adec:decorative xmlns="" xmlns:adec="http://schemas.microsoft.com/office/drawing/2017/decorative" val="1"/>
               </a:ext>
             </a:extLst>
           </p:cNvPr>
@@ -9837,7 +9844,7 @@
                 <a16:creationId xmlns:a16="http://schemas.microsoft.com/office/drawing/2014/main" id="{34013081-B23F-45CB-A45B-562B629ADB7B}"/>
               </a:ext>
               <a:ext uri="{C183D7F6-B498-43B3-948B-1728B52AA6E4}">
-                <adec:decorative xmlns:adec="http://schemas.microsoft.com/office/drawing/2017/decorative" xmlns="" val="1"/>
+                <adec:decorative xmlns="" xmlns:adec="http://schemas.microsoft.com/office/drawing/2017/decorative" val="1"/>
               </a:ext>
             </a:extLst>
           </p:cNvPr>
@@ -9868,7 +9875,7 @@
                   <a16:creationId xmlns:a16="http://schemas.microsoft.com/office/drawing/2014/main" id="{4B8B11FB-E867-4638-B75F-B4B7DBDDB723}"/>
                 </a:ext>
                 <a:ext uri="{C183D7F6-B498-43B3-948B-1728B52AA6E4}">
-                  <adec:decorative xmlns:adec="http://schemas.microsoft.com/office/drawing/2017/decorative" xmlns="" val="1"/>
+                  <adec:decorative xmlns="" xmlns:adec="http://schemas.microsoft.com/office/drawing/2017/decorative" val="1"/>
                 </a:ext>
               </a:extLst>
             </p:cNvPr>
@@ -9937,7 +9944,7 @@
                   <a16:creationId xmlns:a16="http://schemas.microsoft.com/office/drawing/2014/main" id="{ABC84FC8-9600-4AE5-9E77-38E2363A3004}"/>
                 </a:ext>
                 <a:ext uri="{C183D7F6-B498-43B3-948B-1728B52AA6E4}">
-                  <adec:decorative xmlns:adec="http://schemas.microsoft.com/office/drawing/2017/decorative" xmlns="" val="1"/>
+                  <adec:decorative xmlns="" xmlns:adec="http://schemas.microsoft.com/office/drawing/2017/decorative" val="1"/>
                 </a:ext>
               </a:extLst>
             </p:cNvPr>
@@ -10006,7 +10013,7 @@
                   <a16:creationId xmlns:a16="http://schemas.microsoft.com/office/drawing/2014/main" id="{3514F95D-50D5-4B76-B347-91D1D76F8F79}"/>
                 </a:ext>
                 <a:ext uri="{C183D7F6-B498-43B3-948B-1728B52AA6E4}">
-                  <adec:decorative xmlns:adec="http://schemas.microsoft.com/office/drawing/2017/decorative" xmlns="" val="1"/>
+                  <adec:decorative xmlns="" xmlns:adec="http://schemas.microsoft.com/office/drawing/2017/decorative" val="1"/>
                 </a:ext>
               </a:extLst>
             </p:cNvPr>
@@ -10075,7 +10082,7 @@
                   <a16:creationId xmlns:a16="http://schemas.microsoft.com/office/drawing/2014/main" id="{885455D4-020C-4462-8A90-3B6434A50809}"/>
                 </a:ext>
                 <a:ext uri="{C183D7F6-B498-43B3-948B-1728B52AA6E4}">
-                  <adec:decorative xmlns:adec="http://schemas.microsoft.com/office/drawing/2017/decorative" xmlns="" val="1"/>
+                  <adec:decorative xmlns="" xmlns:adec="http://schemas.microsoft.com/office/drawing/2017/decorative" val="1"/>
                 </a:ext>
               </a:extLst>
             </p:cNvPr>
@@ -10214,6 +10221,13 @@
   <p:clrMapOvr>
     <a:overrideClrMapping bg1="dk1" tx1="lt1" bg2="dk2" tx2="lt2" accent1="accent1" accent2="accent2" accent3="accent3" accent4="accent4" accent5="accent5" accent6="accent6" hlink="hlink" folHlink="folHlink"/>
   </p:clrMapOvr>
+  <p:timing>
+    <p:tnLst>
+      <p:par>
+        <p:cTn id="1" dur="indefinite" restart="never" nodeType="tmRoot"/>
+      </p:par>
+    </p:tnLst>
+  </p:timing>
 </p:sld>
 </file>
 
@@ -10250,7 +10264,7 @@
                 <a16:creationId xmlns:a16="http://schemas.microsoft.com/office/drawing/2014/main" id="{3CFEB548-CACC-4915-BA3A-ECFAD4BE055B}"/>
               </a:ext>
               <a:ext uri="{C183D7F6-B498-43B3-948B-1728B52AA6E4}">
-                <adec:decorative xmlns:adec="http://schemas.microsoft.com/office/drawing/2017/decorative" xmlns="" val="1"/>
+                <adec:decorative xmlns="" xmlns:adec="http://schemas.microsoft.com/office/drawing/2017/decorative" val="1"/>
               </a:ext>
             </a:extLst>
           </p:cNvPr>
@@ -10310,7 +10324,7 @@
                 <a16:creationId xmlns:a16="http://schemas.microsoft.com/office/drawing/2014/main" id="{337DD617-02C2-4388-A86E-BAB7BD2847FF}"/>
               </a:ext>
               <a:ext uri="{C183D7F6-B498-43B3-948B-1728B52AA6E4}">
-                <adec:decorative xmlns:adec="http://schemas.microsoft.com/office/drawing/2017/decorative" xmlns="" val="1"/>
+                <adec:decorative xmlns="" xmlns:adec="http://schemas.microsoft.com/office/drawing/2017/decorative" val="1"/>
               </a:ext>
             </a:extLst>
           </p:cNvPr>
@@ -10375,7 +10389,7 @@
                 <a16:creationId xmlns:a16="http://schemas.microsoft.com/office/drawing/2014/main" id="{6971532D-ED15-4EA1-8D74-8B9D49117B1E}"/>
               </a:ext>
               <a:ext uri="{C183D7F6-B498-43B3-948B-1728B52AA6E4}">
-                <adec:decorative xmlns:adec="http://schemas.microsoft.com/office/drawing/2017/decorative" xmlns="" val="1"/>
+                <adec:decorative xmlns="" xmlns:adec="http://schemas.microsoft.com/office/drawing/2017/decorative" val="1"/>
               </a:ext>
             </a:extLst>
           </p:cNvPr>
@@ -10406,7 +10420,7 @@
                   <a16:creationId xmlns:a16="http://schemas.microsoft.com/office/drawing/2014/main" id="{53E0E949-6174-47F4-871C-39B2BE7B4B04}"/>
                 </a:ext>
                 <a:ext uri="{C183D7F6-B498-43B3-948B-1728B52AA6E4}">
-                  <adec:decorative xmlns:adec="http://schemas.microsoft.com/office/drawing/2017/decorative" xmlns="" val="1"/>
+                  <adec:decorative xmlns="" xmlns:adec="http://schemas.microsoft.com/office/drawing/2017/decorative" val="1"/>
                 </a:ext>
               </a:extLst>
             </p:cNvPr>
@@ -10463,7 +10477,7 @@
                   <a16:creationId xmlns:a16="http://schemas.microsoft.com/office/drawing/2014/main" id="{CA81FA79-0462-498C-A7A0-4F97CB9BD068}"/>
                 </a:ext>
                 <a:ext uri="{C183D7F6-B498-43B3-948B-1728B52AA6E4}">
-                  <adec:decorative xmlns:adec="http://schemas.microsoft.com/office/drawing/2017/decorative" xmlns="" val="1"/>
+                  <adec:decorative xmlns="" xmlns:adec="http://schemas.microsoft.com/office/drawing/2017/decorative" val="1"/>
                 </a:ext>
               </a:extLst>
             </p:cNvPr>
@@ -10520,7 +10534,7 @@
                   <a16:creationId xmlns:a16="http://schemas.microsoft.com/office/drawing/2014/main" id="{9B13F096-ACB3-4289-ADE9-7BCF5727CEFA}"/>
                 </a:ext>
                 <a:ext uri="{C183D7F6-B498-43B3-948B-1728B52AA6E4}">
-                  <adec:decorative xmlns:adec="http://schemas.microsoft.com/office/drawing/2017/decorative" xmlns="" val="1"/>
+                  <adec:decorative xmlns="" xmlns:adec="http://schemas.microsoft.com/office/drawing/2017/decorative" val="1"/>
                 </a:ext>
               </a:extLst>
             </p:cNvPr>
@@ -10577,7 +10591,7 @@
                   <a16:creationId xmlns:a16="http://schemas.microsoft.com/office/drawing/2014/main" id="{442D1F89-7331-4DB6-9053-DE817E604F1F}"/>
                 </a:ext>
                 <a:ext uri="{C183D7F6-B498-43B3-948B-1728B52AA6E4}">
-                  <adec:decorative xmlns:adec="http://schemas.microsoft.com/office/drawing/2017/decorative" xmlns="" val="1"/>
+                  <adec:decorative xmlns="" xmlns:adec="http://schemas.microsoft.com/office/drawing/2017/decorative" val="1"/>
                 </a:ext>
               </a:extLst>
             </p:cNvPr>
@@ -10635,7 +10649,7 @@
                 <a16:creationId xmlns:a16="http://schemas.microsoft.com/office/drawing/2014/main" id="{4527D98C-AF53-420B-A7B6-DD5AA7D5339E}"/>
               </a:ext>
               <a:ext uri="{C183D7F6-B498-43B3-948B-1728B52AA6E4}">
-                <adec:decorative xmlns:adec="http://schemas.microsoft.com/office/drawing/2017/decorative" xmlns="" val="1"/>
+                <adec:decorative xmlns="" xmlns:adec="http://schemas.microsoft.com/office/drawing/2017/decorative" val="1"/>
               </a:ext>
             </a:extLst>
           </p:cNvPr>
@@ -10666,7 +10680,7 @@
                   <a16:creationId xmlns:a16="http://schemas.microsoft.com/office/drawing/2014/main" id="{9F0B76EE-9601-45D1-815F-6B076D42F091}"/>
                 </a:ext>
                 <a:ext uri="{C183D7F6-B498-43B3-948B-1728B52AA6E4}">
-                  <adec:decorative xmlns:adec="http://schemas.microsoft.com/office/drawing/2017/decorative" xmlns="" val="1"/>
+                  <adec:decorative xmlns="" xmlns:adec="http://schemas.microsoft.com/office/drawing/2017/decorative" val="1"/>
                 </a:ext>
               </a:extLst>
             </p:cNvPr>
@@ -10743,7 +10757,7 @@
                   <a16:creationId xmlns:a16="http://schemas.microsoft.com/office/drawing/2014/main" id="{1F5FB023-5222-4B9E-B6D1-A5040E4CEBE1}"/>
                 </a:ext>
                 <a:ext uri="{C183D7F6-B498-43B3-948B-1728B52AA6E4}">
-                  <adec:decorative xmlns:adec="http://schemas.microsoft.com/office/drawing/2017/decorative" xmlns="" val="1"/>
+                  <adec:decorative xmlns="" xmlns:adec="http://schemas.microsoft.com/office/drawing/2017/decorative" val="1"/>
                 </a:ext>
               </a:extLst>
             </p:cNvPr>
@@ -10820,7 +10834,7 @@
                   <a16:creationId xmlns:a16="http://schemas.microsoft.com/office/drawing/2014/main" id="{EAAEED21-38DA-46C2-93A3-F597C8761F21}"/>
                 </a:ext>
                 <a:ext uri="{C183D7F6-B498-43B3-948B-1728B52AA6E4}">
-                  <adec:decorative xmlns:adec="http://schemas.microsoft.com/office/drawing/2017/decorative" xmlns="" val="1"/>
+                  <adec:decorative xmlns="" xmlns:adec="http://schemas.microsoft.com/office/drawing/2017/decorative" val="1"/>
                 </a:ext>
               </a:extLst>
             </p:cNvPr>
@@ -10895,7 +10909,7 @@
                   <a16:creationId xmlns:a16="http://schemas.microsoft.com/office/drawing/2014/main" id="{17EFB714-3172-4F11-BA4B-04073494A7F5}"/>
                 </a:ext>
                 <a:ext uri="{C183D7F6-B498-43B3-948B-1728B52AA6E4}">
-                  <adec:decorative xmlns:adec="http://schemas.microsoft.com/office/drawing/2017/decorative" xmlns="" val="1"/>
+                  <adec:decorative xmlns="" xmlns:adec="http://schemas.microsoft.com/office/drawing/2017/decorative" val="1"/>
                 </a:ext>
               </a:extLst>
             </p:cNvPr>
@@ -10970,7 +10984,7 @@
                   <a16:creationId xmlns:a16="http://schemas.microsoft.com/office/drawing/2014/main" id="{8783C632-F1E2-40EE-AFA0-EF8D52D67779}"/>
                 </a:ext>
                 <a:ext uri="{C183D7F6-B498-43B3-948B-1728B52AA6E4}">
-                  <adec:decorative xmlns:adec="http://schemas.microsoft.com/office/drawing/2017/decorative" xmlns="" val="1"/>
+                  <adec:decorative xmlns="" xmlns:adec="http://schemas.microsoft.com/office/drawing/2017/decorative" val="1"/>
                 </a:ext>
               </a:extLst>
             </p:cNvPr>
@@ -11047,7 +11061,7 @@
                   <a16:creationId xmlns:a16="http://schemas.microsoft.com/office/drawing/2014/main" id="{7980DE84-E4A8-4C12-97F1-AADA86FFB006}"/>
                 </a:ext>
                 <a:ext uri="{C183D7F6-B498-43B3-948B-1728B52AA6E4}">
-                  <adec:decorative xmlns:adec="http://schemas.microsoft.com/office/drawing/2017/decorative" xmlns="" val="1"/>
+                  <adec:decorative xmlns="" xmlns:adec="http://schemas.microsoft.com/office/drawing/2017/decorative" val="1"/>
                 </a:ext>
               </a:extLst>
             </p:cNvPr>
@@ -11124,7 +11138,7 @@
                 <a16:creationId xmlns:a16="http://schemas.microsoft.com/office/drawing/2014/main" id="{7A4FCEB1-CD0B-4966-8A9D-F458E4F79B0B}"/>
               </a:ext>
               <a:ext uri="{C183D7F6-B498-43B3-948B-1728B52AA6E4}">
-                <adec:decorative xmlns:adec="http://schemas.microsoft.com/office/drawing/2017/decorative" xmlns="" val="1"/>
+                <adec:decorative xmlns="" xmlns:adec="http://schemas.microsoft.com/office/drawing/2017/decorative" val="1"/>
               </a:ext>
             </a:extLst>
           </p:cNvPr>
@@ -11203,7 +11217,7 @@
                 <a16:creationId xmlns:a16="http://schemas.microsoft.com/office/drawing/2014/main" id="{D3866B94-A099-49F6-A378-974CED7F572C}"/>
               </a:ext>
               <a:ext uri="{C183D7F6-B498-43B3-948B-1728B52AA6E4}">
-                <adec:decorative xmlns:adec="http://schemas.microsoft.com/office/drawing/2017/decorative" xmlns="" val="1"/>
+                <adec:decorative xmlns="" xmlns:adec="http://schemas.microsoft.com/office/drawing/2017/decorative" val="1"/>
               </a:ext>
             </a:extLst>
           </p:cNvPr>
@@ -11234,7 +11248,7 @@
                   <a16:creationId xmlns:a16="http://schemas.microsoft.com/office/drawing/2014/main" id="{5103C908-3FF0-4A95-851C-DF3C650FFB89}"/>
                 </a:ext>
                 <a:ext uri="{C183D7F6-B498-43B3-948B-1728B52AA6E4}">
-                  <adec:decorative xmlns:adec="http://schemas.microsoft.com/office/drawing/2017/decorative" xmlns="" val="1"/>
+                  <adec:decorative xmlns="" xmlns:adec="http://schemas.microsoft.com/office/drawing/2017/decorative" val="1"/>
                 </a:ext>
               </a:extLst>
             </p:cNvPr>
@@ -11303,7 +11317,7 @@
                   <a16:creationId xmlns:a16="http://schemas.microsoft.com/office/drawing/2014/main" id="{6AF400D3-D15B-4146-82E6-B2FC1194FED0}"/>
                 </a:ext>
                 <a:ext uri="{C183D7F6-B498-43B3-948B-1728B52AA6E4}">
-                  <adec:decorative xmlns:adec="http://schemas.microsoft.com/office/drawing/2017/decorative" xmlns="" val="1"/>
+                  <adec:decorative xmlns="" xmlns:adec="http://schemas.microsoft.com/office/drawing/2017/decorative" val="1"/>
                 </a:ext>
               </a:extLst>
             </p:cNvPr>
@@ -11372,7 +11386,7 @@
                   <a16:creationId xmlns:a16="http://schemas.microsoft.com/office/drawing/2014/main" id="{602F76C8-7CAD-4B72-BD0D-072D2AFA0CDA}"/>
                 </a:ext>
                 <a:ext uri="{C183D7F6-B498-43B3-948B-1728B52AA6E4}">
-                  <adec:decorative xmlns:adec="http://schemas.microsoft.com/office/drawing/2017/decorative" xmlns="" val="1"/>
+                  <adec:decorative xmlns="" xmlns:adec="http://schemas.microsoft.com/office/drawing/2017/decorative" val="1"/>
                 </a:ext>
               </a:extLst>
             </p:cNvPr>
@@ -11441,7 +11455,7 @@
                   <a16:creationId xmlns:a16="http://schemas.microsoft.com/office/drawing/2014/main" id="{15CEBAD8-9DE5-4790-9CD4-C384EB371D5A}"/>
                 </a:ext>
                 <a:ext uri="{C183D7F6-B498-43B3-948B-1728B52AA6E4}">
-                  <adec:decorative xmlns:adec="http://schemas.microsoft.com/office/drawing/2017/decorative" xmlns="" val="1"/>
+                  <adec:decorative xmlns="" xmlns:adec="http://schemas.microsoft.com/office/drawing/2017/decorative" val="1"/>
                 </a:ext>
               </a:extLst>
             </p:cNvPr>
@@ -11511,7 +11525,7 @@
                 <a16:creationId xmlns:a16="http://schemas.microsoft.com/office/drawing/2014/main" id="{D3B7B9BA-215A-4923-954F-3DAE9523ABEB}"/>
               </a:ext>
               <a:ext uri="{C183D7F6-B498-43B3-948B-1728B52AA6E4}">
-                <adec:decorative xmlns:adec="http://schemas.microsoft.com/office/drawing/2017/decorative" xmlns="" val="1"/>
+                <adec:decorative xmlns="" xmlns:adec="http://schemas.microsoft.com/office/drawing/2017/decorative" val="1"/>
               </a:ext>
             </a:extLst>
           </p:cNvPr>
@@ -11590,7 +11604,7 @@
                 <a16:creationId xmlns:a16="http://schemas.microsoft.com/office/drawing/2014/main" id="{34013081-B23F-45CB-A45B-562B629ADB7B}"/>
               </a:ext>
               <a:ext uri="{C183D7F6-B498-43B3-948B-1728B52AA6E4}">
-                <adec:decorative xmlns:adec="http://schemas.microsoft.com/office/drawing/2017/decorative" xmlns="" val="1"/>
+                <adec:decorative xmlns="" xmlns:adec="http://schemas.microsoft.com/office/drawing/2017/decorative" val="1"/>
               </a:ext>
             </a:extLst>
           </p:cNvPr>
@@ -11621,7 +11635,7 @@
                   <a16:creationId xmlns:a16="http://schemas.microsoft.com/office/drawing/2014/main" id="{4B8B11FB-E867-4638-B75F-B4B7DBDDB723}"/>
                 </a:ext>
                 <a:ext uri="{C183D7F6-B498-43B3-948B-1728B52AA6E4}">
-                  <adec:decorative xmlns:adec="http://schemas.microsoft.com/office/drawing/2017/decorative" xmlns="" val="1"/>
+                  <adec:decorative xmlns="" xmlns:adec="http://schemas.microsoft.com/office/drawing/2017/decorative" val="1"/>
                 </a:ext>
               </a:extLst>
             </p:cNvPr>
@@ -11690,7 +11704,7 @@
                   <a16:creationId xmlns:a16="http://schemas.microsoft.com/office/drawing/2014/main" id="{ABC84FC8-9600-4AE5-9E77-38E2363A3004}"/>
                 </a:ext>
                 <a:ext uri="{C183D7F6-B498-43B3-948B-1728B52AA6E4}">
-                  <adec:decorative xmlns:adec="http://schemas.microsoft.com/office/drawing/2017/decorative" xmlns="" val="1"/>
+                  <adec:decorative xmlns="" xmlns:adec="http://schemas.microsoft.com/office/drawing/2017/decorative" val="1"/>
                 </a:ext>
               </a:extLst>
             </p:cNvPr>
@@ -11759,7 +11773,7 @@
                   <a16:creationId xmlns:a16="http://schemas.microsoft.com/office/drawing/2014/main" id="{3514F95D-50D5-4B76-B347-91D1D76F8F79}"/>
                 </a:ext>
                 <a:ext uri="{C183D7F6-B498-43B3-948B-1728B52AA6E4}">
-                  <adec:decorative xmlns:adec="http://schemas.microsoft.com/office/drawing/2017/decorative" xmlns="" val="1"/>
+                  <adec:decorative xmlns="" xmlns:adec="http://schemas.microsoft.com/office/drawing/2017/decorative" val="1"/>
                 </a:ext>
               </a:extLst>
             </p:cNvPr>
@@ -11828,7 +11842,7 @@
                   <a16:creationId xmlns:a16="http://schemas.microsoft.com/office/drawing/2014/main" id="{885455D4-020C-4462-8A90-3B6434A50809}"/>
                 </a:ext>
                 <a:ext uri="{C183D7F6-B498-43B3-948B-1728B52AA6E4}">
-                  <adec:decorative xmlns:adec="http://schemas.microsoft.com/office/drawing/2017/decorative" xmlns="" val="1"/>
+                  <adec:decorative xmlns="" xmlns:adec="http://schemas.microsoft.com/office/drawing/2017/decorative" val="1"/>
                 </a:ext>
               </a:extLst>
             </p:cNvPr>
@@ -11967,6 +11981,13 @@
   <p:clrMapOvr>
     <a:overrideClrMapping bg1="dk1" tx1="lt1" bg2="dk2" tx2="lt2" accent1="accent1" accent2="accent2" accent3="accent3" accent4="accent4" accent5="accent5" accent6="accent6" hlink="hlink" folHlink="folHlink"/>
   </p:clrMapOvr>
+  <p:timing>
+    <p:tnLst>
+      <p:par>
+        <p:cTn id="1" dur="indefinite" restart="never" nodeType="tmRoot"/>
+      </p:par>
+    </p:tnLst>
+  </p:timing>
 </p:sld>
 </file>
 
@@ -12239,6 +12260,13 @@
   <p:clrMapOvr>
     <a:overrideClrMapping bg1="dk1" tx1="lt1" bg2="dk2" tx2="lt2" accent1="accent1" accent2="accent2" accent3="accent3" accent4="accent4" accent5="accent5" accent6="accent6" hlink="hlink" folHlink="folHlink"/>
   </p:clrMapOvr>
+  <p:timing>
+    <p:tnLst>
+      <p:par>
+        <p:cTn id="1" dur="indefinite" restart="never" nodeType="tmRoot"/>
+      </p:par>
+    </p:tnLst>
+  </p:timing>
 </p:sld>
 </file>
 
@@ -12455,7 +12483,7 @@
                 <a16:creationId xmlns:a16="http://schemas.microsoft.com/office/drawing/2014/main" id="{B497CCB5-5FC2-473C-AFCC-2430CEF1DF71}"/>
               </a:ext>
               <a:ext uri="{C183D7F6-B498-43B3-948B-1728B52AA6E4}">
-                <adec:decorative xmlns:adec="http://schemas.microsoft.com/office/drawing/2017/decorative" xmlns="" val="1"/>
+                <adec:decorative xmlns="" xmlns:adec="http://schemas.microsoft.com/office/drawing/2017/decorative" val="1"/>
               </a:ext>
             </a:extLst>
           </p:cNvPr>
@@ -12518,7 +12546,7 @@
                 <a16:creationId xmlns:a16="http://schemas.microsoft.com/office/drawing/2014/main" id="{599C8C75-BFDF-44E7-A028-EEB5EDD58817}"/>
               </a:ext>
               <a:ext uri="{C183D7F6-B498-43B3-948B-1728B52AA6E4}">
-                <adec:decorative xmlns:adec="http://schemas.microsoft.com/office/drawing/2017/decorative" xmlns="" val="1"/>
+                <adec:decorative xmlns="" xmlns:adec="http://schemas.microsoft.com/office/drawing/2017/decorative" val="1"/>
               </a:ext>
             </a:extLst>
           </p:cNvPr>
@@ -12915,7 +12943,7 @@
                 <a16:creationId xmlns:a16="http://schemas.microsoft.com/office/drawing/2014/main" id="{D7A453D2-15D8-4403-815F-291FA16340D9}"/>
               </a:ext>
               <a:ext uri="{C183D7F6-B498-43B3-948B-1728B52AA6E4}">
-                <adec:decorative xmlns:adec="http://schemas.microsoft.com/office/drawing/2017/decorative" xmlns="" val="1"/>
+                <adec:decorative xmlns="" xmlns:adec="http://schemas.microsoft.com/office/drawing/2017/decorative" val="1"/>
               </a:ext>
             </a:extLst>
           </p:cNvPr>
@@ -12978,7 +13006,7 @@
                 <a16:creationId xmlns:a16="http://schemas.microsoft.com/office/drawing/2014/main" id="{8161EA6B-09CA-445B-AB0D-8DF76FA92DEF}"/>
               </a:ext>
               <a:ext uri="{C183D7F6-B498-43B3-948B-1728B52AA6E4}">
-                <adec:decorative xmlns:adec="http://schemas.microsoft.com/office/drawing/2017/decorative" xmlns="" val="1"/>
+                <adec:decorative xmlns="" xmlns:adec="http://schemas.microsoft.com/office/drawing/2017/decorative" val="1"/>
               </a:ext>
             </a:extLst>
           </p:cNvPr>
@@ -13043,7 +13071,7 @@
                 <a16:creationId xmlns:a16="http://schemas.microsoft.com/office/drawing/2014/main" id="{74E65F23-789E-4CB9-B34F-46A85E25D667}"/>
               </a:ext>
               <a:ext uri="{C183D7F6-B498-43B3-948B-1728B52AA6E4}">
-                <adec:decorative xmlns:adec="http://schemas.microsoft.com/office/drawing/2017/decorative" xmlns="" val="1"/>
+                <adec:decorative xmlns="" xmlns:adec="http://schemas.microsoft.com/office/drawing/2017/decorative" val="1"/>
               </a:ext>
             </a:extLst>
           </p:cNvPr>
@@ -13074,7 +13102,7 @@
                   <a16:creationId xmlns:a16="http://schemas.microsoft.com/office/drawing/2014/main" id="{1CA207F7-3B67-4EA2-8EC5-1260B55A07F4}"/>
                 </a:ext>
                 <a:ext uri="{C183D7F6-B498-43B3-948B-1728B52AA6E4}">
-                  <adec:decorative xmlns:adec="http://schemas.microsoft.com/office/drawing/2017/decorative" xmlns="" val="1"/>
+                  <adec:decorative xmlns="" xmlns:adec="http://schemas.microsoft.com/office/drawing/2017/decorative" val="1"/>
                 </a:ext>
               </a:extLst>
             </p:cNvPr>
@@ -13151,7 +13179,7 @@
                   <a16:creationId xmlns:a16="http://schemas.microsoft.com/office/drawing/2014/main" id="{AD4CC450-51C3-4A41-B2B1-68A15D57C5E6}"/>
                 </a:ext>
                 <a:ext uri="{C183D7F6-B498-43B3-948B-1728B52AA6E4}">
-                  <adec:decorative xmlns:adec="http://schemas.microsoft.com/office/drawing/2017/decorative" xmlns="" val="1"/>
+                  <adec:decorative xmlns="" xmlns:adec="http://schemas.microsoft.com/office/drawing/2017/decorative" val="1"/>
                 </a:ext>
               </a:extLst>
             </p:cNvPr>
@@ -13228,7 +13256,7 @@
                   <a16:creationId xmlns:a16="http://schemas.microsoft.com/office/drawing/2014/main" id="{ED62506D-F8E8-4C55-B160-D4FE8985049B}"/>
                 </a:ext>
                 <a:ext uri="{C183D7F6-B498-43B3-948B-1728B52AA6E4}">
-                  <adec:decorative xmlns:adec="http://schemas.microsoft.com/office/drawing/2017/decorative" xmlns="" val="1"/>
+                  <adec:decorative xmlns="" xmlns:adec="http://schemas.microsoft.com/office/drawing/2017/decorative" val="1"/>
                 </a:ext>
               </a:extLst>
             </p:cNvPr>
@@ -13303,7 +13331,7 @@
                   <a16:creationId xmlns:a16="http://schemas.microsoft.com/office/drawing/2014/main" id="{E6004793-0083-43B9-81A2-20F71D2C7D95}"/>
                 </a:ext>
                 <a:ext uri="{C183D7F6-B498-43B3-948B-1728B52AA6E4}">
-                  <adec:decorative xmlns:adec="http://schemas.microsoft.com/office/drawing/2017/decorative" xmlns="" val="1"/>
+                  <adec:decorative xmlns="" xmlns:adec="http://schemas.microsoft.com/office/drawing/2017/decorative" val="1"/>
                 </a:ext>
               </a:extLst>
             </p:cNvPr>
@@ -13378,7 +13406,7 @@
                   <a16:creationId xmlns:a16="http://schemas.microsoft.com/office/drawing/2014/main" id="{53D192AA-AFCB-470F-B66A-18815C3525CD}"/>
                 </a:ext>
                 <a:ext uri="{C183D7F6-B498-43B3-948B-1728B52AA6E4}">
-                  <adec:decorative xmlns:adec="http://schemas.microsoft.com/office/drawing/2017/decorative" xmlns="" val="1"/>
+                  <adec:decorative xmlns="" xmlns:adec="http://schemas.microsoft.com/office/drawing/2017/decorative" val="1"/>
                 </a:ext>
               </a:extLst>
             </p:cNvPr>
@@ -13455,7 +13483,7 @@
                   <a16:creationId xmlns:a16="http://schemas.microsoft.com/office/drawing/2014/main" id="{9079B0CF-0B4C-42A9-9769-3AC0A34FACEF}"/>
                 </a:ext>
                 <a:ext uri="{C183D7F6-B498-43B3-948B-1728B52AA6E4}">
-                  <adec:decorative xmlns:adec="http://schemas.microsoft.com/office/drawing/2017/decorative" xmlns="" val="1"/>
+                  <adec:decorative xmlns="" xmlns:adec="http://schemas.microsoft.com/office/drawing/2017/decorative" val="1"/>
                 </a:ext>
               </a:extLst>
             </p:cNvPr>
@@ -13543,7 +13571,7 @@
         <p:spPr>
           <a:xfrm>
             <a:off x="630936" y="630936"/>
-            <a:ext cx="5260992" cy="2096756"/>
+            <a:ext cx="7973418" cy="2096756"/>
           </a:xfrm>
           <a:noFill/>
         </p:spPr>
@@ -13554,13 +13582,26 @@
           <a:lstStyle/>
           <a:p>
             <a:r>
-              <a:rPr lang="de-DE" sz="4800">
+              <a:rPr lang="de-DE" sz="4800" dirty="0">
                 <a:solidFill>
                   <a:schemeClr val="bg1"/>
                 </a:solidFill>
               </a:rPr>
-              <a:t>Design - Musik</a:t>
+              <a:t>Design </a:t>
             </a:r>
+            <a:r>
+              <a:rPr lang="de-DE" sz="4800" dirty="0" smtClean="0">
+                <a:solidFill>
+                  <a:schemeClr val="bg1"/>
+                </a:solidFill>
+              </a:rPr>
+              <a:t>– Musik + Soundeffekte</a:t>
+            </a:r>
+            <a:endParaRPr lang="de-DE" sz="4800" dirty="0">
+              <a:solidFill>
+                <a:schemeClr val="bg1"/>
+              </a:solidFill>
+            </a:endParaRPr>
           </a:p>
         </p:txBody>
       </p:sp>
@@ -13625,7 +13666,7 @@
                 <a16:creationId xmlns:a16="http://schemas.microsoft.com/office/drawing/2014/main" id="{B8114C98-A349-4111-A123-E8EAB86ABE30}"/>
               </a:ext>
               <a:ext uri="{C183D7F6-B498-43B3-948B-1728B52AA6E4}">
-                <adec:decorative xmlns:adec="http://schemas.microsoft.com/office/drawing/2017/decorative" xmlns="" val="1"/>
+                <adec:decorative xmlns="" xmlns:adec="http://schemas.microsoft.com/office/drawing/2017/decorative" val="1"/>
               </a:ext>
             </a:extLst>
           </p:cNvPr>
@@ -13704,7 +13745,7 @@
                 <a16:creationId xmlns:a16="http://schemas.microsoft.com/office/drawing/2014/main" id="{670FB431-AE18-414D-92F4-1D12D1991152}"/>
               </a:ext>
               <a:ext uri="{C183D7F6-B498-43B3-948B-1728B52AA6E4}">
-                <adec:decorative xmlns:adec="http://schemas.microsoft.com/office/drawing/2017/decorative" xmlns="" val="1"/>
+                <adec:decorative xmlns="" xmlns:adec="http://schemas.microsoft.com/office/drawing/2017/decorative" val="1"/>
               </a:ext>
             </a:extLst>
           </p:cNvPr>
@@ -13735,7 +13776,7 @@
                   <a16:creationId xmlns:a16="http://schemas.microsoft.com/office/drawing/2014/main" id="{24467063-D74E-4D42-8790-B9F6D69584BE}"/>
                 </a:ext>
                 <a:ext uri="{C183D7F6-B498-43B3-948B-1728B52AA6E4}">
-                  <adec:decorative xmlns:adec="http://schemas.microsoft.com/office/drawing/2017/decorative" xmlns="" val="1"/>
+                  <adec:decorative xmlns="" xmlns:adec="http://schemas.microsoft.com/office/drawing/2017/decorative" val="1"/>
                 </a:ext>
               </a:extLst>
             </p:cNvPr>
@@ -13804,7 +13845,7 @@
                   <a16:creationId xmlns:a16="http://schemas.microsoft.com/office/drawing/2014/main" id="{A1D19BAC-1681-47BC-AAF5-92FAFFF6F4CE}"/>
                 </a:ext>
                 <a:ext uri="{C183D7F6-B498-43B3-948B-1728B52AA6E4}">
-                  <adec:decorative xmlns:adec="http://schemas.microsoft.com/office/drawing/2017/decorative" xmlns="" val="1"/>
+                  <adec:decorative xmlns="" xmlns:adec="http://schemas.microsoft.com/office/drawing/2017/decorative" val="1"/>
                 </a:ext>
               </a:extLst>
             </p:cNvPr>
@@ -13873,7 +13914,7 @@
                   <a16:creationId xmlns:a16="http://schemas.microsoft.com/office/drawing/2014/main" id="{94347C2B-E846-452C-97AA-7E254FC1CE8F}"/>
                 </a:ext>
                 <a:ext uri="{C183D7F6-B498-43B3-948B-1728B52AA6E4}">
-                  <adec:decorative xmlns:adec="http://schemas.microsoft.com/office/drawing/2017/decorative" xmlns="" val="1"/>
+                  <adec:decorative xmlns="" xmlns:adec="http://schemas.microsoft.com/office/drawing/2017/decorative" val="1"/>
                 </a:ext>
               </a:extLst>
             </p:cNvPr>
@@ -13942,7 +13983,7 @@
                   <a16:creationId xmlns:a16="http://schemas.microsoft.com/office/drawing/2014/main" id="{10EA2B35-7959-4C2A-84AA-FF5D94FEDE90}"/>
                 </a:ext>
                 <a:ext uri="{C183D7F6-B498-43B3-948B-1728B52AA6E4}">
-                  <adec:decorative xmlns:adec="http://schemas.microsoft.com/office/drawing/2017/decorative" xmlns="" val="1"/>
+                  <adec:decorative xmlns="" xmlns:adec="http://schemas.microsoft.com/office/drawing/2017/decorative" val="1"/>
                 </a:ext>
               </a:extLst>
             </p:cNvPr>
@@ -14012,7 +14053,7 @@
                 <a16:creationId xmlns:a16="http://schemas.microsoft.com/office/drawing/2014/main" id="{E2D3D3F2-ABBB-4453-B1C5-1BEBF7E4DD56}"/>
               </a:ext>
               <a:ext uri="{C183D7F6-B498-43B3-948B-1728B52AA6E4}">
-                <adec:decorative xmlns:adec="http://schemas.microsoft.com/office/drawing/2017/decorative" xmlns="" val="1"/>
+                <adec:decorative xmlns="" xmlns:adec="http://schemas.microsoft.com/office/drawing/2017/decorative" val="1"/>
               </a:ext>
             </a:extLst>
           </p:cNvPr>
@@ -14091,7 +14132,7 @@
                 <a16:creationId xmlns:a16="http://schemas.microsoft.com/office/drawing/2014/main" id="{8214E4A5-A0D2-42C4-8D14-D2A7E495F041}"/>
               </a:ext>
               <a:ext uri="{C183D7F6-B498-43B3-948B-1728B52AA6E4}">
-                <adec:decorative xmlns:adec="http://schemas.microsoft.com/office/drawing/2017/decorative" xmlns="" val="1"/>
+                <adec:decorative xmlns="" xmlns:adec="http://schemas.microsoft.com/office/drawing/2017/decorative" val="1"/>
               </a:ext>
             </a:extLst>
           </p:cNvPr>
@@ -14122,7 +14163,7 @@
                   <a16:creationId xmlns:a16="http://schemas.microsoft.com/office/drawing/2014/main" id="{7494D7A0-6B21-41E8-A7D3-0033BBB79156}"/>
                 </a:ext>
                 <a:ext uri="{C183D7F6-B498-43B3-948B-1728B52AA6E4}">
-                  <adec:decorative xmlns:adec="http://schemas.microsoft.com/office/drawing/2017/decorative" xmlns="" val="1"/>
+                  <adec:decorative xmlns="" xmlns:adec="http://schemas.microsoft.com/office/drawing/2017/decorative" val="1"/>
                 </a:ext>
               </a:extLst>
             </p:cNvPr>
@@ -14191,7 +14232,7 @@
                   <a16:creationId xmlns:a16="http://schemas.microsoft.com/office/drawing/2014/main" id="{1E141D7D-32B0-448E-A666-EA8703AFCF2C}"/>
                 </a:ext>
                 <a:ext uri="{C183D7F6-B498-43B3-948B-1728B52AA6E4}">
-                  <adec:decorative xmlns:adec="http://schemas.microsoft.com/office/drawing/2017/decorative" xmlns="" val="1"/>
+                  <adec:decorative xmlns="" xmlns:adec="http://schemas.microsoft.com/office/drawing/2017/decorative" val="1"/>
                 </a:ext>
               </a:extLst>
             </p:cNvPr>
@@ -14260,7 +14301,7 @@
                   <a16:creationId xmlns:a16="http://schemas.microsoft.com/office/drawing/2014/main" id="{8D87E268-6345-420F-8B97-B37ED04100EC}"/>
                 </a:ext>
                 <a:ext uri="{C183D7F6-B498-43B3-948B-1728B52AA6E4}">
-                  <adec:decorative xmlns:adec="http://schemas.microsoft.com/office/drawing/2017/decorative" xmlns="" val="1"/>
+                  <adec:decorative xmlns="" xmlns:adec="http://schemas.microsoft.com/office/drawing/2017/decorative" val="1"/>
                 </a:ext>
               </a:extLst>
             </p:cNvPr>
@@ -14329,7 +14370,7 @@
                   <a16:creationId xmlns:a16="http://schemas.microsoft.com/office/drawing/2014/main" id="{35E1622E-7FA6-4760-A2BF-A8105EBF7BB9}"/>
                 </a:ext>
                 <a:ext uri="{C183D7F6-B498-43B3-948B-1728B52AA6E4}">
-                  <adec:decorative xmlns:adec="http://schemas.microsoft.com/office/drawing/2017/decorative" xmlns="" val="1"/>
+                  <adec:decorative xmlns="" xmlns:adec="http://schemas.microsoft.com/office/drawing/2017/decorative" val="1"/>
                 </a:ext>
               </a:extLst>
             </p:cNvPr>
@@ -14445,7 +14486,7 @@
                 <a16:creationId xmlns:a16="http://schemas.microsoft.com/office/drawing/2014/main" id="{4043ADFC-DC2E-40D2-954D-4A13B908DA80}"/>
               </a:ext>
               <a:ext uri="{C183D7F6-B498-43B3-948B-1728B52AA6E4}">
-                <adec:decorative xmlns:adec="http://schemas.microsoft.com/office/drawing/2017/decorative" xmlns="" val="1"/>
+                <adec:decorative xmlns="" xmlns:adec="http://schemas.microsoft.com/office/drawing/2017/decorative" val="1"/>
               </a:ext>
             </a:extLst>
           </p:cNvPr>
@@ -14476,7 +14517,7 @@
                   <a16:creationId xmlns:a16="http://schemas.microsoft.com/office/drawing/2014/main" id="{C975E7D3-10F5-4E53-902F-9E79C98C22DE}"/>
                 </a:ext>
                 <a:ext uri="{C183D7F6-B498-43B3-948B-1728B52AA6E4}">
-                  <adec:decorative xmlns:adec="http://schemas.microsoft.com/office/drawing/2017/decorative" xmlns="" val="1"/>
+                  <adec:decorative xmlns="" xmlns:adec="http://schemas.microsoft.com/office/drawing/2017/decorative" val="1"/>
                 </a:ext>
               </a:extLst>
             </p:cNvPr>
@@ -14533,7 +14574,7 @@
                   <a16:creationId xmlns:a16="http://schemas.microsoft.com/office/drawing/2014/main" id="{BDC51AAB-5A3B-4730-B8AC-46C96AC0B692}"/>
                 </a:ext>
                 <a:ext uri="{C183D7F6-B498-43B3-948B-1728B52AA6E4}">
-                  <adec:decorative xmlns:adec="http://schemas.microsoft.com/office/drawing/2017/decorative" xmlns="" val="1"/>
+                  <adec:decorative xmlns="" xmlns:adec="http://schemas.microsoft.com/office/drawing/2017/decorative" val="1"/>
                 </a:ext>
               </a:extLst>
             </p:cNvPr>
@@ -14590,7 +14631,7 @@
                   <a16:creationId xmlns:a16="http://schemas.microsoft.com/office/drawing/2014/main" id="{03A6F2D9-1476-4E35-988D-D4CCB15C8D6D}"/>
                 </a:ext>
                 <a:ext uri="{C183D7F6-B498-43B3-948B-1728B52AA6E4}">
-                  <adec:decorative xmlns:adec="http://schemas.microsoft.com/office/drawing/2017/decorative" xmlns="" val="1"/>
+                  <adec:decorative xmlns="" xmlns:adec="http://schemas.microsoft.com/office/drawing/2017/decorative" val="1"/>
                 </a:ext>
               </a:extLst>
             </p:cNvPr>
@@ -14647,7 +14688,7 @@
                   <a16:creationId xmlns:a16="http://schemas.microsoft.com/office/drawing/2014/main" id="{CE17F678-D5C6-49BF-933D-1E65F69B3256}"/>
                 </a:ext>
                 <a:ext uri="{C183D7F6-B498-43B3-948B-1728B52AA6E4}">
-                  <adec:decorative xmlns:adec="http://schemas.microsoft.com/office/drawing/2017/decorative" xmlns="" val="1"/>
+                  <adec:decorative xmlns="" xmlns:adec="http://schemas.microsoft.com/office/drawing/2017/decorative" val="1"/>
                 </a:ext>
               </a:extLst>
             </p:cNvPr>
@@ -14707,6 +14748,13 @@
   <p:clrMapOvr>
     <a:masterClrMapping/>
   </p:clrMapOvr>
+  <p:timing>
+    <p:tnLst>
+      <p:par>
+        <p:cTn id="1" dur="indefinite" restart="never" nodeType="tmRoot"/>
+      </p:par>
+    </p:tnLst>
+  </p:timing>
 </p:sld>
 </file>
 
@@ -14743,7 +14791,7 @@
                 <a16:creationId xmlns:a16="http://schemas.microsoft.com/office/drawing/2014/main" id="{D7A453D2-15D8-4403-815F-291FA16340D9}"/>
               </a:ext>
               <a:ext uri="{C183D7F6-B498-43B3-948B-1728B52AA6E4}">
-                <adec:decorative xmlns:adec="http://schemas.microsoft.com/office/drawing/2017/decorative" xmlns="" val="1"/>
+                <adec:decorative xmlns="" xmlns:adec="http://schemas.microsoft.com/office/drawing/2017/decorative" val="1"/>
               </a:ext>
             </a:extLst>
           </p:cNvPr>
@@ -14806,7 +14854,7 @@
                 <a16:creationId xmlns:a16="http://schemas.microsoft.com/office/drawing/2014/main" id="{8161EA6B-09CA-445B-AB0D-8DF76FA92DEF}"/>
               </a:ext>
               <a:ext uri="{C183D7F6-B498-43B3-948B-1728B52AA6E4}">
-                <adec:decorative xmlns:adec="http://schemas.microsoft.com/office/drawing/2017/decorative" xmlns="" val="1"/>
+                <adec:decorative xmlns="" xmlns:adec="http://schemas.microsoft.com/office/drawing/2017/decorative" val="1"/>
               </a:ext>
             </a:extLst>
           </p:cNvPr>
@@ -14871,7 +14919,7 @@
                 <a16:creationId xmlns:a16="http://schemas.microsoft.com/office/drawing/2014/main" id="{B352BBB9-69A8-405C-9209-A9FE217AEDC4}"/>
               </a:ext>
               <a:ext uri="{C183D7F6-B498-43B3-948B-1728B52AA6E4}">
-                <adec:decorative xmlns:adec="http://schemas.microsoft.com/office/drawing/2017/decorative" xmlns="" val="1"/>
+                <adec:decorative xmlns="" xmlns:adec="http://schemas.microsoft.com/office/drawing/2017/decorative" val="1"/>
               </a:ext>
             </a:extLst>
           </p:cNvPr>
@@ -14902,7 +14950,7 @@
                   <a16:creationId xmlns:a16="http://schemas.microsoft.com/office/drawing/2014/main" id="{2BA8247A-9874-4F57-82F4-AEB016E661EA}"/>
                 </a:ext>
                 <a:ext uri="{C183D7F6-B498-43B3-948B-1728B52AA6E4}">
-                  <adec:decorative xmlns:adec="http://schemas.microsoft.com/office/drawing/2017/decorative" xmlns="" val="1"/>
+                  <adec:decorative xmlns="" xmlns:adec="http://schemas.microsoft.com/office/drawing/2017/decorative" val="1"/>
                 </a:ext>
               </a:extLst>
             </p:cNvPr>
@@ -14979,7 +15027,7 @@
                   <a16:creationId xmlns:a16="http://schemas.microsoft.com/office/drawing/2014/main" id="{A30C3CE4-8479-4B6E-9C21-D7B0CD89EF8E}"/>
                 </a:ext>
                 <a:ext uri="{C183D7F6-B498-43B3-948B-1728B52AA6E4}">
-                  <adec:decorative xmlns:adec="http://schemas.microsoft.com/office/drawing/2017/decorative" xmlns="" val="1"/>
+                  <adec:decorative xmlns="" xmlns:adec="http://schemas.microsoft.com/office/drawing/2017/decorative" val="1"/>
                 </a:ext>
               </a:extLst>
             </p:cNvPr>
@@ -15056,7 +15104,7 @@
                   <a16:creationId xmlns:a16="http://schemas.microsoft.com/office/drawing/2014/main" id="{F7BCD297-22FC-4ECD-95DC-8581D5E6B141}"/>
                 </a:ext>
                 <a:ext uri="{C183D7F6-B498-43B3-948B-1728B52AA6E4}">
-                  <adec:decorative xmlns:adec="http://schemas.microsoft.com/office/drawing/2017/decorative" xmlns="" val="1"/>
+                  <adec:decorative xmlns="" xmlns:adec="http://schemas.microsoft.com/office/drawing/2017/decorative" val="1"/>
                 </a:ext>
               </a:extLst>
             </p:cNvPr>
@@ -15131,7 +15179,7 @@
                   <a16:creationId xmlns:a16="http://schemas.microsoft.com/office/drawing/2014/main" id="{061A25F1-8873-4D98-B8D5-169EA0AC9212}"/>
                 </a:ext>
                 <a:ext uri="{C183D7F6-B498-43B3-948B-1728B52AA6E4}">
-                  <adec:decorative xmlns:adec="http://schemas.microsoft.com/office/drawing/2017/decorative" xmlns="" val="1"/>
+                  <adec:decorative xmlns="" xmlns:adec="http://schemas.microsoft.com/office/drawing/2017/decorative" val="1"/>
                 </a:ext>
               </a:extLst>
             </p:cNvPr>
@@ -15206,7 +15254,7 @@
                   <a16:creationId xmlns:a16="http://schemas.microsoft.com/office/drawing/2014/main" id="{CB7BCAD9-3EF1-4FCE-AFA0-BD2C545A735B}"/>
                 </a:ext>
                 <a:ext uri="{C183D7F6-B498-43B3-948B-1728B52AA6E4}">
-                  <adec:decorative xmlns:adec="http://schemas.microsoft.com/office/drawing/2017/decorative" xmlns="" val="1"/>
+                  <adec:decorative xmlns="" xmlns:adec="http://schemas.microsoft.com/office/drawing/2017/decorative" val="1"/>
                 </a:ext>
               </a:extLst>
             </p:cNvPr>
@@ -15283,7 +15331,7 @@
                   <a16:creationId xmlns:a16="http://schemas.microsoft.com/office/drawing/2014/main" id="{36649524-3638-4334-8ED6-539D10DF4BCC}"/>
                 </a:ext>
                 <a:ext uri="{C183D7F6-B498-43B3-948B-1728B52AA6E4}">
-                  <adec:decorative xmlns:adec="http://schemas.microsoft.com/office/drawing/2017/decorative" xmlns="" val="1"/>
+                  <adec:decorative xmlns="" xmlns:adec="http://schemas.microsoft.com/office/drawing/2017/decorative" val="1"/>
                 </a:ext>
               </a:extLst>
             </p:cNvPr>
@@ -15422,7 +15470,7 @@
           <a:lstStyle/>
           <a:p>
             <a:r>
-              <a:rPr lang="de-DE" sz="1800">
+              <a:rPr lang="de-DE" sz="1800" dirty="0">
                 <a:solidFill>
                   <a:schemeClr val="bg1"/>
                 </a:solidFill>
@@ -15432,16 +15480,61 @@
           </a:p>
           <a:p>
             <a:r>
-              <a:rPr lang="de-DE" sz="1800">
+              <a:rPr lang="de-DE" sz="1800" dirty="0" err="1" smtClean="0">
                 <a:solidFill>
                   <a:schemeClr val="bg1"/>
                 </a:solidFill>
               </a:rPr>
-              <a:t>Libgdx für Collisions und Physics</a:t>
+              <a:t>LibGDX</a:t>
             </a:r>
+            <a:r>
+              <a:rPr lang="de-DE" sz="1800" dirty="0" smtClean="0">
+                <a:solidFill>
+                  <a:schemeClr val="bg1"/>
+                </a:solidFill>
+              </a:rPr>
+              <a:t> </a:t>
+            </a:r>
+            <a:r>
+              <a:rPr lang="de-DE" sz="1800" dirty="0">
+                <a:solidFill>
+                  <a:schemeClr val="bg1"/>
+                </a:solidFill>
+              </a:rPr>
+              <a:t>für </a:t>
+            </a:r>
+            <a:r>
+              <a:rPr lang="de-DE" sz="1800" dirty="0" err="1">
+                <a:solidFill>
+                  <a:schemeClr val="bg1"/>
+                </a:solidFill>
+              </a:rPr>
+              <a:t>Collisions</a:t>
+            </a:r>
+            <a:r>
+              <a:rPr lang="de-DE" sz="1800" dirty="0">
+                <a:solidFill>
+                  <a:schemeClr val="bg1"/>
+                </a:solidFill>
+              </a:rPr>
+              <a:t> und </a:t>
+            </a:r>
+            <a:r>
+              <a:rPr lang="de-DE" sz="1800" dirty="0" err="1">
+                <a:solidFill>
+                  <a:schemeClr val="bg1"/>
+                </a:solidFill>
+              </a:rPr>
+              <a:t>Physics</a:t>
+            </a:r>
+            <a:endParaRPr lang="de-DE" sz="1800" dirty="0">
+              <a:solidFill>
+                <a:schemeClr val="bg1"/>
+              </a:solidFill>
+            </a:endParaRPr>
           </a:p>
           <a:p>
-            <a:endParaRPr lang="de-DE" sz="1800">
+            <a:endParaRPr lang="de-DE" sz="1800" dirty="0">
               <a:solidFill>
                 <a:schemeClr val="bg1"/>
               </a:solidFill>
@@ -15457,7 +15550,7 @@
                 <a16:creationId xmlns:a16="http://schemas.microsoft.com/office/drawing/2014/main" id="{B8114C98-A349-4111-A123-E8EAB86ABE30}"/>
               </a:ext>
               <a:ext uri="{C183D7F6-B498-43B3-948B-1728B52AA6E4}">
-                <adec:decorative xmlns:adec="http://schemas.microsoft.com/office/drawing/2017/decorative" xmlns="" val="1"/>
+                <adec:decorative xmlns="" xmlns:adec="http://schemas.microsoft.com/office/drawing/2017/decorative" val="1"/>
               </a:ext>
             </a:extLst>
           </p:cNvPr>
@@ -15536,7 +15629,7 @@
                 <a16:creationId xmlns:a16="http://schemas.microsoft.com/office/drawing/2014/main" id="{670FB431-AE18-414D-92F4-1D12D1991152}"/>
               </a:ext>
               <a:ext uri="{C183D7F6-B498-43B3-948B-1728B52AA6E4}">
-                <adec:decorative xmlns:adec="http://schemas.microsoft.com/office/drawing/2017/decorative" xmlns="" val="1"/>
+                <adec:decorative xmlns="" xmlns:adec="http://schemas.microsoft.com/office/drawing/2017/decorative" val="1"/>
               </a:ext>
             </a:extLst>
           </p:cNvPr>
@@ -15567,7 +15660,7 @@
                   <a16:creationId xmlns:a16="http://schemas.microsoft.com/office/drawing/2014/main" id="{24467063-D74E-4D42-8790-B9F6D69584BE}"/>
                 </a:ext>
                 <a:ext uri="{C183D7F6-B498-43B3-948B-1728B52AA6E4}">
-                  <adec:decorative xmlns:adec="http://schemas.microsoft.com/office/drawing/2017/decorative" xmlns="" val="1"/>
+                  <adec:decorative xmlns="" xmlns:adec="http://schemas.microsoft.com/office/drawing/2017/decorative" val="1"/>
                 </a:ext>
               </a:extLst>
             </p:cNvPr>
@@ -15636,7 +15729,7 @@
                   <a16:creationId xmlns:a16="http://schemas.microsoft.com/office/drawing/2014/main" id="{A1D19BAC-1681-47BC-AAF5-92FAFFF6F4CE}"/>
                 </a:ext>
                 <a:ext uri="{C183D7F6-B498-43B3-948B-1728B52AA6E4}">
-                  <adec:decorative xmlns:adec="http://schemas.microsoft.com/office/drawing/2017/decorative" xmlns="" val="1"/>
+                  <adec:decorative xmlns="" xmlns:adec="http://schemas.microsoft.com/office/drawing/2017/decorative" val="1"/>
                 </a:ext>
               </a:extLst>
             </p:cNvPr>
@@ -15705,7 +15798,7 @@
                   <a16:creationId xmlns:a16="http://schemas.microsoft.com/office/drawing/2014/main" id="{94347C2B-E846-452C-97AA-7E254FC1CE8F}"/>
                 </a:ext>
                 <a:ext uri="{C183D7F6-B498-43B3-948B-1728B52AA6E4}">
-                  <adec:decorative xmlns:adec="http://schemas.microsoft.com/office/drawing/2017/decorative" xmlns="" val="1"/>
+                  <adec:decorative xmlns="" xmlns:adec="http://schemas.microsoft.com/office/drawing/2017/decorative" val="1"/>
                 </a:ext>
               </a:extLst>
             </p:cNvPr>
@@ -15774,7 +15867,7 @@
                   <a16:creationId xmlns:a16="http://schemas.microsoft.com/office/drawing/2014/main" id="{10EA2B35-7959-4C2A-84AA-FF5D94FEDE90}"/>
                 </a:ext>
                 <a:ext uri="{C183D7F6-B498-43B3-948B-1728B52AA6E4}">
-                  <adec:decorative xmlns:adec="http://schemas.microsoft.com/office/drawing/2017/decorative" xmlns="" val="1"/>
+                  <adec:decorative xmlns="" xmlns:adec="http://schemas.microsoft.com/office/drawing/2017/decorative" val="1"/>
                 </a:ext>
               </a:extLst>
             </p:cNvPr>
@@ -15844,7 +15937,7 @@
                 <a16:creationId xmlns:a16="http://schemas.microsoft.com/office/drawing/2014/main" id="{E2D3D3F2-ABBB-4453-B1C5-1BEBF7E4DD56}"/>
               </a:ext>
               <a:ext uri="{C183D7F6-B498-43B3-948B-1728B52AA6E4}">
-                <adec:decorative xmlns:adec="http://schemas.microsoft.com/office/drawing/2017/decorative" xmlns="" val="1"/>
+                <adec:decorative xmlns="" xmlns:adec="http://schemas.microsoft.com/office/drawing/2017/decorative" val="1"/>
               </a:ext>
             </a:extLst>
           </p:cNvPr>
@@ -15923,7 +16016,7 @@
                 <a16:creationId xmlns:a16="http://schemas.microsoft.com/office/drawing/2014/main" id="{8214E4A5-A0D2-42C4-8D14-D2A7E495F041}"/>
               </a:ext>
               <a:ext uri="{C183D7F6-B498-43B3-948B-1728B52AA6E4}">
-                <adec:decorative xmlns:adec="http://schemas.microsoft.com/office/drawing/2017/decorative" xmlns="" val="1"/>
+                <adec:decorative xmlns="" xmlns:adec="http://schemas.microsoft.com/office/drawing/2017/decorative" val="1"/>
               </a:ext>
             </a:extLst>
           </p:cNvPr>
@@ -15954,7 +16047,7 @@
                   <a16:creationId xmlns:a16="http://schemas.microsoft.com/office/drawing/2014/main" id="{7494D7A0-6B21-41E8-A7D3-0033BBB79156}"/>
                 </a:ext>
                 <a:ext uri="{C183D7F6-B498-43B3-948B-1728B52AA6E4}">
-                  <adec:decorative xmlns:adec="http://schemas.microsoft.com/office/drawing/2017/decorative" xmlns="" val="1"/>
+                  <adec:decorative xmlns="" xmlns:adec="http://schemas.microsoft.com/office/drawing/2017/decorative" val="1"/>
                 </a:ext>
               </a:extLst>
             </p:cNvPr>
@@ -16023,7 +16116,7 @@
                   <a16:creationId xmlns:a16="http://schemas.microsoft.com/office/drawing/2014/main" id="{1E141D7D-32B0-448E-A666-EA8703AFCF2C}"/>
                 </a:ext>
                 <a:ext uri="{C183D7F6-B498-43B3-948B-1728B52AA6E4}">
-                  <adec:decorative xmlns:adec="http://schemas.microsoft.com/office/drawing/2017/decorative" xmlns="" val="1"/>
+                  <adec:decorative xmlns="" xmlns:adec="http://schemas.microsoft.com/office/drawing/2017/decorative" val="1"/>
                 </a:ext>
               </a:extLst>
             </p:cNvPr>
@@ -16092,7 +16185,7 @@
                   <a16:creationId xmlns:a16="http://schemas.microsoft.com/office/drawing/2014/main" id="{8D87E268-6345-420F-8B97-B37ED04100EC}"/>
                 </a:ext>
                 <a:ext uri="{C183D7F6-B498-43B3-948B-1728B52AA6E4}">
-                  <adec:decorative xmlns:adec="http://schemas.microsoft.com/office/drawing/2017/decorative" xmlns="" val="1"/>
+                  <adec:decorative xmlns="" xmlns:adec="http://schemas.microsoft.com/office/drawing/2017/decorative" val="1"/>
                 </a:ext>
               </a:extLst>
             </p:cNvPr>
@@ -16161,7 +16254,7 @@
                   <a16:creationId xmlns:a16="http://schemas.microsoft.com/office/drawing/2014/main" id="{35E1622E-7FA6-4760-A2BF-A8105EBF7BB9}"/>
                 </a:ext>
                 <a:ext uri="{C183D7F6-B498-43B3-948B-1728B52AA6E4}">
-                  <adec:decorative xmlns:adec="http://schemas.microsoft.com/office/drawing/2017/decorative" xmlns="" val="1"/>
+                  <adec:decorative xmlns="" xmlns:adec="http://schemas.microsoft.com/office/drawing/2017/decorative" val="1"/>
                 </a:ext>
               </a:extLst>
             </p:cNvPr>
@@ -16276,7 +16369,7 @@
                 <a16:creationId xmlns:a16="http://schemas.microsoft.com/office/drawing/2014/main" id="{AF19A774-30A5-488B-9BAF-629C6440294E}"/>
               </a:ext>
               <a:ext uri="{C183D7F6-B498-43B3-948B-1728B52AA6E4}">
-                <adec:decorative xmlns:adec="http://schemas.microsoft.com/office/drawing/2017/decorative" xmlns="" val="1"/>
+                <adec:decorative xmlns="" xmlns:adec="http://schemas.microsoft.com/office/drawing/2017/decorative" val="1"/>
               </a:ext>
             </a:extLst>
           </p:cNvPr>
@@ -16307,7 +16400,7 @@
                   <a16:creationId xmlns:a16="http://schemas.microsoft.com/office/drawing/2014/main" id="{291EBF88-5B98-4258-A542-14C3AF2E5225}"/>
                 </a:ext>
                 <a:ext uri="{C183D7F6-B498-43B3-948B-1728B52AA6E4}">
-                  <adec:decorative xmlns:adec="http://schemas.microsoft.com/office/drawing/2017/decorative" xmlns="" val="1"/>
+                  <adec:decorative xmlns="" xmlns:adec="http://schemas.microsoft.com/office/drawing/2017/decorative" val="1"/>
                 </a:ext>
               </a:extLst>
             </p:cNvPr>
@@ -16364,7 +16457,7 @@
                   <a16:creationId xmlns:a16="http://schemas.microsoft.com/office/drawing/2014/main" id="{8FBC2D58-9E3C-490D-BD7A-61EF07EA79E4}"/>
                 </a:ext>
                 <a:ext uri="{C183D7F6-B498-43B3-948B-1728B52AA6E4}">
-                  <adec:decorative xmlns:adec="http://schemas.microsoft.com/office/drawing/2017/decorative" xmlns="" val="1"/>
+                  <adec:decorative xmlns="" xmlns:adec="http://schemas.microsoft.com/office/drawing/2017/decorative" val="1"/>
                 </a:ext>
               </a:extLst>
             </p:cNvPr>
@@ -16421,7 +16514,7 @@
                   <a16:creationId xmlns:a16="http://schemas.microsoft.com/office/drawing/2014/main" id="{B6CF1BB4-1C1D-4EDE-BA26-0243FCF83BB9}"/>
                 </a:ext>
                 <a:ext uri="{C183D7F6-B498-43B3-948B-1728B52AA6E4}">
-                  <adec:decorative xmlns:adec="http://schemas.microsoft.com/office/drawing/2017/decorative" xmlns="" val="1"/>
+                  <adec:decorative xmlns="" xmlns:adec="http://schemas.microsoft.com/office/drawing/2017/decorative" val="1"/>
                 </a:ext>
               </a:extLst>
             </p:cNvPr>
@@ -16478,7 +16571,7 @@
                   <a16:creationId xmlns:a16="http://schemas.microsoft.com/office/drawing/2014/main" id="{00C83729-E02F-4512-AFE7-F4792228BDA2}"/>
                 </a:ext>
                 <a:ext uri="{C183D7F6-B498-43B3-948B-1728B52AA6E4}">
-                  <adec:decorative xmlns:adec="http://schemas.microsoft.com/office/drawing/2017/decorative" xmlns="" val="1"/>
+                  <adec:decorative xmlns="" xmlns:adec="http://schemas.microsoft.com/office/drawing/2017/decorative" val="1"/>
                 </a:ext>
               </a:extLst>
             </p:cNvPr>
@@ -16538,6 +16631,13 @@
   <p:clrMapOvr>
     <a:masterClrMapping/>
   </p:clrMapOvr>
+  <p:timing>
+    <p:tnLst>
+      <p:par>
+        <p:cTn id="1" dur="indefinite" restart="never" nodeType="tmRoot"/>
+      </p:par>
+    </p:tnLst>
+  </p:timing>
 </p:sld>
 </file>
 

</xml_diff>

<commit_message>
Added finished screen and Skript
</commit_message>
<xml_diff>
--- a/docs/Final Binding of Newton.pptx
+++ b/docs/Final Binding of Newton.pptx
@@ -1686,7 +1686,7 @@
 <dgm:dataModel xmlns:dgm="http://schemas.openxmlformats.org/drawingml/2006/diagram" xmlns:a="http://schemas.openxmlformats.org/drawingml/2006/main">
   <dgm:ptLst>
     <dgm:pt modelId="{A3856493-76EF-4BA7-BF42-87631ACDCFDA}" type="doc">
-      <dgm:prSet loTypeId="urn:microsoft.com/office/officeart/2005/8/layout/vList2" loCatId="list" qsTypeId="urn:microsoft.com/office/officeart/2005/8/quickstyle/simple1" qsCatId="simple" csTypeId="urn:microsoft.com/office/officeart/2005/8/colors/colorful2" csCatId="colorful"/>
+      <dgm:prSet loTypeId="urn:microsoft.com/office/officeart/2005/8/layout/vList2" loCatId="list" qsTypeId="urn:microsoft.com/office/officeart/2005/8/quickstyle/simple1" qsCatId="simple" csTypeId="urn:microsoft.com/office/officeart/2005/8/colors/colorful2" csCatId="colorful" phldr="1"/>
       <dgm:spPr/>
       <dgm:t>
         <a:bodyPr/>
@@ -1704,10 +1704,14 @@
         <a:lstStyle/>
         <a:p>
           <a:r>
-            <a:rPr lang="de-DE"/>
-            <a:t>Vorstellung des Spiels</a:t>
+            <a:rPr lang="de-DE" dirty="0" smtClean="0"/>
+            <a:t>Vorstellungen </a:t>
           </a:r>
-          <a:endParaRPr lang="en-US"/>
+          <a:r>
+            <a:rPr lang="de-DE" dirty="0"/>
+            <a:t>des Spiels</a:t>
+          </a:r>
+          <a:endParaRPr lang="en-US" dirty="0"/>
         </a:p>
       </dgm:t>
     </dgm:pt>
@@ -1778,10 +1782,10 @@
         <a:lstStyle/>
         <a:p>
           <a:r>
-            <a:rPr lang="de-DE"/>
-            <a:t>Spielmechaniken</a:t>
+            <a:rPr lang="en-US" dirty="0" smtClean="0"/>
+            <a:t>Code</a:t>
           </a:r>
-          <a:endParaRPr lang="en-US"/>
+          <a:endParaRPr lang="en-US" dirty="0"/>
         </a:p>
       </dgm:t>
     </dgm:pt>
@@ -2202,8 +2206,8 @@
       </dsp:nvSpPr>
       <dsp:spPr>
         <a:xfrm>
-          <a:off x="0" y="454145"/>
-          <a:ext cx="5508710" cy="1055340"/>
+          <a:off x="0" y="663305"/>
+          <a:ext cx="5508710" cy="959400"/>
         </a:xfrm>
         <a:prstGeom prst="roundRect">
           <a:avLst/>
@@ -2245,12 +2249,12 @@
         </a:fontRef>
       </dsp:style>
       <dsp:txBody>
-        <a:bodyPr spcFirstLastPara="0" vert="horz" wrap="square" lIns="167640" tIns="167640" rIns="167640" bIns="167640" numCol="1" spcCol="1270" anchor="ctr" anchorCtr="0">
+        <a:bodyPr spcFirstLastPara="0" vert="horz" wrap="square" lIns="152400" tIns="152400" rIns="152400" bIns="152400" numCol="1" spcCol="1270" anchor="ctr" anchorCtr="0">
           <a:noAutofit/>
         </a:bodyPr>
         <a:lstStyle/>
         <a:p>
-          <a:pPr lvl="0" algn="l" defTabSz="1955800">
+          <a:pPr lvl="0" algn="l" defTabSz="1778000">
             <a:lnSpc>
               <a:spcPct val="90000"/>
             </a:lnSpc>
@@ -2262,15 +2266,19 @@
             </a:spcAft>
           </a:pPr>
           <a:r>
-            <a:rPr lang="de-DE" sz="4400" kern="1200"/>
-            <a:t>Vorstellung des Spiels</a:t>
+            <a:rPr lang="de-DE" sz="4000" kern="1200" dirty="0" smtClean="0"/>
+            <a:t>Vorstellungen </a:t>
           </a:r>
-          <a:endParaRPr lang="en-US" sz="4400" kern="1200"/>
+          <a:r>
+            <a:rPr lang="de-DE" sz="4000" kern="1200" dirty="0"/>
+            <a:t>des Spiels</a:t>
+          </a:r>
+          <a:endParaRPr lang="en-US" sz="4000" kern="1200" dirty="0"/>
         </a:p>
       </dsp:txBody>
       <dsp:txXfrm>
-        <a:off x="51517" y="505662"/>
-        <a:ext cx="5405676" cy="952306"/>
+        <a:off x="46834" y="710139"/>
+        <a:ext cx="5415042" cy="865732"/>
       </dsp:txXfrm>
     </dsp:sp>
     <dsp:sp modelId="{DDBFF4B3-2B0A-4819-9623-F3D2EB042142}">
@@ -2280,8 +2288,8 @@
       </dsp:nvSpPr>
       <dsp:spPr>
         <a:xfrm>
-          <a:off x="0" y="1636205"/>
-          <a:ext cx="5508710" cy="1055340"/>
+          <a:off x="0" y="1737905"/>
+          <a:ext cx="5508710" cy="959400"/>
         </a:xfrm>
         <a:prstGeom prst="roundRect">
           <a:avLst/>
@@ -2323,12 +2331,12 @@
         </a:fontRef>
       </dsp:style>
       <dsp:txBody>
-        <a:bodyPr spcFirstLastPara="0" vert="horz" wrap="square" lIns="167640" tIns="167640" rIns="167640" bIns="167640" numCol="1" spcCol="1270" anchor="ctr" anchorCtr="0">
+        <a:bodyPr spcFirstLastPara="0" vert="horz" wrap="square" lIns="152400" tIns="152400" rIns="152400" bIns="152400" numCol="1" spcCol="1270" anchor="ctr" anchorCtr="0">
           <a:noAutofit/>
         </a:bodyPr>
         <a:lstStyle/>
         <a:p>
-          <a:pPr lvl="0" algn="l" defTabSz="1955800">
+          <a:pPr lvl="0" algn="l" defTabSz="1778000">
             <a:lnSpc>
               <a:spcPct val="90000"/>
             </a:lnSpc>
@@ -2340,15 +2348,15 @@
             </a:spcAft>
           </a:pPr>
           <a:r>
-            <a:rPr lang="de-DE" sz="4400" kern="1200"/>
+            <a:rPr lang="de-DE" sz="4000" kern="1200"/>
             <a:t>Design</a:t>
           </a:r>
-          <a:endParaRPr lang="en-US" sz="4400" kern="1200"/>
+          <a:endParaRPr lang="en-US" sz="4000" kern="1200"/>
         </a:p>
       </dsp:txBody>
       <dsp:txXfrm>
-        <a:off x="51517" y="1687722"/>
-        <a:ext cx="5405676" cy="952306"/>
+        <a:off x="46834" y="1784739"/>
+        <a:ext cx="5415042" cy="865732"/>
       </dsp:txXfrm>
     </dsp:sp>
     <dsp:sp modelId="{05B02CFA-E346-4C9C-B540-D693C24FDF1E}">
@@ -2358,8 +2366,8 @@
       </dsp:nvSpPr>
       <dsp:spPr>
         <a:xfrm>
-          <a:off x="0" y="2818266"/>
-          <a:ext cx="5508710" cy="1055340"/>
+          <a:off x="0" y="2812506"/>
+          <a:ext cx="5508710" cy="959400"/>
         </a:xfrm>
         <a:prstGeom prst="roundRect">
           <a:avLst/>
@@ -2401,12 +2409,12 @@
         </a:fontRef>
       </dsp:style>
       <dsp:txBody>
-        <a:bodyPr spcFirstLastPara="0" vert="horz" wrap="square" lIns="167640" tIns="167640" rIns="167640" bIns="167640" numCol="1" spcCol="1270" anchor="ctr" anchorCtr="0">
+        <a:bodyPr spcFirstLastPara="0" vert="horz" wrap="square" lIns="152400" tIns="152400" rIns="152400" bIns="152400" numCol="1" spcCol="1270" anchor="ctr" anchorCtr="0">
           <a:noAutofit/>
         </a:bodyPr>
         <a:lstStyle/>
         <a:p>
-          <a:pPr lvl="0" algn="l" defTabSz="1955800">
+          <a:pPr lvl="0" algn="l" defTabSz="1778000">
             <a:lnSpc>
               <a:spcPct val="90000"/>
             </a:lnSpc>
@@ -2418,15 +2426,15 @@
             </a:spcAft>
           </a:pPr>
           <a:r>
-            <a:rPr lang="de-DE" sz="4400" kern="1200"/>
-            <a:t>Spielmechaniken</a:t>
+            <a:rPr lang="en-US" sz="4000" kern="1200" dirty="0" smtClean="0"/>
+            <a:t>Code</a:t>
           </a:r>
-          <a:endParaRPr lang="en-US" sz="4400" kern="1200"/>
+          <a:endParaRPr lang="en-US" sz="4000" kern="1200" dirty="0"/>
         </a:p>
       </dsp:txBody>
       <dsp:txXfrm>
-        <a:off x="51517" y="2869783"/>
-        <a:ext cx="5405676" cy="952306"/>
+        <a:off x="46834" y="2859340"/>
+        <a:ext cx="5415042" cy="865732"/>
       </dsp:txXfrm>
     </dsp:sp>
     <dsp:sp modelId="{316FDAAD-D83E-44A2-AB5A-1B7637D255E3}">
@@ -2436,8 +2444,8 @@
       </dsp:nvSpPr>
       <dsp:spPr>
         <a:xfrm>
-          <a:off x="0" y="4000326"/>
-          <a:ext cx="5508710" cy="1055340"/>
+          <a:off x="0" y="3887106"/>
+          <a:ext cx="5508710" cy="959400"/>
         </a:xfrm>
         <a:prstGeom prst="roundRect">
           <a:avLst/>
@@ -2479,12 +2487,12 @@
         </a:fontRef>
       </dsp:style>
       <dsp:txBody>
-        <a:bodyPr spcFirstLastPara="0" vert="horz" wrap="square" lIns="167640" tIns="167640" rIns="167640" bIns="167640" numCol="1" spcCol="1270" anchor="ctr" anchorCtr="0">
+        <a:bodyPr spcFirstLastPara="0" vert="horz" wrap="square" lIns="152400" tIns="152400" rIns="152400" bIns="152400" numCol="1" spcCol="1270" anchor="ctr" anchorCtr="0">
           <a:noAutofit/>
         </a:bodyPr>
         <a:lstStyle/>
         <a:p>
-          <a:pPr lvl="0" algn="l" defTabSz="1955800">
+          <a:pPr lvl="0" algn="l" defTabSz="1778000">
             <a:lnSpc>
               <a:spcPct val="90000"/>
             </a:lnSpc>
@@ -2496,15 +2504,15 @@
             </a:spcAft>
           </a:pPr>
           <a:r>
-            <a:rPr lang="de-DE" sz="4400" kern="1200"/>
+            <a:rPr lang="de-DE" sz="4000" kern="1200"/>
             <a:t>Vorzeigen des Spiels</a:t>
           </a:r>
-          <a:endParaRPr lang="en-US" sz="4400" kern="1200"/>
+          <a:endParaRPr lang="en-US" sz="4000" kern="1200"/>
         </a:p>
       </dsp:txBody>
       <dsp:txXfrm>
-        <a:off x="51517" y="4051843"/>
-        <a:ext cx="5405676" cy="952306"/>
+        <a:off x="46834" y="3933940"/>
+        <a:ext cx="5415042" cy="865732"/>
       </dsp:txXfrm>
     </dsp:sp>
   </dsp:spTree>
@@ -8441,12 +8449,51 @@
           </a:xfrm>
         </p:spPr>
         <p:txBody>
-          <a:bodyPr/>
+          <a:bodyPr>
+            <a:normAutofit lnSpcReduction="10000"/>
+          </a:bodyPr>
           <a:lstStyle/>
           <a:p>
             <a:r>
+              <a:rPr lang="de-DE" dirty="0" smtClean="0"/>
+              <a:t>Gabriel Goller</a:t>
+            </a:r>
+            <a:r>
               <a:rPr lang="de-DE" dirty="0"/>
-              <a:t>Max Molling Tobias Kofler  Lukas Oberhauser Johannes Stafler</a:t>
+              <a:t/>
+            </a:r>
+            <a:br>
+              <a:rPr lang="de-DE" dirty="0"/>
+            </a:br>
+            <a:r>
+              <a:rPr lang="de-DE" dirty="0"/>
+              <a:t>Tobias Kofler</a:t>
+            </a:r>
+            <a:br>
+              <a:rPr lang="de-DE" dirty="0"/>
+            </a:br>
+            <a:r>
+              <a:rPr lang="de-DE" dirty="0"/>
+              <a:t>Max </a:t>
+            </a:r>
+            <a:r>
+              <a:rPr lang="de-DE" dirty="0"/>
+              <a:t>Molling </a:t>
+            </a:r>
+            <a:r>
+              <a:rPr lang="de-DE" dirty="0" smtClean="0"/>
+              <a:t/>
+            </a:r>
+            <a:br>
+              <a:rPr lang="de-DE" dirty="0" smtClean="0"/>
+            </a:br>
+            <a:r>
+              <a:rPr lang="de-DE" dirty="0" smtClean="0"/>
+              <a:t>Lukas </a:t>
+            </a:r>
+            <a:r>
+              <a:rPr lang="de-DE" dirty="0"/>
+              <a:t>Oberhauser Johannes Stafler</a:t>
             </a:r>
           </a:p>
         </p:txBody>
@@ -8504,7 +8551,7 @@
                 <a16:creationId xmlns:a16="http://schemas.microsoft.com/office/drawing/2014/main" id="{3CFEB548-CACC-4915-BA3A-ECFAD4BE055B}"/>
               </a:ext>
               <a:ext uri="{C183D7F6-B498-43B3-948B-1728B52AA6E4}">
-                <adec:decorative xmlns="" xmlns:adec="http://schemas.microsoft.com/office/drawing/2017/decorative" val="1"/>
+                <adec:decorative xmlns:adec="http://schemas.microsoft.com/office/drawing/2017/decorative" xmlns="" val="1"/>
               </a:ext>
             </a:extLst>
           </p:cNvPr>
@@ -8564,7 +8611,7 @@
                 <a16:creationId xmlns:a16="http://schemas.microsoft.com/office/drawing/2014/main" id="{337DD617-02C2-4388-A86E-BAB7BD2847FF}"/>
               </a:ext>
               <a:ext uri="{C183D7F6-B498-43B3-948B-1728B52AA6E4}">
-                <adec:decorative xmlns="" xmlns:adec="http://schemas.microsoft.com/office/drawing/2017/decorative" val="1"/>
+                <adec:decorative xmlns:adec="http://schemas.microsoft.com/office/drawing/2017/decorative" xmlns="" val="1"/>
               </a:ext>
             </a:extLst>
           </p:cNvPr>
@@ -8629,7 +8676,7 @@
                 <a16:creationId xmlns:a16="http://schemas.microsoft.com/office/drawing/2014/main" id="{6971532D-ED15-4EA1-8D74-8B9D49117B1E}"/>
               </a:ext>
               <a:ext uri="{C183D7F6-B498-43B3-948B-1728B52AA6E4}">
-                <adec:decorative xmlns="" xmlns:adec="http://schemas.microsoft.com/office/drawing/2017/decorative" val="1"/>
+                <adec:decorative xmlns:adec="http://schemas.microsoft.com/office/drawing/2017/decorative" xmlns="" val="1"/>
               </a:ext>
             </a:extLst>
           </p:cNvPr>
@@ -8660,7 +8707,7 @@
                   <a16:creationId xmlns:a16="http://schemas.microsoft.com/office/drawing/2014/main" id="{53E0E949-6174-47F4-871C-39B2BE7B4B04}"/>
                 </a:ext>
                 <a:ext uri="{C183D7F6-B498-43B3-948B-1728B52AA6E4}">
-                  <adec:decorative xmlns="" xmlns:adec="http://schemas.microsoft.com/office/drawing/2017/decorative" val="1"/>
+                  <adec:decorative xmlns:adec="http://schemas.microsoft.com/office/drawing/2017/decorative" xmlns="" val="1"/>
                 </a:ext>
               </a:extLst>
             </p:cNvPr>
@@ -8717,7 +8764,7 @@
                   <a16:creationId xmlns:a16="http://schemas.microsoft.com/office/drawing/2014/main" id="{CA81FA79-0462-498C-A7A0-4F97CB9BD068}"/>
                 </a:ext>
                 <a:ext uri="{C183D7F6-B498-43B3-948B-1728B52AA6E4}">
-                  <adec:decorative xmlns="" xmlns:adec="http://schemas.microsoft.com/office/drawing/2017/decorative" val="1"/>
+                  <adec:decorative xmlns:adec="http://schemas.microsoft.com/office/drawing/2017/decorative" xmlns="" val="1"/>
                 </a:ext>
               </a:extLst>
             </p:cNvPr>
@@ -8774,7 +8821,7 @@
                   <a16:creationId xmlns:a16="http://schemas.microsoft.com/office/drawing/2014/main" id="{9B13F096-ACB3-4289-ADE9-7BCF5727CEFA}"/>
                 </a:ext>
                 <a:ext uri="{C183D7F6-B498-43B3-948B-1728B52AA6E4}">
-                  <adec:decorative xmlns="" xmlns:adec="http://schemas.microsoft.com/office/drawing/2017/decorative" val="1"/>
+                  <adec:decorative xmlns:adec="http://schemas.microsoft.com/office/drawing/2017/decorative" xmlns="" val="1"/>
                 </a:ext>
               </a:extLst>
             </p:cNvPr>
@@ -8831,7 +8878,7 @@
                   <a16:creationId xmlns:a16="http://schemas.microsoft.com/office/drawing/2014/main" id="{442D1F89-7331-4DB6-9053-DE817E604F1F}"/>
                 </a:ext>
                 <a:ext uri="{C183D7F6-B498-43B3-948B-1728B52AA6E4}">
-                  <adec:decorative xmlns="" xmlns:adec="http://schemas.microsoft.com/office/drawing/2017/decorative" val="1"/>
+                  <adec:decorative xmlns:adec="http://schemas.microsoft.com/office/drawing/2017/decorative" xmlns="" val="1"/>
                 </a:ext>
               </a:extLst>
             </p:cNvPr>
@@ -8889,7 +8936,7 @@
                 <a16:creationId xmlns:a16="http://schemas.microsoft.com/office/drawing/2014/main" id="{4527D98C-AF53-420B-A7B6-DD5AA7D5339E}"/>
               </a:ext>
               <a:ext uri="{C183D7F6-B498-43B3-948B-1728B52AA6E4}">
-                <adec:decorative xmlns="" xmlns:adec="http://schemas.microsoft.com/office/drawing/2017/decorative" val="1"/>
+                <adec:decorative xmlns:adec="http://schemas.microsoft.com/office/drawing/2017/decorative" xmlns="" val="1"/>
               </a:ext>
             </a:extLst>
           </p:cNvPr>
@@ -8920,7 +8967,7 @@
                   <a16:creationId xmlns:a16="http://schemas.microsoft.com/office/drawing/2014/main" id="{9F0B76EE-9601-45D1-815F-6B076D42F091}"/>
                 </a:ext>
                 <a:ext uri="{C183D7F6-B498-43B3-948B-1728B52AA6E4}">
-                  <adec:decorative xmlns="" xmlns:adec="http://schemas.microsoft.com/office/drawing/2017/decorative" val="1"/>
+                  <adec:decorative xmlns:adec="http://schemas.microsoft.com/office/drawing/2017/decorative" xmlns="" val="1"/>
                 </a:ext>
               </a:extLst>
             </p:cNvPr>
@@ -8997,7 +9044,7 @@
                   <a16:creationId xmlns:a16="http://schemas.microsoft.com/office/drawing/2014/main" id="{1F5FB023-5222-4B9E-B6D1-A5040E4CEBE1}"/>
                 </a:ext>
                 <a:ext uri="{C183D7F6-B498-43B3-948B-1728B52AA6E4}">
-                  <adec:decorative xmlns="" xmlns:adec="http://schemas.microsoft.com/office/drawing/2017/decorative" val="1"/>
+                  <adec:decorative xmlns:adec="http://schemas.microsoft.com/office/drawing/2017/decorative" xmlns="" val="1"/>
                 </a:ext>
               </a:extLst>
             </p:cNvPr>
@@ -9074,7 +9121,7 @@
                   <a16:creationId xmlns:a16="http://schemas.microsoft.com/office/drawing/2014/main" id="{EAAEED21-38DA-46C2-93A3-F597C8761F21}"/>
                 </a:ext>
                 <a:ext uri="{C183D7F6-B498-43B3-948B-1728B52AA6E4}">
-                  <adec:decorative xmlns="" xmlns:adec="http://schemas.microsoft.com/office/drawing/2017/decorative" val="1"/>
+                  <adec:decorative xmlns:adec="http://schemas.microsoft.com/office/drawing/2017/decorative" xmlns="" val="1"/>
                 </a:ext>
               </a:extLst>
             </p:cNvPr>
@@ -9149,7 +9196,7 @@
                   <a16:creationId xmlns:a16="http://schemas.microsoft.com/office/drawing/2014/main" id="{17EFB714-3172-4F11-BA4B-04073494A7F5}"/>
                 </a:ext>
                 <a:ext uri="{C183D7F6-B498-43B3-948B-1728B52AA6E4}">
-                  <adec:decorative xmlns="" xmlns:adec="http://schemas.microsoft.com/office/drawing/2017/decorative" val="1"/>
+                  <adec:decorative xmlns:adec="http://schemas.microsoft.com/office/drawing/2017/decorative" xmlns="" val="1"/>
                 </a:ext>
               </a:extLst>
             </p:cNvPr>
@@ -9224,7 +9271,7 @@
                   <a16:creationId xmlns:a16="http://schemas.microsoft.com/office/drawing/2014/main" id="{8783C632-F1E2-40EE-AFA0-EF8D52D67779}"/>
                 </a:ext>
                 <a:ext uri="{C183D7F6-B498-43B3-948B-1728B52AA6E4}">
-                  <adec:decorative xmlns="" xmlns:adec="http://schemas.microsoft.com/office/drawing/2017/decorative" val="1"/>
+                  <adec:decorative xmlns:adec="http://schemas.microsoft.com/office/drawing/2017/decorative" xmlns="" val="1"/>
                 </a:ext>
               </a:extLst>
             </p:cNvPr>
@@ -9301,7 +9348,7 @@
                   <a16:creationId xmlns:a16="http://schemas.microsoft.com/office/drawing/2014/main" id="{7980DE84-E4A8-4C12-97F1-AADA86FFB006}"/>
                 </a:ext>
                 <a:ext uri="{C183D7F6-B498-43B3-948B-1728B52AA6E4}">
-                  <adec:decorative xmlns="" xmlns:adec="http://schemas.microsoft.com/office/drawing/2017/decorative" val="1"/>
+                  <adec:decorative xmlns:adec="http://schemas.microsoft.com/office/drawing/2017/decorative" xmlns="" val="1"/>
                 </a:ext>
               </a:extLst>
             </p:cNvPr>
@@ -9378,7 +9425,7 @@
                 <a16:creationId xmlns:a16="http://schemas.microsoft.com/office/drawing/2014/main" id="{7A4FCEB1-CD0B-4966-8A9D-F458E4F79B0B}"/>
               </a:ext>
               <a:ext uri="{C183D7F6-B498-43B3-948B-1728B52AA6E4}">
-                <adec:decorative xmlns="" xmlns:adec="http://schemas.microsoft.com/office/drawing/2017/decorative" val="1"/>
+                <adec:decorative xmlns:adec="http://schemas.microsoft.com/office/drawing/2017/decorative" xmlns="" val="1"/>
               </a:ext>
             </a:extLst>
           </p:cNvPr>
@@ -9457,7 +9504,7 @@
                 <a16:creationId xmlns:a16="http://schemas.microsoft.com/office/drawing/2014/main" id="{D3866B94-A099-49F6-A378-974CED7F572C}"/>
               </a:ext>
               <a:ext uri="{C183D7F6-B498-43B3-948B-1728B52AA6E4}">
-                <adec:decorative xmlns="" xmlns:adec="http://schemas.microsoft.com/office/drawing/2017/decorative" val="1"/>
+                <adec:decorative xmlns:adec="http://schemas.microsoft.com/office/drawing/2017/decorative" xmlns="" val="1"/>
               </a:ext>
             </a:extLst>
           </p:cNvPr>
@@ -9488,7 +9535,7 @@
                   <a16:creationId xmlns:a16="http://schemas.microsoft.com/office/drawing/2014/main" id="{5103C908-3FF0-4A95-851C-DF3C650FFB89}"/>
                 </a:ext>
                 <a:ext uri="{C183D7F6-B498-43B3-948B-1728B52AA6E4}">
-                  <adec:decorative xmlns="" xmlns:adec="http://schemas.microsoft.com/office/drawing/2017/decorative" val="1"/>
+                  <adec:decorative xmlns:adec="http://schemas.microsoft.com/office/drawing/2017/decorative" xmlns="" val="1"/>
                 </a:ext>
               </a:extLst>
             </p:cNvPr>
@@ -9557,7 +9604,7 @@
                   <a16:creationId xmlns:a16="http://schemas.microsoft.com/office/drawing/2014/main" id="{6AF400D3-D15B-4146-82E6-B2FC1194FED0}"/>
                 </a:ext>
                 <a:ext uri="{C183D7F6-B498-43B3-948B-1728B52AA6E4}">
-                  <adec:decorative xmlns="" xmlns:adec="http://schemas.microsoft.com/office/drawing/2017/decorative" val="1"/>
+                  <adec:decorative xmlns:adec="http://schemas.microsoft.com/office/drawing/2017/decorative" xmlns="" val="1"/>
                 </a:ext>
               </a:extLst>
             </p:cNvPr>
@@ -9626,7 +9673,7 @@
                   <a16:creationId xmlns:a16="http://schemas.microsoft.com/office/drawing/2014/main" id="{602F76C8-7CAD-4B72-BD0D-072D2AFA0CDA}"/>
                 </a:ext>
                 <a:ext uri="{C183D7F6-B498-43B3-948B-1728B52AA6E4}">
-                  <adec:decorative xmlns="" xmlns:adec="http://schemas.microsoft.com/office/drawing/2017/decorative" val="1"/>
+                  <adec:decorative xmlns:adec="http://schemas.microsoft.com/office/drawing/2017/decorative" xmlns="" val="1"/>
                 </a:ext>
               </a:extLst>
             </p:cNvPr>
@@ -9695,7 +9742,7 @@
                   <a16:creationId xmlns:a16="http://schemas.microsoft.com/office/drawing/2014/main" id="{15CEBAD8-9DE5-4790-9CD4-C384EB371D5A}"/>
                 </a:ext>
                 <a:ext uri="{C183D7F6-B498-43B3-948B-1728B52AA6E4}">
-                  <adec:decorative xmlns="" xmlns:adec="http://schemas.microsoft.com/office/drawing/2017/decorative" val="1"/>
+                  <adec:decorative xmlns:adec="http://schemas.microsoft.com/office/drawing/2017/decorative" xmlns="" val="1"/>
                 </a:ext>
               </a:extLst>
             </p:cNvPr>
@@ -9765,7 +9812,7 @@
                 <a16:creationId xmlns:a16="http://schemas.microsoft.com/office/drawing/2014/main" id="{D3B7B9BA-215A-4923-954F-3DAE9523ABEB}"/>
               </a:ext>
               <a:ext uri="{C183D7F6-B498-43B3-948B-1728B52AA6E4}">
-                <adec:decorative xmlns="" xmlns:adec="http://schemas.microsoft.com/office/drawing/2017/decorative" val="1"/>
+                <adec:decorative xmlns:adec="http://schemas.microsoft.com/office/drawing/2017/decorative" xmlns="" val="1"/>
               </a:ext>
             </a:extLst>
           </p:cNvPr>
@@ -9844,7 +9891,7 @@
                 <a16:creationId xmlns:a16="http://schemas.microsoft.com/office/drawing/2014/main" id="{34013081-B23F-45CB-A45B-562B629ADB7B}"/>
               </a:ext>
               <a:ext uri="{C183D7F6-B498-43B3-948B-1728B52AA6E4}">
-                <adec:decorative xmlns="" xmlns:adec="http://schemas.microsoft.com/office/drawing/2017/decorative" val="1"/>
+                <adec:decorative xmlns:adec="http://schemas.microsoft.com/office/drawing/2017/decorative" xmlns="" val="1"/>
               </a:ext>
             </a:extLst>
           </p:cNvPr>
@@ -9875,7 +9922,7 @@
                   <a16:creationId xmlns:a16="http://schemas.microsoft.com/office/drawing/2014/main" id="{4B8B11FB-E867-4638-B75F-B4B7DBDDB723}"/>
                 </a:ext>
                 <a:ext uri="{C183D7F6-B498-43B3-948B-1728B52AA6E4}">
-                  <adec:decorative xmlns="" xmlns:adec="http://schemas.microsoft.com/office/drawing/2017/decorative" val="1"/>
+                  <adec:decorative xmlns:adec="http://schemas.microsoft.com/office/drawing/2017/decorative" xmlns="" val="1"/>
                 </a:ext>
               </a:extLst>
             </p:cNvPr>
@@ -9944,7 +9991,7 @@
                   <a16:creationId xmlns:a16="http://schemas.microsoft.com/office/drawing/2014/main" id="{ABC84FC8-9600-4AE5-9E77-38E2363A3004}"/>
                 </a:ext>
                 <a:ext uri="{C183D7F6-B498-43B3-948B-1728B52AA6E4}">
-                  <adec:decorative xmlns="" xmlns:adec="http://schemas.microsoft.com/office/drawing/2017/decorative" val="1"/>
+                  <adec:decorative xmlns:adec="http://schemas.microsoft.com/office/drawing/2017/decorative" xmlns="" val="1"/>
                 </a:ext>
               </a:extLst>
             </p:cNvPr>
@@ -10013,7 +10060,7 @@
                   <a16:creationId xmlns:a16="http://schemas.microsoft.com/office/drawing/2014/main" id="{3514F95D-50D5-4B76-B347-91D1D76F8F79}"/>
                 </a:ext>
                 <a:ext uri="{C183D7F6-B498-43B3-948B-1728B52AA6E4}">
-                  <adec:decorative xmlns="" xmlns:adec="http://schemas.microsoft.com/office/drawing/2017/decorative" val="1"/>
+                  <adec:decorative xmlns:adec="http://schemas.microsoft.com/office/drawing/2017/decorative" xmlns="" val="1"/>
                 </a:ext>
               </a:extLst>
             </p:cNvPr>
@@ -10082,7 +10129,7 @@
                   <a16:creationId xmlns:a16="http://schemas.microsoft.com/office/drawing/2014/main" id="{885455D4-020C-4462-8A90-3B6434A50809}"/>
                 </a:ext>
                 <a:ext uri="{C183D7F6-B498-43B3-948B-1728B52AA6E4}">
-                  <adec:decorative xmlns="" xmlns:adec="http://schemas.microsoft.com/office/drawing/2017/decorative" val="1"/>
+                  <adec:decorative xmlns:adec="http://schemas.microsoft.com/office/drawing/2017/decorative" xmlns="" val="1"/>
                 </a:ext>
               </a:extLst>
             </p:cNvPr>
@@ -10196,7 +10243,7 @@
             <p:ph idx="1"/>
             <p:extLst>
               <p:ext uri="{D42A27DB-BD31-4B8C-83A1-F6EECF244321}">
-                <p14:modId xmlns:p14="http://schemas.microsoft.com/office/powerpoint/2010/main" val="1675595589"/>
+                <p14:modId xmlns:p14="http://schemas.microsoft.com/office/powerpoint/2010/main" val="1918422840"/>
               </p:ext>
             </p:extLst>
           </p:nvPr>
@@ -10264,7 +10311,7 @@
                 <a16:creationId xmlns:a16="http://schemas.microsoft.com/office/drawing/2014/main" id="{3CFEB548-CACC-4915-BA3A-ECFAD4BE055B}"/>
               </a:ext>
               <a:ext uri="{C183D7F6-B498-43B3-948B-1728B52AA6E4}">
-                <adec:decorative xmlns="" xmlns:adec="http://schemas.microsoft.com/office/drawing/2017/decorative" val="1"/>
+                <adec:decorative xmlns:adec="http://schemas.microsoft.com/office/drawing/2017/decorative" xmlns="" val="1"/>
               </a:ext>
             </a:extLst>
           </p:cNvPr>
@@ -10324,7 +10371,7 @@
                 <a16:creationId xmlns:a16="http://schemas.microsoft.com/office/drawing/2014/main" id="{337DD617-02C2-4388-A86E-BAB7BD2847FF}"/>
               </a:ext>
               <a:ext uri="{C183D7F6-B498-43B3-948B-1728B52AA6E4}">
-                <adec:decorative xmlns="" xmlns:adec="http://schemas.microsoft.com/office/drawing/2017/decorative" val="1"/>
+                <adec:decorative xmlns:adec="http://schemas.microsoft.com/office/drawing/2017/decorative" xmlns="" val="1"/>
               </a:ext>
             </a:extLst>
           </p:cNvPr>
@@ -10389,7 +10436,7 @@
                 <a16:creationId xmlns:a16="http://schemas.microsoft.com/office/drawing/2014/main" id="{6971532D-ED15-4EA1-8D74-8B9D49117B1E}"/>
               </a:ext>
               <a:ext uri="{C183D7F6-B498-43B3-948B-1728B52AA6E4}">
-                <adec:decorative xmlns="" xmlns:adec="http://schemas.microsoft.com/office/drawing/2017/decorative" val="1"/>
+                <adec:decorative xmlns:adec="http://schemas.microsoft.com/office/drawing/2017/decorative" xmlns="" val="1"/>
               </a:ext>
             </a:extLst>
           </p:cNvPr>
@@ -10420,7 +10467,7 @@
                   <a16:creationId xmlns:a16="http://schemas.microsoft.com/office/drawing/2014/main" id="{53E0E949-6174-47F4-871C-39B2BE7B4B04}"/>
                 </a:ext>
                 <a:ext uri="{C183D7F6-B498-43B3-948B-1728B52AA6E4}">
-                  <adec:decorative xmlns="" xmlns:adec="http://schemas.microsoft.com/office/drawing/2017/decorative" val="1"/>
+                  <adec:decorative xmlns:adec="http://schemas.microsoft.com/office/drawing/2017/decorative" xmlns="" val="1"/>
                 </a:ext>
               </a:extLst>
             </p:cNvPr>
@@ -10477,7 +10524,7 @@
                   <a16:creationId xmlns:a16="http://schemas.microsoft.com/office/drawing/2014/main" id="{CA81FA79-0462-498C-A7A0-4F97CB9BD068}"/>
                 </a:ext>
                 <a:ext uri="{C183D7F6-B498-43B3-948B-1728B52AA6E4}">
-                  <adec:decorative xmlns="" xmlns:adec="http://schemas.microsoft.com/office/drawing/2017/decorative" val="1"/>
+                  <adec:decorative xmlns:adec="http://schemas.microsoft.com/office/drawing/2017/decorative" xmlns="" val="1"/>
                 </a:ext>
               </a:extLst>
             </p:cNvPr>
@@ -10534,7 +10581,7 @@
                   <a16:creationId xmlns:a16="http://schemas.microsoft.com/office/drawing/2014/main" id="{9B13F096-ACB3-4289-ADE9-7BCF5727CEFA}"/>
                 </a:ext>
                 <a:ext uri="{C183D7F6-B498-43B3-948B-1728B52AA6E4}">
-                  <adec:decorative xmlns="" xmlns:adec="http://schemas.microsoft.com/office/drawing/2017/decorative" val="1"/>
+                  <adec:decorative xmlns:adec="http://schemas.microsoft.com/office/drawing/2017/decorative" xmlns="" val="1"/>
                 </a:ext>
               </a:extLst>
             </p:cNvPr>
@@ -10591,7 +10638,7 @@
                   <a16:creationId xmlns:a16="http://schemas.microsoft.com/office/drawing/2014/main" id="{442D1F89-7331-4DB6-9053-DE817E604F1F}"/>
                 </a:ext>
                 <a:ext uri="{C183D7F6-B498-43B3-948B-1728B52AA6E4}">
-                  <adec:decorative xmlns="" xmlns:adec="http://schemas.microsoft.com/office/drawing/2017/decorative" val="1"/>
+                  <adec:decorative xmlns:adec="http://schemas.microsoft.com/office/drawing/2017/decorative" xmlns="" val="1"/>
                 </a:ext>
               </a:extLst>
             </p:cNvPr>
@@ -10649,7 +10696,7 @@
                 <a16:creationId xmlns:a16="http://schemas.microsoft.com/office/drawing/2014/main" id="{4527D98C-AF53-420B-A7B6-DD5AA7D5339E}"/>
               </a:ext>
               <a:ext uri="{C183D7F6-B498-43B3-948B-1728B52AA6E4}">
-                <adec:decorative xmlns="" xmlns:adec="http://schemas.microsoft.com/office/drawing/2017/decorative" val="1"/>
+                <adec:decorative xmlns:adec="http://schemas.microsoft.com/office/drawing/2017/decorative" xmlns="" val="1"/>
               </a:ext>
             </a:extLst>
           </p:cNvPr>
@@ -10680,7 +10727,7 @@
                   <a16:creationId xmlns:a16="http://schemas.microsoft.com/office/drawing/2014/main" id="{9F0B76EE-9601-45D1-815F-6B076D42F091}"/>
                 </a:ext>
                 <a:ext uri="{C183D7F6-B498-43B3-948B-1728B52AA6E4}">
-                  <adec:decorative xmlns="" xmlns:adec="http://schemas.microsoft.com/office/drawing/2017/decorative" val="1"/>
+                  <adec:decorative xmlns:adec="http://schemas.microsoft.com/office/drawing/2017/decorative" xmlns="" val="1"/>
                 </a:ext>
               </a:extLst>
             </p:cNvPr>
@@ -10757,7 +10804,7 @@
                   <a16:creationId xmlns:a16="http://schemas.microsoft.com/office/drawing/2014/main" id="{1F5FB023-5222-4B9E-B6D1-A5040E4CEBE1}"/>
                 </a:ext>
                 <a:ext uri="{C183D7F6-B498-43B3-948B-1728B52AA6E4}">
-                  <adec:decorative xmlns="" xmlns:adec="http://schemas.microsoft.com/office/drawing/2017/decorative" val="1"/>
+                  <adec:decorative xmlns:adec="http://schemas.microsoft.com/office/drawing/2017/decorative" xmlns="" val="1"/>
                 </a:ext>
               </a:extLst>
             </p:cNvPr>
@@ -10834,7 +10881,7 @@
                   <a16:creationId xmlns:a16="http://schemas.microsoft.com/office/drawing/2014/main" id="{EAAEED21-38DA-46C2-93A3-F597C8761F21}"/>
                 </a:ext>
                 <a:ext uri="{C183D7F6-B498-43B3-948B-1728B52AA6E4}">
-                  <adec:decorative xmlns="" xmlns:adec="http://schemas.microsoft.com/office/drawing/2017/decorative" val="1"/>
+                  <adec:decorative xmlns:adec="http://schemas.microsoft.com/office/drawing/2017/decorative" xmlns="" val="1"/>
                 </a:ext>
               </a:extLst>
             </p:cNvPr>
@@ -10909,7 +10956,7 @@
                   <a16:creationId xmlns:a16="http://schemas.microsoft.com/office/drawing/2014/main" id="{17EFB714-3172-4F11-BA4B-04073494A7F5}"/>
                 </a:ext>
                 <a:ext uri="{C183D7F6-B498-43B3-948B-1728B52AA6E4}">
-                  <adec:decorative xmlns="" xmlns:adec="http://schemas.microsoft.com/office/drawing/2017/decorative" val="1"/>
+                  <adec:decorative xmlns:adec="http://schemas.microsoft.com/office/drawing/2017/decorative" xmlns="" val="1"/>
                 </a:ext>
               </a:extLst>
             </p:cNvPr>
@@ -10984,7 +11031,7 @@
                   <a16:creationId xmlns:a16="http://schemas.microsoft.com/office/drawing/2014/main" id="{8783C632-F1E2-40EE-AFA0-EF8D52D67779}"/>
                 </a:ext>
                 <a:ext uri="{C183D7F6-B498-43B3-948B-1728B52AA6E4}">
-                  <adec:decorative xmlns="" xmlns:adec="http://schemas.microsoft.com/office/drawing/2017/decorative" val="1"/>
+                  <adec:decorative xmlns:adec="http://schemas.microsoft.com/office/drawing/2017/decorative" xmlns="" val="1"/>
                 </a:ext>
               </a:extLst>
             </p:cNvPr>
@@ -11061,7 +11108,7 @@
                   <a16:creationId xmlns:a16="http://schemas.microsoft.com/office/drawing/2014/main" id="{7980DE84-E4A8-4C12-97F1-AADA86FFB006}"/>
                 </a:ext>
                 <a:ext uri="{C183D7F6-B498-43B3-948B-1728B52AA6E4}">
-                  <adec:decorative xmlns="" xmlns:adec="http://schemas.microsoft.com/office/drawing/2017/decorative" val="1"/>
+                  <adec:decorative xmlns:adec="http://schemas.microsoft.com/office/drawing/2017/decorative" xmlns="" val="1"/>
                 </a:ext>
               </a:extLst>
             </p:cNvPr>
@@ -11138,7 +11185,7 @@
                 <a16:creationId xmlns:a16="http://schemas.microsoft.com/office/drawing/2014/main" id="{7A4FCEB1-CD0B-4966-8A9D-F458E4F79B0B}"/>
               </a:ext>
               <a:ext uri="{C183D7F6-B498-43B3-948B-1728B52AA6E4}">
-                <adec:decorative xmlns="" xmlns:adec="http://schemas.microsoft.com/office/drawing/2017/decorative" val="1"/>
+                <adec:decorative xmlns:adec="http://schemas.microsoft.com/office/drawing/2017/decorative" xmlns="" val="1"/>
               </a:ext>
             </a:extLst>
           </p:cNvPr>
@@ -11217,7 +11264,7 @@
                 <a16:creationId xmlns:a16="http://schemas.microsoft.com/office/drawing/2014/main" id="{D3866B94-A099-49F6-A378-974CED7F572C}"/>
               </a:ext>
               <a:ext uri="{C183D7F6-B498-43B3-948B-1728B52AA6E4}">
-                <adec:decorative xmlns="" xmlns:adec="http://schemas.microsoft.com/office/drawing/2017/decorative" val="1"/>
+                <adec:decorative xmlns:adec="http://schemas.microsoft.com/office/drawing/2017/decorative" xmlns="" val="1"/>
               </a:ext>
             </a:extLst>
           </p:cNvPr>
@@ -11248,7 +11295,7 @@
                   <a16:creationId xmlns:a16="http://schemas.microsoft.com/office/drawing/2014/main" id="{5103C908-3FF0-4A95-851C-DF3C650FFB89}"/>
                 </a:ext>
                 <a:ext uri="{C183D7F6-B498-43B3-948B-1728B52AA6E4}">
-                  <adec:decorative xmlns="" xmlns:adec="http://schemas.microsoft.com/office/drawing/2017/decorative" val="1"/>
+                  <adec:decorative xmlns:adec="http://schemas.microsoft.com/office/drawing/2017/decorative" xmlns="" val="1"/>
                 </a:ext>
               </a:extLst>
             </p:cNvPr>
@@ -11317,7 +11364,7 @@
                   <a16:creationId xmlns:a16="http://schemas.microsoft.com/office/drawing/2014/main" id="{6AF400D3-D15B-4146-82E6-B2FC1194FED0}"/>
                 </a:ext>
                 <a:ext uri="{C183D7F6-B498-43B3-948B-1728B52AA6E4}">
-                  <adec:decorative xmlns="" xmlns:adec="http://schemas.microsoft.com/office/drawing/2017/decorative" val="1"/>
+                  <adec:decorative xmlns:adec="http://schemas.microsoft.com/office/drawing/2017/decorative" xmlns="" val="1"/>
                 </a:ext>
               </a:extLst>
             </p:cNvPr>
@@ -11386,7 +11433,7 @@
                   <a16:creationId xmlns:a16="http://schemas.microsoft.com/office/drawing/2014/main" id="{602F76C8-7CAD-4B72-BD0D-072D2AFA0CDA}"/>
                 </a:ext>
                 <a:ext uri="{C183D7F6-B498-43B3-948B-1728B52AA6E4}">
-                  <adec:decorative xmlns="" xmlns:adec="http://schemas.microsoft.com/office/drawing/2017/decorative" val="1"/>
+                  <adec:decorative xmlns:adec="http://schemas.microsoft.com/office/drawing/2017/decorative" xmlns="" val="1"/>
                 </a:ext>
               </a:extLst>
             </p:cNvPr>
@@ -11455,7 +11502,7 @@
                   <a16:creationId xmlns:a16="http://schemas.microsoft.com/office/drawing/2014/main" id="{15CEBAD8-9DE5-4790-9CD4-C384EB371D5A}"/>
                 </a:ext>
                 <a:ext uri="{C183D7F6-B498-43B3-948B-1728B52AA6E4}">
-                  <adec:decorative xmlns="" xmlns:adec="http://schemas.microsoft.com/office/drawing/2017/decorative" val="1"/>
+                  <adec:decorative xmlns:adec="http://schemas.microsoft.com/office/drawing/2017/decorative" xmlns="" val="1"/>
                 </a:ext>
               </a:extLst>
             </p:cNvPr>
@@ -11525,7 +11572,7 @@
                 <a16:creationId xmlns:a16="http://schemas.microsoft.com/office/drawing/2014/main" id="{D3B7B9BA-215A-4923-954F-3DAE9523ABEB}"/>
               </a:ext>
               <a:ext uri="{C183D7F6-B498-43B3-948B-1728B52AA6E4}">
-                <adec:decorative xmlns="" xmlns:adec="http://schemas.microsoft.com/office/drawing/2017/decorative" val="1"/>
+                <adec:decorative xmlns:adec="http://schemas.microsoft.com/office/drawing/2017/decorative" xmlns="" val="1"/>
               </a:ext>
             </a:extLst>
           </p:cNvPr>
@@ -11604,7 +11651,7 @@
                 <a16:creationId xmlns:a16="http://schemas.microsoft.com/office/drawing/2014/main" id="{34013081-B23F-45CB-A45B-562B629ADB7B}"/>
               </a:ext>
               <a:ext uri="{C183D7F6-B498-43B3-948B-1728B52AA6E4}">
-                <adec:decorative xmlns="" xmlns:adec="http://schemas.microsoft.com/office/drawing/2017/decorative" val="1"/>
+                <adec:decorative xmlns:adec="http://schemas.microsoft.com/office/drawing/2017/decorative" xmlns="" val="1"/>
               </a:ext>
             </a:extLst>
           </p:cNvPr>
@@ -11635,7 +11682,7 @@
                   <a16:creationId xmlns:a16="http://schemas.microsoft.com/office/drawing/2014/main" id="{4B8B11FB-E867-4638-B75F-B4B7DBDDB723}"/>
                 </a:ext>
                 <a:ext uri="{C183D7F6-B498-43B3-948B-1728B52AA6E4}">
-                  <adec:decorative xmlns="" xmlns:adec="http://schemas.microsoft.com/office/drawing/2017/decorative" val="1"/>
+                  <adec:decorative xmlns:adec="http://schemas.microsoft.com/office/drawing/2017/decorative" xmlns="" val="1"/>
                 </a:ext>
               </a:extLst>
             </p:cNvPr>
@@ -11704,7 +11751,7 @@
                   <a16:creationId xmlns:a16="http://schemas.microsoft.com/office/drawing/2014/main" id="{ABC84FC8-9600-4AE5-9E77-38E2363A3004}"/>
                 </a:ext>
                 <a:ext uri="{C183D7F6-B498-43B3-948B-1728B52AA6E4}">
-                  <adec:decorative xmlns="" xmlns:adec="http://schemas.microsoft.com/office/drawing/2017/decorative" val="1"/>
+                  <adec:decorative xmlns:adec="http://schemas.microsoft.com/office/drawing/2017/decorative" xmlns="" val="1"/>
                 </a:ext>
               </a:extLst>
             </p:cNvPr>
@@ -11773,7 +11820,7 @@
                   <a16:creationId xmlns:a16="http://schemas.microsoft.com/office/drawing/2014/main" id="{3514F95D-50D5-4B76-B347-91D1D76F8F79}"/>
                 </a:ext>
                 <a:ext uri="{C183D7F6-B498-43B3-948B-1728B52AA6E4}">
-                  <adec:decorative xmlns="" xmlns:adec="http://schemas.microsoft.com/office/drawing/2017/decorative" val="1"/>
+                  <adec:decorative xmlns:adec="http://schemas.microsoft.com/office/drawing/2017/decorative" xmlns="" val="1"/>
                 </a:ext>
               </a:extLst>
             </p:cNvPr>
@@ -11842,7 +11889,7 @@
                   <a16:creationId xmlns:a16="http://schemas.microsoft.com/office/drawing/2014/main" id="{885455D4-020C-4462-8A90-3B6434A50809}"/>
                 </a:ext>
                 <a:ext uri="{C183D7F6-B498-43B3-948B-1728B52AA6E4}">
-                  <adec:decorative xmlns="" xmlns:adec="http://schemas.microsoft.com/office/drawing/2017/decorative" val="1"/>
+                  <adec:decorative xmlns:adec="http://schemas.microsoft.com/office/drawing/2017/decorative" xmlns="" val="1"/>
                 </a:ext>
               </a:extLst>
             </p:cNvPr>
@@ -11934,8 +11981,12 @@
           <a:lstStyle/>
           <a:p>
             <a:r>
-              <a:rPr lang="de-DE" sz="4800"/>
-              <a:t>Vorstellung des Spiels</a:t>
+              <a:rPr lang="de-DE" sz="4800" dirty="0" smtClean="0"/>
+              <a:t>Vorstellungen </a:t>
+            </a:r>
+            <a:r>
+              <a:rPr lang="de-DE" sz="4800" dirty="0"/>
+              <a:t>des Spiels</a:t>
             </a:r>
           </a:p>
         </p:txBody>
@@ -12483,7 +12534,7 @@
                 <a16:creationId xmlns:a16="http://schemas.microsoft.com/office/drawing/2014/main" id="{B497CCB5-5FC2-473C-AFCC-2430CEF1DF71}"/>
               </a:ext>
               <a:ext uri="{C183D7F6-B498-43B3-948B-1728B52AA6E4}">
-                <adec:decorative xmlns="" xmlns:adec="http://schemas.microsoft.com/office/drawing/2017/decorative" val="1"/>
+                <adec:decorative xmlns:adec="http://schemas.microsoft.com/office/drawing/2017/decorative" xmlns="" val="1"/>
               </a:ext>
             </a:extLst>
           </p:cNvPr>
@@ -12546,7 +12597,7 @@
                 <a16:creationId xmlns:a16="http://schemas.microsoft.com/office/drawing/2014/main" id="{599C8C75-BFDF-44E7-A028-EEB5EDD58817}"/>
               </a:ext>
               <a:ext uri="{C183D7F6-B498-43B3-948B-1728B52AA6E4}">
-                <adec:decorative xmlns="" xmlns:adec="http://schemas.microsoft.com/office/drawing/2017/decorative" val="1"/>
+                <adec:decorative xmlns:adec="http://schemas.microsoft.com/office/drawing/2017/decorative" xmlns="" val="1"/>
               </a:ext>
             </a:extLst>
           </p:cNvPr>
@@ -12666,246 +12717,9 @@
   <p:timing>
     <p:tnLst>
       <p:par>
-        <p:cTn id="1" dur="indefinite" restart="never" nodeType="tmRoot">
-          <p:childTnLst>
-            <p:seq concurrent="1" nextAc="seek">
-              <p:cTn id="2" dur="indefinite" nodeType="mainSeq">
-                <p:childTnLst>
-                  <p:par>
-                    <p:cTn id="3" fill="hold">
-                      <p:stCondLst>
-                        <p:cond delay="indefinite"/>
-                        <p:cond evt="onBegin" delay="0">
-                          <p:tn val="2"/>
-                        </p:cond>
-                      </p:stCondLst>
-                      <p:childTnLst>
-                        <p:par>
-                          <p:cTn id="4" fill="hold">
-                            <p:stCondLst>
-                              <p:cond delay="0"/>
-                            </p:stCondLst>
-                            <p:childTnLst>
-                              <p:par>
-                                <p:cTn id="5" presetID="10" presetClass="entr" presetSubtype="0" fill="hold" grpId="0" nodeType="withEffect">
-                                  <p:stCondLst>
-                                    <p:cond delay="1000"/>
-                                  </p:stCondLst>
-                                  <p:iterate>
-                                    <p:tmPct val="10000"/>
-                                  </p:iterate>
-                                  <p:childTnLst>
-                                    <p:set>
-                                      <p:cBhvr>
-                                        <p:cTn id="6" dur="1" fill="hold">
-                                          <p:stCondLst>
-                                            <p:cond delay="0"/>
-                                          </p:stCondLst>
-                                        </p:cTn>
-                                        <p:tgtEl>
-                                          <p:spTgt spid="2"/>
-                                        </p:tgtEl>
-                                        <p:attrNameLst>
-                                          <p:attrName>style.visibility</p:attrName>
-                                        </p:attrNameLst>
-                                      </p:cBhvr>
-                                      <p:to>
-                                        <p:strVal val="visible"/>
-                                      </p:to>
-                                    </p:set>
-                                    <p:animEffect transition="in" filter="fade">
-                                      <p:cBhvr>
-                                        <p:cTn id="7" dur="700"/>
-                                        <p:tgtEl>
-                                          <p:spTgt spid="2"/>
-                                        </p:tgtEl>
-                                      </p:cBhvr>
-                                    </p:animEffect>
-                                  </p:childTnLst>
-                                </p:cTn>
-                              </p:par>
-                              <p:par>
-                                <p:cTn id="8" presetID="10" presetClass="entr" presetSubtype="0" fill="hold" nodeType="withEffect">
-                                  <p:stCondLst>
-                                    <p:cond delay="0"/>
-                                  </p:stCondLst>
-                                  <p:iterate>
-                                    <p:tmPct val="10000"/>
-                                  </p:iterate>
-                                  <p:childTnLst>
-                                    <p:set>
-                                      <p:cBhvr>
-                                        <p:cTn id="9" dur="1" fill="hold">
-                                          <p:stCondLst>
-                                            <p:cond delay="0"/>
-                                          </p:stCondLst>
-                                        </p:cTn>
-                                        <p:tgtEl>
-                                          <p:spTgt spid="1036"/>
-                                        </p:tgtEl>
-                                        <p:attrNameLst>
-                                          <p:attrName>style.visibility</p:attrName>
-                                        </p:attrNameLst>
-                                      </p:cBhvr>
-                                      <p:to>
-                                        <p:strVal val="visible"/>
-                                      </p:to>
-                                    </p:set>
-                                    <p:animEffect transition="in" filter="fade">
-                                      <p:cBhvr>
-                                        <p:cTn id="10" dur="700"/>
-                                        <p:tgtEl>
-                                          <p:spTgt spid="1036"/>
-                                        </p:tgtEl>
-                                      </p:cBhvr>
-                                    </p:animEffect>
-                                  </p:childTnLst>
-                                </p:cTn>
-                              </p:par>
-                              <p:par>
-                                <p:cTn id="11" presetID="10" presetClass="entr" presetSubtype="0" fill="hold" nodeType="withEffect">
-                                  <p:stCondLst>
-                                    <p:cond delay="0"/>
-                                  </p:stCondLst>
-                                  <p:iterate>
-                                    <p:tmPct val="10000"/>
-                                  </p:iterate>
-                                  <p:childTnLst>
-                                    <p:set>
-                                      <p:cBhvr>
-                                        <p:cTn id="12" dur="1" fill="hold">
-                                          <p:stCondLst>
-                                            <p:cond delay="0"/>
-                                          </p:stCondLst>
-                                        </p:cTn>
-                                        <p:tgtEl>
-                                          <p:spTgt spid="1034"/>
-                                        </p:tgtEl>
-                                        <p:attrNameLst>
-                                          <p:attrName>style.visibility</p:attrName>
-                                        </p:attrNameLst>
-                                      </p:cBhvr>
-                                      <p:to>
-                                        <p:strVal val="visible"/>
-                                      </p:to>
-                                    </p:set>
-                                    <p:animEffect transition="in" filter="fade">
-                                      <p:cBhvr>
-                                        <p:cTn id="13" dur="700"/>
-                                        <p:tgtEl>
-                                          <p:spTgt spid="1034"/>
-                                        </p:tgtEl>
-                                      </p:cBhvr>
-                                    </p:animEffect>
-                                  </p:childTnLst>
-                                </p:cTn>
-                              </p:par>
-                              <p:par>
-                                <p:cTn id="14" presetID="10" presetClass="entr" presetSubtype="0" fill="hold" nodeType="withEffect">
-                                  <p:stCondLst>
-                                    <p:cond delay="0"/>
-                                  </p:stCondLst>
-                                  <p:iterate>
-                                    <p:tmPct val="10000"/>
-                                  </p:iterate>
-                                  <p:childTnLst>
-                                    <p:set>
-                                      <p:cBhvr>
-                                        <p:cTn id="15" dur="1" fill="hold">
-                                          <p:stCondLst>
-                                            <p:cond delay="0"/>
-                                          </p:stCondLst>
-                                        </p:cTn>
-                                        <p:tgtEl>
-                                          <p:spTgt spid="1040"/>
-                                        </p:tgtEl>
-                                        <p:attrNameLst>
-                                          <p:attrName>style.visibility</p:attrName>
-                                        </p:attrNameLst>
-                                      </p:cBhvr>
-                                      <p:to>
-                                        <p:strVal val="visible"/>
-                                      </p:to>
-                                    </p:set>
-                                    <p:animEffect transition="in" filter="fade">
-                                      <p:cBhvr>
-                                        <p:cTn id="16" dur="700"/>
-                                        <p:tgtEl>
-                                          <p:spTgt spid="1040"/>
-                                        </p:tgtEl>
-                                      </p:cBhvr>
-                                    </p:animEffect>
-                                  </p:childTnLst>
-                                </p:cTn>
-                              </p:par>
-                              <p:par>
-                                <p:cTn id="17" presetID="10" presetClass="entr" presetSubtype="0" fill="hold" nodeType="withEffect">
-                                  <p:stCondLst>
-                                    <p:cond delay="0"/>
-                                  </p:stCondLst>
-                                  <p:iterate>
-                                    <p:tmPct val="10000"/>
-                                  </p:iterate>
-                                  <p:childTnLst>
-                                    <p:set>
-                                      <p:cBhvr>
-                                        <p:cTn id="18" dur="1" fill="hold">
-                                          <p:stCondLst>
-                                            <p:cond delay="0"/>
-                                          </p:stCondLst>
-                                        </p:cTn>
-                                        <p:tgtEl>
-                                          <p:spTgt spid="1030"/>
-                                        </p:tgtEl>
-                                        <p:attrNameLst>
-                                          <p:attrName>style.visibility</p:attrName>
-                                        </p:attrNameLst>
-                                      </p:cBhvr>
-                                      <p:to>
-                                        <p:strVal val="visible"/>
-                                      </p:to>
-                                    </p:set>
-                                    <p:animEffect transition="in" filter="fade">
-                                      <p:cBhvr>
-                                        <p:cTn id="19" dur="700"/>
-                                        <p:tgtEl>
-                                          <p:spTgt spid="1030"/>
-                                        </p:tgtEl>
-                                      </p:cBhvr>
-                                    </p:animEffect>
-                                  </p:childTnLst>
-                                </p:cTn>
-                              </p:par>
-                            </p:childTnLst>
-                          </p:cTn>
-                        </p:par>
-                      </p:childTnLst>
-                    </p:cTn>
-                  </p:par>
-                </p:childTnLst>
-              </p:cTn>
-              <p:prevCondLst>
-                <p:cond evt="onPrev" delay="0">
-                  <p:tgtEl>
-                    <p:sldTgt/>
-                  </p:tgtEl>
-                </p:cond>
-              </p:prevCondLst>
-              <p:nextCondLst>
-                <p:cond evt="onNext" delay="0">
-                  <p:tgtEl>
-                    <p:sldTgt/>
-                  </p:tgtEl>
-                </p:cond>
-              </p:nextCondLst>
-            </p:seq>
-          </p:childTnLst>
-        </p:cTn>
+        <p:cTn id="1" dur="indefinite" restart="never" nodeType="tmRoot"/>
       </p:par>
     </p:tnLst>
-    <p:bldLst>
-      <p:bldP spid="2" grpId="0"/>
-    </p:bldLst>
   </p:timing>
 </p:sld>
 </file>
@@ -12943,7 +12757,7 @@
                 <a16:creationId xmlns:a16="http://schemas.microsoft.com/office/drawing/2014/main" id="{D7A453D2-15D8-4403-815F-291FA16340D9}"/>
               </a:ext>
               <a:ext uri="{C183D7F6-B498-43B3-948B-1728B52AA6E4}">
-                <adec:decorative xmlns="" xmlns:adec="http://schemas.microsoft.com/office/drawing/2017/decorative" val="1"/>
+                <adec:decorative xmlns:adec="http://schemas.microsoft.com/office/drawing/2017/decorative" xmlns="" val="1"/>
               </a:ext>
             </a:extLst>
           </p:cNvPr>
@@ -13006,7 +12820,7 @@
                 <a16:creationId xmlns:a16="http://schemas.microsoft.com/office/drawing/2014/main" id="{8161EA6B-09CA-445B-AB0D-8DF76FA92DEF}"/>
               </a:ext>
               <a:ext uri="{C183D7F6-B498-43B3-948B-1728B52AA6E4}">
-                <adec:decorative xmlns="" xmlns:adec="http://schemas.microsoft.com/office/drawing/2017/decorative" val="1"/>
+                <adec:decorative xmlns:adec="http://schemas.microsoft.com/office/drawing/2017/decorative" xmlns="" val="1"/>
               </a:ext>
             </a:extLst>
           </p:cNvPr>
@@ -13071,7 +12885,7 @@
                 <a16:creationId xmlns:a16="http://schemas.microsoft.com/office/drawing/2014/main" id="{74E65F23-789E-4CB9-B34F-46A85E25D667}"/>
               </a:ext>
               <a:ext uri="{C183D7F6-B498-43B3-948B-1728B52AA6E4}">
-                <adec:decorative xmlns="" xmlns:adec="http://schemas.microsoft.com/office/drawing/2017/decorative" val="1"/>
+                <adec:decorative xmlns:adec="http://schemas.microsoft.com/office/drawing/2017/decorative" xmlns="" val="1"/>
               </a:ext>
             </a:extLst>
           </p:cNvPr>
@@ -13102,7 +12916,7 @@
                   <a16:creationId xmlns:a16="http://schemas.microsoft.com/office/drawing/2014/main" id="{1CA207F7-3B67-4EA2-8EC5-1260B55A07F4}"/>
                 </a:ext>
                 <a:ext uri="{C183D7F6-B498-43B3-948B-1728B52AA6E4}">
-                  <adec:decorative xmlns="" xmlns:adec="http://schemas.microsoft.com/office/drawing/2017/decorative" val="1"/>
+                  <adec:decorative xmlns:adec="http://schemas.microsoft.com/office/drawing/2017/decorative" xmlns="" val="1"/>
                 </a:ext>
               </a:extLst>
             </p:cNvPr>
@@ -13179,7 +12993,7 @@
                   <a16:creationId xmlns:a16="http://schemas.microsoft.com/office/drawing/2014/main" id="{AD4CC450-51C3-4A41-B2B1-68A15D57C5E6}"/>
                 </a:ext>
                 <a:ext uri="{C183D7F6-B498-43B3-948B-1728B52AA6E4}">
-                  <adec:decorative xmlns="" xmlns:adec="http://schemas.microsoft.com/office/drawing/2017/decorative" val="1"/>
+                  <adec:decorative xmlns:adec="http://schemas.microsoft.com/office/drawing/2017/decorative" xmlns="" val="1"/>
                 </a:ext>
               </a:extLst>
             </p:cNvPr>
@@ -13256,7 +13070,7 @@
                   <a16:creationId xmlns:a16="http://schemas.microsoft.com/office/drawing/2014/main" id="{ED62506D-F8E8-4C55-B160-D4FE8985049B}"/>
                 </a:ext>
                 <a:ext uri="{C183D7F6-B498-43B3-948B-1728B52AA6E4}">
-                  <adec:decorative xmlns="" xmlns:adec="http://schemas.microsoft.com/office/drawing/2017/decorative" val="1"/>
+                  <adec:decorative xmlns:adec="http://schemas.microsoft.com/office/drawing/2017/decorative" xmlns="" val="1"/>
                 </a:ext>
               </a:extLst>
             </p:cNvPr>
@@ -13331,7 +13145,7 @@
                   <a16:creationId xmlns:a16="http://schemas.microsoft.com/office/drawing/2014/main" id="{E6004793-0083-43B9-81A2-20F71D2C7D95}"/>
                 </a:ext>
                 <a:ext uri="{C183D7F6-B498-43B3-948B-1728B52AA6E4}">
-                  <adec:decorative xmlns="" xmlns:adec="http://schemas.microsoft.com/office/drawing/2017/decorative" val="1"/>
+                  <adec:decorative xmlns:adec="http://schemas.microsoft.com/office/drawing/2017/decorative" xmlns="" val="1"/>
                 </a:ext>
               </a:extLst>
             </p:cNvPr>
@@ -13406,7 +13220,7 @@
                   <a16:creationId xmlns:a16="http://schemas.microsoft.com/office/drawing/2014/main" id="{53D192AA-AFCB-470F-B66A-18815C3525CD}"/>
                 </a:ext>
                 <a:ext uri="{C183D7F6-B498-43B3-948B-1728B52AA6E4}">
-                  <adec:decorative xmlns="" xmlns:adec="http://schemas.microsoft.com/office/drawing/2017/decorative" val="1"/>
+                  <adec:decorative xmlns:adec="http://schemas.microsoft.com/office/drawing/2017/decorative" xmlns="" val="1"/>
                 </a:ext>
               </a:extLst>
             </p:cNvPr>
@@ -13483,7 +13297,7 @@
                   <a16:creationId xmlns:a16="http://schemas.microsoft.com/office/drawing/2014/main" id="{9079B0CF-0B4C-42A9-9769-3AC0A34FACEF}"/>
                 </a:ext>
                 <a:ext uri="{C183D7F6-B498-43B3-948B-1728B52AA6E4}">
-                  <adec:decorative xmlns="" xmlns:adec="http://schemas.microsoft.com/office/drawing/2017/decorative" val="1"/>
+                  <adec:decorative xmlns:adec="http://schemas.microsoft.com/office/drawing/2017/decorative" xmlns="" val="1"/>
                 </a:ext>
               </a:extLst>
             </p:cNvPr>
@@ -13637,14 +13451,11 @@
             <a:pPr marL="0" indent="0">
               <a:buNone/>
             </a:pPr>
-            <a:r>
-              <a:rPr lang="de-DE" sz="1800" dirty="0">
-                <a:solidFill>
-                  <a:schemeClr val="bg1"/>
-                </a:solidFill>
-              </a:rPr>
-              <a:t>„Mystische“ Atmosphäre</a:t>
-            </a:r>
+            <a:endParaRPr lang="de-DE" sz="1800" dirty="0">
+              <a:solidFill>
+                <a:schemeClr val="bg1"/>
+              </a:solidFill>
+            </a:endParaRPr>
           </a:p>
           <a:p>
             <a:pPr marL="0" indent="0">
@@ -13666,7 +13477,7 @@
                 <a16:creationId xmlns:a16="http://schemas.microsoft.com/office/drawing/2014/main" id="{B8114C98-A349-4111-A123-E8EAB86ABE30}"/>
               </a:ext>
               <a:ext uri="{C183D7F6-B498-43B3-948B-1728B52AA6E4}">
-                <adec:decorative xmlns="" xmlns:adec="http://schemas.microsoft.com/office/drawing/2017/decorative" val="1"/>
+                <adec:decorative xmlns:adec="http://schemas.microsoft.com/office/drawing/2017/decorative" xmlns="" val="1"/>
               </a:ext>
             </a:extLst>
           </p:cNvPr>
@@ -13745,7 +13556,7 @@
                 <a16:creationId xmlns:a16="http://schemas.microsoft.com/office/drawing/2014/main" id="{670FB431-AE18-414D-92F4-1D12D1991152}"/>
               </a:ext>
               <a:ext uri="{C183D7F6-B498-43B3-948B-1728B52AA6E4}">
-                <adec:decorative xmlns="" xmlns:adec="http://schemas.microsoft.com/office/drawing/2017/decorative" val="1"/>
+                <adec:decorative xmlns:adec="http://schemas.microsoft.com/office/drawing/2017/decorative" xmlns="" val="1"/>
               </a:ext>
             </a:extLst>
           </p:cNvPr>
@@ -13776,7 +13587,7 @@
                   <a16:creationId xmlns:a16="http://schemas.microsoft.com/office/drawing/2014/main" id="{24467063-D74E-4D42-8790-B9F6D69584BE}"/>
                 </a:ext>
                 <a:ext uri="{C183D7F6-B498-43B3-948B-1728B52AA6E4}">
-                  <adec:decorative xmlns="" xmlns:adec="http://schemas.microsoft.com/office/drawing/2017/decorative" val="1"/>
+                  <adec:decorative xmlns:adec="http://schemas.microsoft.com/office/drawing/2017/decorative" xmlns="" val="1"/>
                 </a:ext>
               </a:extLst>
             </p:cNvPr>
@@ -13845,7 +13656,7 @@
                   <a16:creationId xmlns:a16="http://schemas.microsoft.com/office/drawing/2014/main" id="{A1D19BAC-1681-47BC-AAF5-92FAFFF6F4CE}"/>
                 </a:ext>
                 <a:ext uri="{C183D7F6-B498-43B3-948B-1728B52AA6E4}">
-                  <adec:decorative xmlns="" xmlns:adec="http://schemas.microsoft.com/office/drawing/2017/decorative" val="1"/>
+                  <adec:decorative xmlns:adec="http://schemas.microsoft.com/office/drawing/2017/decorative" xmlns="" val="1"/>
                 </a:ext>
               </a:extLst>
             </p:cNvPr>
@@ -13914,7 +13725,7 @@
                   <a16:creationId xmlns:a16="http://schemas.microsoft.com/office/drawing/2014/main" id="{94347C2B-E846-452C-97AA-7E254FC1CE8F}"/>
                 </a:ext>
                 <a:ext uri="{C183D7F6-B498-43B3-948B-1728B52AA6E4}">
-                  <adec:decorative xmlns="" xmlns:adec="http://schemas.microsoft.com/office/drawing/2017/decorative" val="1"/>
+                  <adec:decorative xmlns:adec="http://schemas.microsoft.com/office/drawing/2017/decorative" xmlns="" val="1"/>
                 </a:ext>
               </a:extLst>
             </p:cNvPr>
@@ -13983,7 +13794,7 @@
                   <a16:creationId xmlns:a16="http://schemas.microsoft.com/office/drawing/2014/main" id="{10EA2B35-7959-4C2A-84AA-FF5D94FEDE90}"/>
                 </a:ext>
                 <a:ext uri="{C183D7F6-B498-43B3-948B-1728B52AA6E4}">
-                  <adec:decorative xmlns="" xmlns:adec="http://schemas.microsoft.com/office/drawing/2017/decorative" val="1"/>
+                  <adec:decorative xmlns:adec="http://schemas.microsoft.com/office/drawing/2017/decorative" xmlns="" val="1"/>
                 </a:ext>
               </a:extLst>
             </p:cNvPr>
@@ -14053,7 +13864,7 @@
                 <a16:creationId xmlns:a16="http://schemas.microsoft.com/office/drawing/2014/main" id="{E2D3D3F2-ABBB-4453-B1C5-1BEBF7E4DD56}"/>
               </a:ext>
               <a:ext uri="{C183D7F6-B498-43B3-948B-1728B52AA6E4}">
-                <adec:decorative xmlns="" xmlns:adec="http://schemas.microsoft.com/office/drawing/2017/decorative" val="1"/>
+                <adec:decorative xmlns:adec="http://schemas.microsoft.com/office/drawing/2017/decorative" xmlns="" val="1"/>
               </a:ext>
             </a:extLst>
           </p:cNvPr>
@@ -14132,7 +13943,7 @@
                 <a16:creationId xmlns:a16="http://schemas.microsoft.com/office/drawing/2014/main" id="{8214E4A5-A0D2-42C4-8D14-D2A7E495F041}"/>
               </a:ext>
               <a:ext uri="{C183D7F6-B498-43B3-948B-1728B52AA6E4}">
-                <adec:decorative xmlns="" xmlns:adec="http://schemas.microsoft.com/office/drawing/2017/decorative" val="1"/>
+                <adec:decorative xmlns:adec="http://schemas.microsoft.com/office/drawing/2017/decorative" xmlns="" val="1"/>
               </a:ext>
             </a:extLst>
           </p:cNvPr>
@@ -14163,7 +13974,7 @@
                   <a16:creationId xmlns:a16="http://schemas.microsoft.com/office/drawing/2014/main" id="{7494D7A0-6B21-41E8-A7D3-0033BBB79156}"/>
                 </a:ext>
                 <a:ext uri="{C183D7F6-B498-43B3-948B-1728B52AA6E4}">
-                  <adec:decorative xmlns="" xmlns:adec="http://schemas.microsoft.com/office/drawing/2017/decorative" val="1"/>
+                  <adec:decorative xmlns:adec="http://schemas.microsoft.com/office/drawing/2017/decorative" xmlns="" val="1"/>
                 </a:ext>
               </a:extLst>
             </p:cNvPr>
@@ -14232,7 +14043,7 @@
                   <a16:creationId xmlns:a16="http://schemas.microsoft.com/office/drawing/2014/main" id="{1E141D7D-32B0-448E-A666-EA8703AFCF2C}"/>
                 </a:ext>
                 <a:ext uri="{C183D7F6-B498-43B3-948B-1728B52AA6E4}">
-                  <adec:decorative xmlns="" xmlns:adec="http://schemas.microsoft.com/office/drawing/2017/decorative" val="1"/>
+                  <adec:decorative xmlns:adec="http://schemas.microsoft.com/office/drawing/2017/decorative" xmlns="" val="1"/>
                 </a:ext>
               </a:extLst>
             </p:cNvPr>
@@ -14301,7 +14112,7 @@
                   <a16:creationId xmlns:a16="http://schemas.microsoft.com/office/drawing/2014/main" id="{8D87E268-6345-420F-8B97-B37ED04100EC}"/>
                 </a:ext>
                 <a:ext uri="{C183D7F6-B498-43B3-948B-1728B52AA6E4}">
-                  <adec:decorative xmlns="" xmlns:adec="http://schemas.microsoft.com/office/drawing/2017/decorative" val="1"/>
+                  <adec:decorative xmlns:adec="http://schemas.microsoft.com/office/drawing/2017/decorative" xmlns="" val="1"/>
                 </a:ext>
               </a:extLst>
             </p:cNvPr>
@@ -14370,7 +14181,7 @@
                   <a16:creationId xmlns:a16="http://schemas.microsoft.com/office/drawing/2014/main" id="{35E1622E-7FA6-4760-A2BF-A8105EBF7BB9}"/>
                 </a:ext>
                 <a:ext uri="{C183D7F6-B498-43B3-948B-1728B52AA6E4}">
-                  <adec:decorative xmlns="" xmlns:adec="http://schemas.microsoft.com/office/drawing/2017/decorative" val="1"/>
+                  <adec:decorative xmlns:adec="http://schemas.microsoft.com/office/drawing/2017/decorative" xmlns="" val="1"/>
                 </a:ext>
               </a:extLst>
             </p:cNvPr>
@@ -14486,7 +14297,7 @@
                 <a16:creationId xmlns:a16="http://schemas.microsoft.com/office/drawing/2014/main" id="{4043ADFC-DC2E-40D2-954D-4A13B908DA80}"/>
               </a:ext>
               <a:ext uri="{C183D7F6-B498-43B3-948B-1728B52AA6E4}">
-                <adec:decorative xmlns="" xmlns:adec="http://schemas.microsoft.com/office/drawing/2017/decorative" val="1"/>
+                <adec:decorative xmlns:adec="http://schemas.microsoft.com/office/drawing/2017/decorative" xmlns="" val="1"/>
               </a:ext>
             </a:extLst>
           </p:cNvPr>
@@ -14517,7 +14328,7 @@
                   <a16:creationId xmlns:a16="http://schemas.microsoft.com/office/drawing/2014/main" id="{C975E7D3-10F5-4E53-902F-9E79C98C22DE}"/>
                 </a:ext>
                 <a:ext uri="{C183D7F6-B498-43B3-948B-1728B52AA6E4}">
-                  <adec:decorative xmlns="" xmlns:adec="http://schemas.microsoft.com/office/drawing/2017/decorative" val="1"/>
+                  <adec:decorative xmlns:adec="http://schemas.microsoft.com/office/drawing/2017/decorative" xmlns="" val="1"/>
                 </a:ext>
               </a:extLst>
             </p:cNvPr>
@@ -14574,7 +14385,7 @@
                   <a16:creationId xmlns:a16="http://schemas.microsoft.com/office/drawing/2014/main" id="{BDC51AAB-5A3B-4730-B8AC-46C96AC0B692}"/>
                 </a:ext>
                 <a:ext uri="{C183D7F6-B498-43B3-948B-1728B52AA6E4}">
-                  <adec:decorative xmlns="" xmlns:adec="http://schemas.microsoft.com/office/drawing/2017/decorative" val="1"/>
+                  <adec:decorative xmlns:adec="http://schemas.microsoft.com/office/drawing/2017/decorative" xmlns="" val="1"/>
                 </a:ext>
               </a:extLst>
             </p:cNvPr>
@@ -14631,7 +14442,7 @@
                   <a16:creationId xmlns:a16="http://schemas.microsoft.com/office/drawing/2014/main" id="{03A6F2D9-1476-4E35-988D-D4CCB15C8D6D}"/>
                 </a:ext>
                 <a:ext uri="{C183D7F6-B498-43B3-948B-1728B52AA6E4}">
-                  <adec:decorative xmlns="" xmlns:adec="http://schemas.microsoft.com/office/drawing/2017/decorative" val="1"/>
+                  <adec:decorative xmlns:adec="http://schemas.microsoft.com/office/drawing/2017/decorative" xmlns="" val="1"/>
                 </a:ext>
               </a:extLst>
             </p:cNvPr>
@@ -14688,7 +14499,7 @@
                   <a16:creationId xmlns:a16="http://schemas.microsoft.com/office/drawing/2014/main" id="{CE17F678-D5C6-49BF-933D-1E65F69B3256}"/>
                 </a:ext>
                 <a:ext uri="{C183D7F6-B498-43B3-948B-1728B52AA6E4}">
-                  <adec:decorative xmlns="" xmlns:adec="http://schemas.microsoft.com/office/drawing/2017/decorative" val="1"/>
+                  <adec:decorative xmlns:adec="http://schemas.microsoft.com/office/drawing/2017/decorative" xmlns="" val="1"/>
                 </a:ext>
               </a:extLst>
             </p:cNvPr>
@@ -14791,7 +14602,7 @@
                 <a16:creationId xmlns:a16="http://schemas.microsoft.com/office/drawing/2014/main" id="{D7A453D2-15D8-4403-815F-291FA16340D9}"/>
               </a:ext>
               <a:ext uri="{C183D7F6-B498-43B3-948B-1728B52AA6E4}">
-                <adec:decorative xmlns="" xmlns:adec="http://schemas.microsoft.com/office/drawing/2017/decorative" val="1"/>
+                <adec:decorative xmlns:adec="http://schemas.microsoft.com/office/drawing/2017/decorative" xmlns="" val="1"/>
               </a:ext>
             </a:extLst>
           </p:cNvPr>
@@ -14854,7 +14665,7 @@
                 <a16:creationId xmlns:a16="http://schemas.microsoft.com/office/drawing/2014/main" id="{8161EA6B-09CA-445B-AB0D-8DF76FA92DEF}"/>
               </a:ext>
               <a:ext uri="{C183D7F6-B498-43B3-948B-1728B52AA6E4}">
-                <adec:decorative xmlns="" xmlns:adec="http://schemas.microsoft.com/office/drawing/2017/decorative" val="1"/>
+                <adec:decorative xmlns:adec="http://schemas.microsoft.com/office/drawing/2017/decorative" xmlns="" val="1"/>
               </a:ext>
             </a:extLst>
           </p:cNvPr>
@@ -14919,7 +14730,7 @@
                 <a16:creationId xmlns:a16="http://schemas.microsoft.com/office/drawing/2014/main" id="{B352BBB9-69A8-405C-9209-A9FE217AEDC4}"/>
               </a:ext>
               <a:ext uri="{C183D7F6-B498-43B3-948B-1728B52AA6E4}">
-                <adec:decorative xmlns="" xmlns:adec="http://schemas.microsoft.com/office/drawing/2017/decorative" val="1"/>
+                <adec:decorative xmlns:adec="http://schemas.microsoft.com/office/drawing/2017/decorative" xmlns="" val="1"/>
               </a:ext>
             </a:extLst>
           </p:cNvPr>
@@ -14950,7 +14761,7 @@
                   <a16:creationId xmlns:a16="http://schemas.microsoft.com/office/drawing/2014/main" id="{2BA8247A-9874-4F57-82F4-AEB016E661EA}"/>
                 </a:ext>
                 <a:ext uri="{C183D7F6-B498-43B3-948B-1728B52AA6E4}">
-                  <adec:decorative xmlns="" xmlns:adec="http://schemas.microsoft.com/office/drawing/2017/decorative" val="1"/>
+                  <adec:decorative xmlns:adec="http://schemas.microsoft.com/office/drawing/2017/decorative" xmlns="" val="1"/>
                 </a:ext>
               </a:extLst>
             </p:cNvPr>
@@ -15027,7 +14838,7 @@
                   <a16:creationId xmlns:a16="http://schemas.microsoft.com/office/drawing/2014/main" id="{A30C3CE4-8479-4B6E-9C21-D7B0CD89EF8E}"/>
                 </a:ext>
                 <a:ext uri="{C183D7F6-B498-43B3-948B-1728B52AA6E4}">
-                  <adec:decorative xmlns="" xmlns:adec="http://schemas.microsoft.com/office/drawing/2017/decorative" val="1"/>
+                  <adec:decorative xmlns:adec="http://schemas.microsoft.com/office/drawing/2017/decorative" xmlns="" val="1"/>
                 </a:ext>
               </a:extLst>
             </p:cNvPr>
@@ -15104,7 +14915,7 @@
                   <a16:creationId xmlns:a16="http://schemas.microsoft.com/office/drawing/2014/main" id="{F7BCD297-22FC-4ECD-95DC-8581D5E6B141}"/>
                 </a:ext>
                 <a:ext uri="{C183D7F6-B498-43B3-948B-1728B52AA6E4}">
-                  <adec:decorative xmlns="" xmlns:adec="http://schemas.microsoft.com/office/drawing/2017/decorative" val="1"/>
+                  <adec:decorative xmlns:adec="http://schemas.microsoft.com/office/drawing/2017/decorative" xmlns="" val="1"/>
                 </a:ext>
               </a:extLst>
             </p:cNvPr>
@@ -15179,7 +14990,7 @@
                   <a16:creationId xmlns:a16="http://schemas.microsoft.com/office/drawing/2014/main" id="{061A25F1-8873-4D98-B8D5-169EA0AC9212}"/>
                 </a:ext>
                 <a:ext uri="{C183D7F6-B498-43B3-948B-1728B52AA6E4}">
-                  <adec:decorative xmlns="" xmlns:adec="http://schemas.microsoft.com/office/drawing/2017/decorative" val="1"/>
+                  <adec:decorative xmlns:adec="http://schemas.microsoft.com/office/drawing/2017/decorative" xmlns="" val="1"/>
                 </a:ext>
               </a:extLst>
             </p:cNvPr>
@@ -15254,7 +15065,7 @@
                   <a16:creationId xmlns:a16="http://schemas.microsoft.com/office/drawing/2014/main" id="{CB7BCAD9-3EF1-4FCE-AFA0-BD2C545A735B}"/>
                 </a:ext>
                 <a:ext uri="{C183D7F6-B498-43B3-948B-1728B52AA6E4}">
-                  <adec:decorative xmlns="" xmlns:adec="http://schemas.microsoft.com/office/drawing/2017/decorative" val="1"/>
+                  <adec:decorative xmlns:adec="http://schemas.microsoft.com/office/drawing/2017/decorative" xmlns="" val="1"/>
                 </a:ext>
               </a:extLst>
             </p:cNvPr>
@@ -15331,7 +15142,7 @@
                   <a16:creationId xmlns:a16="http://schemas.microsoft.com/office/drawing/2014/main" id="{36649524-3638-4334-8ED6-539D10DF4BCC}"/>
                 </a:ext>
                 <a:ext uri="{C183D7F6-B498-43B3-948B-1728B52AA6E4}">
-                  <adec:decorative xmlns="" xmlns:adec="http://schemas.microsoft.com/office/drawing/2017/decorative" val="1"/>
+                  <adec:decorative xmlns:adec="http://schemas.microsoft.com/office/drawing/2017/decorative" xmlns="" val="1"/>
                 </a:ext>
               </a:extLst>
             </p:cNvPr>
@@ -15430,13 +15241,18 @@
           <a:lstStyle/>
           <a:p>
             <a:r>
-              <a:rPr lang="de-DE" sz="4800">
+              <a:rPr lang="de-DE" sz="4800" dirty="0" smtClean="0">
                 <a:solidFill>
                   <a:schemeClr val="bg1"/>
                 </a:solidFill>
               </a:rPr>
-              <a:t>Spielmechanik</a:t>
+              <a:t>Code</a:t>
             </a:r>
+            <a:endParaRPr lang="de-DE" sz="4800" dirty="0">
+              <a:solidFill>
+                <a:schemeClr val="bg1"/>
+              </a:solidFill>
+            </a:endParaRPr>
           </a:p>
         </p:txBody>
       </p:sp>
@@ -15468,16 +15284,6 @@
             <a:normAutofit/>
           </a:bodyPr>
           <a:lstStyle/>
-          <a:p>
-            <a:r>
-              <a:rPr lang="de-DE" sz="1800" dirty="0">
-                <a:solidFill>
-                  <a:schemeClr val="bg1"/>
-                </a:solidFill>
-              </a:rPr>
-              <a:t>Singleton Pattern</a:t>
-            </a:r>
-          </a:p>
           <a:p>
             <a:r>
               <a:rPr lang="de-DE" sz="1800" dirty="0" err="1" smtClean="0">
@@ -15520,7 +15326,7 @@
               <a:t> und </a:t>
             </a:r>
             <a:r>
-              <a:rPr lang="de-DE" sz="1800" dirty="0" err="1">
+              <a:rPr lang="de-DE" sz="1800" dirty="0" err="1" smtClean="0">
                 <a:solidFill>
                   <a:schemeClr val="bg1"/>
                 </a:solidFill>
@@ -15534,6 +15340,27 @@
             </a:endParaRPr>
           </a:p>
           <a:p>
+            <a:r>
+              <a:rPr lang="de-DE" sz="1800" dirty="0" smtClean="0">
+                <a:solidFill>
+                  <a:schemeClr val="bg1"/>
+                </a:solidFill>
+              </a:rPr>
+              <a:t>Singleton </a:t>
+            </a:r>
+            <a:r>
+              <a:rPr lang="de-DE" sz="1800" dirty="0">
+                <a:solidFill>
+                  <a:schemeClr val="bg1"/>
+                </a:solidFill>
+              </a:rPr>
+              <a:t>Pattern</a:t>
+            </a:r>
+          </a:p>
+          <a:p>
+            <a:pPr marL="0" indent="0">
+              <a:buNone/>
+            </a:pPr>
             <a:endParaRPr lang="de-DE" sz="1800" dirty="0">
               <a:solidFill>
                 <a:schemeClr val="bg1"/>
@@ -15550,7 +15377,7 @@
                 <a16:creationId xmlns:a16="http://schemas.microsoft.com/office/drawing/2014/main" id="{B8114C98-A349-4111-A123-E8EAB86ABE30}"/>
               </a:ext>
               <a:ext uri="{C183D7F6-B498-43B3-948B-1728B52AA6E4}">
-                <adec:decorative xmlns="" xmlns:adec="http://schemas.microsoft.com/office/drawing/2017/decorative" val="1"/>
+                <adec:decorative xmlns:adec="http://schemas.microsoft.com/office/drawing/2017/decorative" xmlns="" val="1"/>
               </a:ext>
             </a:extLst>
           </p:cNvPr>
@@ -15629,7 +15456,7 @@
                 <a16:creationId xmlns:a16="http://schemas.microsoft.com/office/drawing/2014/main" id="{670FB431-AE18-414D-92F4-1D12D1991152}"/>
               </a:ext>
               <a:ext uri="{C183D7F6-B498-43B3-948B-1728B52AA6E4}">
-                <adec:decorative xmlns="" xmlns:adec="http://schemas.microsoft.com/office/drawing/2017/decorative" val="1"/>
+                <adec:decorative xmlns:adec="http://schemas.microsoft.com/office/drawing/2017/decorative" xmlns="" val="1"/>
               </a:ext>
             </a:extLst>
           </p:cNvPr>
@@ -15660,7 +15487,7 @@
                   <a16:creationId xmlns:a16="http://schemas.microsoft.com/office/drawing/2014/main" id="{24467063-D74E-4D42-8790-B9F6D69584BE}"/>
                 </a:ext>
                 <a:ext uri="{C183D7F6-B498-43B3-948B-1728B52AA6E4}">
-                  <adec:decorative xmlns="" xmlns:adec="http://schemas.microsoft.com/office/drawing/2017/decorative" val="1"/>
+                  <adec:decorative xmlns:adec="http://schemas.microsoft.com/office/drawing/2017/decorative" xmlns="" val="1"/>
                 </a:ext>
               </a:extLst>
             </p:cNvPr>
@@ -15729,7 +15556,7 @@
                   <a16:creationId xmlns:a16="http://schemas.microsoft.com/office/drawing/2014/main" id="{A1D19BAC-1681-47BC-AAF5-92FAFFF6F4CE}"/>
                 </a:ext>
                 <a:ext uri="{C183D7F6-B498-43B3-948B-1728B52AA6E4}">
-                  <adec:decorative xmlns="" xmlns:adec="http://schemas.microsoft.com/office/drawing/2017/decorative" val="1"/>
+                  <adec:decorative xmlns:adec="http://schemas.microsoft.com/office/drawing/2017/decorative" xmlns="" val="1"/>
                 </a:ext>
               </a:extLst>
             </p:cNvPr>
@@ -15798,7 +15625,7 @@
                   <a16:creationId xmlns:a16="http://schemas.microsoft.com/office/drawing/2014/main" id="{94347C2B-E846-452C-97AA-7E254FC1CE8F}"/>
                 </a:ext>
                 <a:ext uri="{C183D7F6-B498-43B3-948B-1728B52AA6E4}">
-                  <adec:decorative xmlns="" xmlns:adec="http://schemas.microsoft.com/office/drawing/2017/decorative" val="1"/>
+                  <adec:decorative xmlns:adec="http://schemas.microsoft.com/office/drawing/2017/decorative" xmlns="" val="1"/>
                 </a:ext>
               </a:extLst>
             </p:cNvPr>
@@ -15867,7 +15694,7 @@
                   <a16:creationId xmlns:a16="http://schemas.microsoft.com/office/drawing/2014/main" id="{10EA2B35-7959-4C2A-84AA-FF5D94FEDE90}"/>
                 </a:ext>
                 <a:ext uri="{C183D7F6-B498-43B3-948B-1728B52AA6E4}">
-                  <adec:decorative xmlns="" xmlns:adec="http://schemas.microsoft.com/office/drawing/2017/decorative" val="1"/>
+                  <adec:decorative xmlns:adec="http://schemas.microsoft.com/office/drawing/2017/decorative" xmlns="" val="1"/>
                 </a:ext>
               </a:extLst>
             </p:cNvPr>
@@ -15937,7 +15764,7 @@
                 <a16:creationId xmlns:a16="http://schemas.microsoft.com/office/drawing/2014/main" id="{E2D3D3F2-ABBB-4453-B1C5-1BEBF7E4DD56}"/>
               </a:ext>
               <a:ext uri="{C183D7F6-B498-43B3-948B-1728B52AA6E4}">
-                <adec:decorative xmlns="" xmlns:adec="http://schemas.microsoft.com/office/drawing/2017/decorative" val="1"/>
+                <adec:decorative xmlns:adec="http://schemas.microsoft.com/office/drawing/2017/decorative" xmlns="" val="1"/>
               </a:ext>
             </a:extLst>
           </p:cNvPr>
@@ -16016,7 +15843,7 @@
                 <a16:creationId xmlns:a16="http://schemas.microsoft.com/office/drawing/2014/main" id="{8214E4A5-A0D2-42C4-8D14-D2A7E495F041}"/>
               </a:ext>
               <a:ext uri="{C183D7F6-B498-43B3-948B-1728B52AA6E4}">
-                <adec:decorative xmlns="" xmlns:adec="http://schemas.microsoft.com/office/drawing/2017/decorative" val="1"/>
+                <adec:decorative xmlns:adec="http://schemas.microsoft.com/office/drawing/2017/decorative" xmlns="" val="1"/>
               </a:ext>
             </a:extLst>
           </p:cNvPr>
@@ -16047,7 +15874,7 @@
                   <a16:creationId xmlns:a16="http://schemas.microsoft.com/office/drawing/2014/main" id="{7494D7A0-6B21-41E8-A7D3-0033BBB79156}"/>
                 </a:ext>
                 <a:ext uri="{C183D7F6-B498-43B3-948B-1728B52AA6E4}">
-                  <adec:decorative xmlns="" xmlns:adec="http://schemas.microsoft.com/office/drawing/2017/decorative" val="1"/>
+                  <adec:decorative xmlns:adec="http://schemas.microsoft.com/office/drawing/2017/decorative" xmlns="" val="1"/>
                 </a:ext>
               </a:extLst>
             </p:cNvPr>
@@ -16116,7 +15943,7 @@
                   <a16:creationId xmlns:a16="http://schemas.microsoft.com/office/drawing/2014/main" id="{1E141D7D-32B0-448E-A666-EA8703AFCF2C}"/>
                 </a:ext>
                 <a:ext uri="{C183D7F6-B498-43B3-948B-1728B52AA6E4}">
-                  <adec:decorative xmlns="" xmlns:adec="http://schemas.microsoft.com/office/drawing/2017/decorative" val="1"/>
+                  <adec:decorative xmlns:adec="http://schemas.microsoft.com/office/drawing/2017/decorative" xmlns="" val="1"/>
                 </a:ext>
               </a:extLst>
             </p:cNvPr>
@@ -16185,7 +16012,7 @@
                   <a16:creationId xmlns:a16="http://schemas.microsoft.com/office/drawing/2014/main" id="{8D87E268-6345-420F-8B97-B37ED04100EC}"/>
                 </a:ext>
                 <a:ext uri="{C183D7F6-B498-43B3-948B-1728B52AA6E4}">
-                  <adec:decorative xmlns="" xmlns:adec="http://schemas.microsoft.com/office/drawing/2017/decorative" val="1"/>
+                  <adec:decorative xmlns:adec="http://schemas.microsoft.com/office/drawing/2017/decorative" xmlns="" val="1"/>
                 </a:ext>
               </a:extLst>
             </p:cNvPr>
@@ -16254,7 +16081,7 @@
                   <a16:creationId xmlns:a16="http://schemas.microsoft.com/office/drawing/2014/main" id="{35E1622E-7FA6-4760-A2BF-A8105EBF7BB9}"/>
                 </a:ext>
                 <a:ext uri="{C183D7F6-B498-43B3-948B-1728B52AA6E4}">
-                  <adec:decorative xmlns="" xmlns:adec="http://schemas.microsoft.com/office/drawing/2017/decorative" val="1"/>
+                  <adec:decorative xmlns:adec="http://schemas.microsoft.com/office/drawing/2017/decorative" xmlns="" val="1"/>
                 </a:ext>
               </a:extLst>
             </p:cNvPr>
@@ -16369,7 +16196,7 @@
                 <a16:creationId xmlns:a16="http://schemas.microsoft.com/office/drawing/2014/main" id="{AF19A774-30A5-488B-9BAF-629C6440294E}"/>
               </a:ext>
               <a:ext uri="{C183D7F6-B498-43B3-948B-1728B52AA6E4}">
-                <adec:decorative xmlns="" xmlns:adec="http://schemas.microsoft.com/office/drawing/2017/decorative" val="1"/>
+                <adec:decorative xmlns:adec="http://schemas.microsoft.com/office/drawing/2017/decorative" xmlns="" val="1"/>
               </a:ext>
             </a:extLst>
           </p:cNvPr>
@@ -16400,7 +16227,7 @@
                   <a16:creationId xmlns:a16="http://schemas.microsoft.com/office/drawing/2014/main" id="{291EBF88-5B98-4258-A542-14C3AF2E5225}"/>
                 </a:ext>
                 <a:ext uri="{C183D7F6-B498-43B3-948B-1728B52AA6E4}">
-                  <adec:decorative xmlns="" xmlns:adec="http://schemas.microsoft.com/office/drawing/2017/decorative" val="1"/>
+                  <adec:decorative xmlns:adec="http://schemas.microsoft.com/office/drawing/2017/decorative" xmlns="" val="1"/>
                 </a:ext>
               </a:extLst>
             </p:cNvPr>
@@ -16457,7 +16284,7 @@
                   <a16:creationId xmlns:a16="http://schemas.microsoft.com/office/drawing/2014/main" id="{8FBC2D58-9E3C-490D-BD7A-61EF07EA79E4}"/>
                 </a:ext>
                 <a:ext uri="{C183D7F6-B498-43B3-948B-1728B52AA6E4}">
-                  <adec:decorative xmlns="" xmlns:adec="http://schemas.microsoft.com/office/drawing/2017/decorative" val="1"/>
+                  <adec:decorative xmlns:adec="http://schemas.microsoft.com/office/drawing/2017/decorative" xmlns="" val="1"/>
                 </a:ext>
               </a:extLst>
             </p:cNvPr>
@@ -16514,7 +16341,7 @@
                   <a16:creationId xmlns:a16="http://schemas.microsoft.com/office/drawing/2014/main" id="{B6CF1BB4-1C1D-4EDE-BA26-0243FCF83BB9}"/>
                 </a:ext>
                 <a:ext uri="{C183D7F6-B498-43B3-948B-1728B52AA6E4}">
-                  <adec:decorative xmlns="" xmlns:adec="http://schemas.microsoft.com/office/drawing/2017/decorative" val="1"/>
+                  <adec:decorative xmlns:adec="http://schemas.microsoft.com/office/drawing/2017/decorative" xmlns="" val="1"/>
                 </a:ext>
               </a:extLst>
             </p:cNvPr>
@@ -16571,7 +16398,7 @@
                   <a16:creationId xmlns:a16="http://schemas.microsoft.com/office/drawing/2014/main" id="{00C83729-E02F-4512-AFE7-F4792228BDA2}"/>
                 </a:ext>
                 <a:ext uri="{C183D7F6-B498-43B3-948B-1728B52AA6E4}">
-                  <adec:decorative xmlns="" xmlns:adec="http://schemas.microsoft.com/office/drawing/2017/decorative" val="1"/>
+                  <adec:decorative xmlns:adec="http://schemas.microsoft.com/office/drawing/2017/decorative" xmlns="" val="1"/>
                 </a:ext>
               </a:extLst>
             </p:cNvPr>

</xml_diff>